<commit_message>
Update to provide more details on changes and also include an open question from Design Team meeting on July 16 on supporting enrollment of multiple LDevID certificates
</commit_message>
<xml_diff>
--- a/presentations/slides-120-anima-update-brski-with-pledge-in-responder-mode-brski-prm.pptx
+++ b/presentations/slides-120-anima-update-brski-with-pledge-in-responder-mode-brski-prm.pptx
@@ -5,13 +5,15 @@
     <p:sldMasterId id="2147483663" r:id="rId4"/>
   </p:sldMasterIdLst>
   <p:notesMasterIdLst>
-    <p:notesMasterId r:id="rId9"/>
+    <p:notesMasterId r:id="rId11"/>
   </p:notesMasterIdLst>
   <p:sldIdLst>
     <p:sldId id="310" r:id="rId5"/>
-    <p:sldId id="322" r:id="rId6"/>
-    <p:sldId id="311" r:id="rId7"/>
-    <p:sldId id="285" r:id="rId8"/>
+    <p:sldId id="324" r:id="rId6"/>
+    <p:sldId id="325" r:id="rId7"/>
+    <p:sldId id="311" r:id="rId8"/>
+    <p:sldId id="326" r:id="rId9"/>
+    <p:sldId id="285" r:id="rId10"/>
   </p:sldIdLst>
   <p:sldSz cx="12192000" cy="6858000"/>
   <p:notesSz cx="6858000" cy="9144000"/>
@@ -255,7 +257,7 @@
           <a:p>
             <a:fld id="{33B5B5E8-CA78-4A82-83A0-867EF5A818AE}" type="datetimeFigureOut">
               <a:rPr lang="en-US" smtClean="0"/>
-              <a:t>7/12/2024</a:t>
+              <a:t>7/16/2024</a:t>
             </a:fld>
             <a:endParaRPr lang="en-US"/>
           </a:p>
@@ -1103,7 +1105,7 @@
     </p:spTree>
     <p:extLst>
       <p:ext uri="{BB962C8B-B14F-4D97-AF65-F5344CB8AC3E}">
-        <p14:creationId xmlns:p14="http://schemas.microsoft.com/office/powerpoint/2010/main" val="2822548124"/>
+        <p14:creationId xmlns:p14="http://schemas.microsoft.com/office/powerpoint/2010/main" val="66221448"/>
       </p:ext>
     </p:extLst>
   </p:cSld>
@@ -1157,7 +1159,514 @@
           <a:bodyPr/>
           <a:lstStyle/>
           <a:p>
-            <a:endParaRPr lang="en-US" dirty="0"/>
+            <a:pPr algn="l">
+              <a:buFont typeface="Arial" panose="020B0604020202020204" pitchFamily="34" charset="0"/>
+              <a:buChar char="•"/>
+            </a:pPr>
+            <a:r>
+              <a:rPr lang="en-US" b="0" i="0" dirty="0">
+                <a:solidFill>
+                  <a:srgbClr val="222222"/>
+                </a:solidFill>
+                <a:effectLst/>
+                <a:highlight>
+                  <a:srgbClr val="FFFFFF"/>
+                </a:highlight>
+                <a:latin typeface="Noto Sans" panose="020B0502040504020204" pitchFamily="34" charset="0"/>
+              </a:rPr>
+              <a:t>Deleted figure in Section "Request Artifact: Pledge Voucher-Request Trigger (</a:t>
+            </a:r>
+            <a:r>
+              <a:rPr lang="en-US" b="0" i="0" dirty="0" err="1">
+                <a:solidFill>
+                  <a:srgbClr val="222222"/>
+                </a:solidFill>
+                <a:effectLst/>
+                <a:highlight>
+                  <a:srgbClr val="FFFFFF"/>
+                </a:highlight>
+                <a:latin typeface="Noto Sans" panose="020B0502040504020204" pitchFamily="34" charset="0"/>
+              </a:rPr>
+              <a:t>tPVR</a:t>
+            </a:r>
+            <a:r>
+              <a:rPr lang="en-US" b="0" i="0" dirty="0">
+                <a:solidFill>
+                  <a:srgbClr val="222222"/>
+                </a:solidFill>
+                <a:effectLst/>
+                <a:highlight>
+                  <a:srgbClr val="FFFFFF"/>
+                </a:highlight>
+                <a:latin typeface="Noto Sans" panose="020B0502040504020204" pitchFamily="34" charset="0"/>
+              </a:rPr>
+              <a:t>)" for JSON representation of </a:t>
+            </a:r>
+            <a:r>
+              <a:rPr lang="en-US" b="0" i="0" dirty="0" err="1">
+                <a:solidFill>
+                  <a:srgbClr val="222222"/>
+                </a:solidFill>
+                <a:effectLst/>
+                <a:highlight>
+                  <a:srgbClr val="FFFFFF"/>
+                </a:highlight>
+                <a:latin typeface="Noto Sans" panose="020B0502040504020204" pitchFamily="34" charset="0"/>
+              </a:rPr>
+              <a:t>tPVR</a:t>
+            </a:r>
+            <a:r>
+              <a:rPr lang="en-US" b="0" i="0" dirty="0">
+                <a:solidFill>
+                  <a:srgbClr val="222222"/>
+                </a:solidFill>
+                <a:effectLst/>
+                <a:highlight>
+                  <a:srgbClr val="FFFFFF"/>
+                </a:highlight>
+                <a:latin typeface="Noto Sans" panose="020B0502040504020204" pitchFamily="34" charset="0"/>
+              </a:rPr>
+              <a:t>, as it has been replaced by CDDL</a:t>
+            </a:r>
+          </a:p>
+          <a:p>
+            <a:pPr algn="l">
+              <a:buFont typeface="Arial" panose="020B0604020202020204" pitchFamily="34" charset="0"/>
+              <a:buChar char="•"/>
+            </a:pPr>
+            <a:r>
+              <a:rPr lang="en-US" b="0" i="0" dirty="0">
+                <a:solidFill>
+                  <a:srgbClr val="222222"/>
+                </a:solidFill>
+                <a:effectLst/>
+                <a:highlight>
+                  <a:srgbClr val="FFFFFF"/>
+                </a:highlight>
+                <a:latin typeface="Noto Sans" panose="020B0502040504020204" pitchFamily="34" charset="0"/>
+              </a:rPr>
+              <a:t>Updated reason-content description in status response messages (enroll-status, voucher-status, and status-response).</a:t>
+            </a:r>
+          </a:p>
+          <a:p>
+            <a:pPr algn="l">
+              <a:buFont typeface="Arial" panose="020B0604020202020204" pitchFamily="34" charset="0"/>
+              <a:buChar char="•"/>
+            </a:pPr>
+            <a:r>
+              <a:rPr lang="en-US" b="0" i="0" dirty="0">
+                <a:solidFill>
+                  <a:srgbClr val="222222"/>
+                </a:solidFill>
+                <a:effectLst/>
+                <a:highlight>
+                  <a:srgbClr val="FFFFFF"/>
+                </a:highlight>
+                <a:latin typeface="Noto Sans" panose="020B0502040504020204" pitchFamily="34" charset="0"/>
+              </a:rPr>
+              <a:t>Updated CDDL source code integration to allow for automatic verification</a:t>
+            </a:r>
+          </a:p>
+          <a:p>
+            <a:pPr algn="l">
+              <a:buFont typeface="Arial" panose="020B0604020202020204" pitchFamily="34" charset="0"/>
+              <a:buChar char="•"/>
+            </a:pPr>
+            <a:r>
+              <a:rPr lang="en-US" b="0" i="0" dirty="0">
+                <a:solidFill>
+                  <a:srgbClr val="222222"/>
+                </a:solidFill>
+                <a:effectLst/>
+                <a:highlight>
+                  <a:srgbClr val="FFFFFF"/>
+                </a:highlight>
+                <a:latin typeface="Noto Sans" panose="020B0502040504020204" pitchFamily="34" charset="0"/>
+              </a:rPr>
+              <a:t>Reordered description in </a:t>
+            </a:r>
+            <a:r>
+              <a:rPr lang="en-US" b="0" i="0" u="none" strike="noStrike" dirty="0">
+                <a:solidFill>
+                  <a:srgbClr val="2222EE"/>
+                </a:solidFill>
+                <a:effectLst/>
+                <a:highlight>
+                  <a:srgbClr val="FFFFFF"/>
+                </a:highlight>
+                <a:latin typeface="Noto Sans" panose="020B0502040504020204" pitchFamily="34" charset="0"/>
+                <a:hlinkClick r:id="rId3" action="ppaction://hlinkfile"/>
+              </a:rPr>
+              <a:t>Section 7.3</a:t>
+            </a:r>
+            <a:r>
+              <a:rPr lang="en-US" b="0" i="0" dirty="0">
+                <a:solidFill>
+                  <a:srgbClr val="222222"/>
+                </a:solidFill>
+                <a:effectLst/>
+                <a:highlight>
+                  <a:srgbClr val="FFFFFF"/>
+                </a:highlight>
+                <a:latin typeface="Noto Sans" panose="020B0502040504020204" pitchFamily="34" charset="0"/>
+              </a:rPr>
+              <a:t> in </a:t>
+            </a:r>
+            <a:r>
+              <a:rPr lang="en-US" b="0" i="0" u="none" strike="noStrike" dirty="0">
+                <a:solidFill>
+                  <a:srgbClr val="2222EE"/>
+                </a:solidFill>
+                <a:effectLst/>
+                <a:highlight>
+                  <a:srgbClr val="FFFFFF"/>
+                </a:highlight>
+                <a:latin typeface="Noto Sans" panose="020B0502040504020204" pitchFamily="34" charset="0"/>
+                <a:hlinkClick r:id="rId4" action="ppaction://hlinkfile"/>
+              </a:rPr>
+              <a:t>Section 7.2</a:t>
+            </a:r>
+            <a:r>
+              <a:rPr lang="en-US" b="0" i="0" dirty="0">
+                <a:solidFill>
+                  <a:srgbClr val="222222"/>
+                </a:solidFill>
+                <a:effectLst/>
+                <a:highlight>
+                  <a:srgbClr val="FFFFFF"/>
+                </a:highlight>
+                <a:latin typeface="Noto Sans" panose="020B0502040504020204" pitchFamily="34" charset="0"/>
+              </a:rPr>
+              <a:t> to better match the order of communication and artifact processing.</a:t>
+            </a:r>
+          </a:p>
+          <a:p>
+            <a:pPr algn="l">
+              <a:buFont typeface="Arial" panose="020B0604020202020204" pitchFamily="34" charset="0"/>
+              <a:buChar char="•"/>
+            </a:pPr>
+            <a:r>
+              <a:rPr lang="en-US" b="0" i="0" dirty="0">
+                <a:solidFill>
+                  <a:srgbClr val="222222"/>
+                </a:solidFill>
+                <a:effectLst/>
+                <a:highlight>
+                  <a:srgbClr val="FFFFFF"/>
+                </a:highlight>
+                <a:latin typeface="Noto Sans" panose="020B0502040504020204" pitchFamily="34" charset="0"/>
+              </a:rPr>
+              <a:t>Updated CDDL for the request-enroll trigger in </a:t>
+            </a:r>
+            <a:r>
+              <a:rPr lang="en-US" b="0" i="0" u="none" strike="noStrike" dirty="0">
+                <a:solidFill>
+                  <a:srgbClr val="2222EE"/>
+                </a:solidFill>
+                <a:effectLst/>
+                <a:highlight>
+                  <a:srgbClr val="FFFFFF"/>
+                </a:highlight>
+                <a:latin typeface="Noto Sans" panose="020B0502040504020204" pitchFamily="34" charset="0"/>
+                <a:hlinkClick r:id="rId5" action="ppaction://hlinkfile"/>
+              </a:rPr>
+              <a:t>Figure 15</a:t>
+            </a:r>
+            <a:r>
+              <a:rPr lang="en-US" b="0" i="0" dirty="0">
+                <a:solidFill>
+                  <a:srgbClr val="222222"/>
+                </a:solidFill>
+                <a:effectLst/>
+                <a:highlight>
+                  <a:srgbClr val="FFFFFF"/>
+                </a:highlight>
+                <a:latin typeface="Noto Sans" panose="020B0502040504020204" pitchFamily="34" charset="0"/>
+              </a:rPr>
+              <a:t> according to the outcome of the interim ANIMA WG meeting discussions on April 19, 2024</a:t>
+            </a:r>
+          </a:p>
+          <a:p>
+            <a:pPr algn="l">
+              <a:buFont typeface="Arial" panose="020B0604020202020204" pitchFamily="34" charset="0"/>
+              <a:buChar char="•"/>
+            </a:pPr>
+            <a:r>
+              <a:rPr lang="en-US" b="0" i="0" dirty="0">
+                <a:solidFill>
+                  <a:srgbClr val="222222"/>
+                </a:solidFill>
+                <a:effectLst/>
+                <a:highlight>
+                  <a:srgbClr val="FFFFFF"/>
+                </a:highlight>
+                <a:latin typeface="Noto Sans" panose="020B0502040504020204" pitchFamily="34" charset="0"/>
+              </a:rPr>
+              <a:t>Included statement in </a:t>
+            </a:r>
+            <a:r>
+              <a:rPr lang="en-US" b="0" i="0" u="none" strike="noStrike" dirty="0">
+                <a:solidFill>
+                  <a:srgbClr val="2222EE"/>
+                </a:solidFill>
+                <a:effectLst/>
+                <a:highlight>
+                  <a:srgbClr val="FFFFFF"/>
+                </a:highlight>
+                <a:latin typeface="Noto Sans" panose="020B0502040504020204" pitchFamily="34" charset="0"/>
+                <a:hlinkClick r:id="rId6" action="ppaction://hlinkfile"/>
+              </a:rPr>
+              <a:t>Section 7.2.2</a:t>
+            </a:r>
+            <a:r>
+              <a:rPr lang="en-US" b="0" i="0" dirty="0">
+                <a:solidFill>
+                  <a:srgbClr val="222222"/>
+                </a:solidFill>
+                <a:effectLst/>
+                <a:highlight>
+                  <a:srgbClr val="FFFFFF"/>
+                </a:highlight>
+                <a:latin typeface="Noto Sans" panose="020B0502040504020204" pitchFamily="34" charset="0"/>
+              </a:rPr>
+              <a:t> for using the advanced created-on time from the agent-signed-data also for the PER, when the pledge has no synchronized clock</a:t>
+            </a:r>
+          </a:p>
+          <a:p>
+            <a:pPr algn="l">
+              <a:buFont typeface="Arial" panose="020B0604020202020204" pitchFamily="34" charset="0"/>
+              <a:buChar char="•"/>
+            </a:pPr>
+            <a:r>
+              <a:rPr lang="en-US" b="0" i="0" dirty="0">
+                <a:solidFill>
+                  <a:srgbClr val="222222"/>
+                </a:solidFill>
+                <a:effectLst/>
+                <a:highlight>
+                  <a:srgbClr val="FFFFFF"/>
+                </a:highlight>
+                <a:latin typeface="Noto Sans" panose="020B0502040504020204" pitchFamily="34" charset="0"/>
+              </a:rPr>
+              <a:t>Update of the examples in </a:t>
+            </a:r>
+            <a:r>
+              <a:rPr lang="en-US" b="0" i="0" u="none" strike="noStrike" dirty="0">
+                <a:solidFill>
+                  <a:srgbClr val="2222EE"/>
+                </a:solidFill>
+                <a:effectLst/>
+                <a:highlight>
+                  <a:srgbClr val="FFFFFF"/>
+                </a:highlight>
+                <a:latin typeface="Noto Sans" panose="020B0502040504020204" pitchFamily="34" charset="0"/>
+                <a:hlinkClick r:id="rId7" action="ppaction://hlinkfile"/>
+              </a:rPr>
+              <a:t>Appendix A</a:t>
+            </a:r>
+            <a:r>
+              <a:rPr lang="en-US" b="0" i="0" dirty="0">
+                <a:solidFill>
+                  <a:srgbClr val="222222"/>
+                </a:solidFill>
+                <a:effectLst/>
+                <a:highlight>
+                  <a:srgbClr val="FFFFFF"/>
+                </a:highlight>
+                <a:latin typeface="Noto Sans" panose="020B0502040504020204" pitchFamily="34" charset="0"/>
+              </a:rPr>
+              <a:t> to align with the defined prototypes</a:t>
+            </a:r>
+          </a:p>
+          <a:p>
+            <a:pPr algn="l">
+              <a:buFont typeface="Arial" panose="020B0604020202020204" pitchFamily="34" charset="0"/>
+              <a:buChar char="•"/>
+            </a:pPr>
+            <a:r>
+              <a:rPr lang="en-US" b="0" i="0" dirty="0">
+                <a:solidFill>
+                  <a:srgbClr val="222222"/>
+                </a:solidFill>
+                <a:effectLst/>
+                <a:highlight>
+                  <a:srgbClr val="FFFFFF"/>
+                </a:highlight>
+                <a:latin typeface="Noto Sans" panose="020B0502040504020204" pitchFamily="34" charset="0"/>
+              </a:rPr>
+              <a:t>Changes incorporated based on Shepherd review PR #133:</a:t>
+            </a:r>
+          </a:p>
+          <a:p>
+            <a:pPr marL="742950" lvl="1" indent="-285750" algn="l">
+              <a:buFont typeface="Arial" panose="020B0604020202020204" pitchFamily="34" charset="0"/>
+              <a:buChar char="•"/>
+            </a:pPr>
+            <a:r>
+              <a:rPr lang="en-US" b="0" i="0" dirty="0">
+                <a:solidFill>
+                  <a:srgbClr val="222222"/>
+                </a:solidFill>
+                <a:effectLst/>
+                <a:highlight>
+                  <a:srgbClr val="FFFFFF"/>
+                </a:highlight>
+                <a:latin typeface="Noto Sans" panose="020B0502040504020204" pitchFamily="34" charset="0"/>
+              </a:rPr>
+              <a:t>Terminology alignment and clarification throughout the document to use terms more consistently</a:t>
+            </a:r>
+          </a:p>
+          <a:p>
+            <a:pPr marL="742950" lvl="1" indent="-285750" algn="l">
+              <a:buFont typeface="Arial" panose="020B0604020202020204" pitchFamily="34" charset="0"/>
+              <a:buChar char="•"/>
+            </a:pPr>
+            <a:r>
+              <a:rPr lang="en-US" b="0" i="0" dirty="0">
+                <a:solidFill>
+                  <a:srgbClr val="222222"/>
+                </a:solidFill>
+                <a:effectLst/>
+                <a:highlight>
+                  <a:srgbClr val="FFFFFF"/>
+                </a:highlight>
+                <a:latin typeface="Noto Sans" panose="020B0502040504020204" pitchFamily="34" charset="0"/>
+              </a:rPr>
+              <a:t>Restructuring of section </a:t>
+            </a:r>
+            <a:r>
+              <a:rPr lang="en-US" b="0" i="0" u="none" strike="noStrike" dirty="0" err="1">
+                <a:solidFill>
+                  <a:srgbClr val="2222EE"/>
+                </a:solidFill>
+                <a:effectLst/>
+                <a:highlight>
+                  <a:srgbClr val="FFFFFF"/>
+                </a:highlight>
+                <a:latin typeface="Noto Sans" panose="020B0502040504020204" pitchFamily="34" charset="0"/>
+                <a:hlinkClick r:id="rId8" action="ppaction://hlinkfile"/>
+              </a:rPr>
+              <a:t>Section</a:t>
+            </a:r>
+            <a:r>
+              <a:rPr lang="en-US" b="0" i="0" u="none" strike="noStrike" dirty="0">
+                <a:solidFill>
+                  <a:srgbClr val="2222EE"/>
+                </a:solidFill>
+                <a:effectLst/>
+                <a:highlight>
+                  <a:srgbClr val="FFFFFF"/>
+                </a:highlight>
+                <a:latin typeface="Noto Sans" panose="020B0502040504020204" pitchFamily="34" charset="0"/>
+                <a:hlinkClick r:id="rId8" action="ppaction://hlinkfile"/>
+              </a:rPr>
+              <a:t> 7</a:t>
+            </a:r>
+            <a:r>
+              <a:rPr lang="en-US" b="0" i="0" dirty="0">
+                <a:solidFill>
+                  <a:srgbClr val="222222"/>
+                </a:solidFill>
+                <a:effectLst/>
+                <a:highlight>
+                  <a:srgbClr val="FFFFFF"/>
+                </a:highlight>
+                <a:latin typeface="Noto Sans" panose="020B0502040504020204" pitchFamily="34" charset="0"/>
+              </a:rPr>
+              <a:t> for protocol steps to align to the general approach: Overview, data description, CDDL description (if necessary), JWS Header an Signature. This lead to some movement of text between existing and new subsections.</a:t>
+            </a:r>
+          </a:p>
+          <a:p>
+            <a:pPr marL="742950" lvl="1" indent="-285750" algn="l">
+              <a:buFont typeface="Arial" panose="020B0604020202020204" pitchFamily="34" charset="0"/>
+              <a:buChar char="•"/>
+            </a:pPr>
+            <a:r>
+              <a:rPr lang="en-US" b="0" i="0" dirty="0">
+                <a:solidFill>
+                  <a:srgbClr val="222222"/>
+                </a:solidFill>
+                <a:effectLst/>
+                <a:highlight>
+                  <a:srgbClr val="FFFFFF"/>
+                </a:highlight>
+                <a:latin typeface="Noto Sans" panose="020B0502040504020204" pitchFamily="34" charset="0"/>
+              </a:rPr>
+              <a:t>Inclusion of new section on logging hints </a:t>
+            </a:r>
+            <a:r>
+              <a:rPr lang="en-US" b="0" i="0" u="none" strike="noStrike" dirty="0">
+                <a:solidFill>
+                  <a:srgbClr val="2222EE"/>
+                </a:solidFill>
+                <a:effectLst/>
+                <a:highlight>
+                  <a:srgbClr val="FFFFFF"/>
+                </a:highlight>
+                <a:latin typeface="Noto Sans" panose="020B0502040504020204" pitchFamily="34" charset="0"/>
+                <a:hlinkClick r:id="rId9" action="ppaction://hlinkfile"/>
+              </a:rPr>
+              <a:t>Section 8</a:t>
+            </a:r>
+            <a:r>
+              <a:rPr lang="en-US" b="0" i="0" dirty="0">
+                <a:solidFill>
+                  <a:srgbClr val="222222"/>
+                </a:solidFill>
+                <a:effectLst/>
+                <a:highlight>
+                  <a:srgbClr val="FFFFFF"/>
+                </a:highlight>
+                <a:latin typeface="Noto Sans" panose="020B0502040504020204" pitchFamily="34" charset="0"/>
+              </a:rPr>
+              <a:t> to give recommendations on which events to be logged for auditing</a:t>
+            </a:r>
+          </a:p>
+          <a:p>
+            <a:pPr marL="742950" lvl="1" indent="-285750" algn="l">
+              <a:buFont typeface="Arial" panose="020B0604020202020204" pitchFamily="34" charset="0"/>
+              <a:buChar char="•"/>
+            </a:pPr>
+            <a:r>
+              <a:rPr lang="en-US" b="0" i="0" dirty="0">
+                <a:solidFill>
+                  <a:srgbClr val="222222"/>
+                </a:solidFill>
+                <a:effectLst/>
+                <a:highlight>
+                  <a:srgbClr val="FFFFFF"/>
+                </a:highlight>
+                <a:latin typeface="Noto Sans" panose="020B0502040504020204" pitchFamily="34" charset="0"/>
+              </a:rPr>
+              <a:t>Enhancement of IANA considerations in </a:t>
+            </a:r>
+            <a:r>
+              <a:rPr lang="en-US" b="0" i="0" u="none" strike="noStrike" dirty="0">
+                <a:solidFill>
+                  <a:srgbClr val="2222EE"/>
+                </a:solidFill>
+                <a:effectLst/>
+                <a:highlight>
+                  <a:srgbClr val="FFFFFF"/>
+                </a:highlight>
+                <a:latin typeface="Noto Sans" panose="020B0502040504020204" pitchFamily="34" charset="0"/>
+                <a:hlinkClick r:id="rId10" action="ppaction://hlinkfile"/>
+              </a:rPr>
+              <a:t>Section 9</a:t>
+            </a:r>
+            <a:r>
+              <a:rPr lang="en-US" b="0" i="0" dirty="0">
+                <a:solidFill>
+                  <a:srgbClr val="222222"/>
+                </a:solidFill>
+                <a:effectLst/>
+                <a:highlight>
+                  <a:srgbClr val="FFFFFF"/>
+                </a:highlight>
+                <a:latin typeface="Noto Sans" panose="020B0502040504020204" pitchFamily="34" charset="0"/>
+              </a:rPr>
+              <a:t> with values for the trigger messages and with an enhancement of the pledge status query and response to allow for a more flexible status inquiry and reporting</a:t>
+            </a:r>
           </a:p>
         </p:txBody>
       </p:sp>
@@ -1187,7 +1696,7 @@
     </p:spTree>
     <p:extLst>
       <p:ext uri="{BB962C8B-B14F-4D97-AF65-F5344CB8AC3E}">
-        <p14:creationId xmlns:p14="http://schemas.microsoft.com/office/powerpoint/2010/main" val="490717640"/>
+        <p14:creationId xmlns:p14="http://schemas.microsoft.com/office/powerpoint/2010/main" val="3667406786"/>
       </p:ext>
     </p:extLst>
   </p:cSld>
@@ -1263,6 +1772,174 @@
             <a:fld id="{4C6D392E-C4EF-4AC5-9CF0-E17168E17BBE}" type="slidenum">
               <a:rPr lang="en-US" smtClean="0"/>
               <a:t>4</a:t>
+            </a:fld>
+            <a:endParaRPr lang="en-US"/>
+          </a:p>
+        </p:txBody>
+      </p:sp>
+    </p:spTree>
+    <p:extLst>
+      <p:ext uri="{BB962C8B-B14F-4D97-AF65-F5344CB8AC3E}">
+        <p14:creationId xmlns:p14="http://schemas.microsoft.com/office/powerpoint/2010/main" val="490717640"/>
+      </p:ext>
+    </p:extLst>
+  </p:cSld>
+  <p:clrMapOvr>
+    <a:masterClrMapping/>
+  </p:clrMapOvr>
+</p:notes>
+</file>
+
+<file path=ppt/notesSlides/notesSlide4.xml><?xml version="1.0" encoding="utf-8"?>
+<p:notes xmlns:a="http://schemas.openxmlformats.org/drawingml/2006/main" xmlns:r="http://schemas.openxmlformats.org/officeDocument/2006/relationships" xmlns:p="http://schemas.openxmlformats.org/presentationml/2006/main">
+  <p:cSld>
+    <p:spTree>
+      <p:nvGrpSpPr>
+        <p:cNvPr id="1" name=""/>
+        <p:cNvGrpSpPr/>
+        <p:nvPr/>
+      </p:nvGrpSpPr>
+      <p:grpSpPr>
+        <a:xfrm>
+          <a:off x="0" y="0"/>
+          <a:ext cx="0" cy="0"/>
+          <a:chOff x="0" y="0"/>
+          <a:chExt cx="0" cy="0"/>
+        </a:xfrm>
+      </p:grpSpPr>
+      <p:sp>
+        <p:nvSpPr>
+          <p:cNvPr id="2" name="Slide Image Placeholder 1"/>
+          <p:cNvSpPr>
+            <a:spLocks noGrp="1" noRot="1" noChangeAspect="1"/>
+          </p:cNvSpPr>
+          <p:nvPr>
+            <p:ph type="sldImg"/>
+          </p:nvPr>
+        </p:nvSpPr>
+        <p:spPr/>
+      </p:sp>
+      <p:sp>
+        <p:nvSpPr>
+          <p:cNvPr id="3" name="Notes Placeholder 2"/>
+          <p:cNvSpPr>
+            <a:spLocks noGrp="1"/>
+          </p:cNvSpPr>
+          <p:nvPr>
+            <p:ph type="body" idx="1"/>
+          </p:nvPr>
+        </p:nvSpPr>
+        <p:spPr/>
+        <p:txBody>
+          <a:bodyPr/>
+          <a:lstStyle/>
+          <a:p>
+            <a:endParaRPr lang="en-US" dirty="0"/>
+          </a:p>
+        </p:txBody>
+      </p:sp>
+      <p:sp>
+        <p:nvSpPr>
+          <p:cNvPr id="4" name="Slide Number Placeholder 3"/>
+          <p:cNvSpPr>
+            <a:spLocks noGrp="1"/>
+          </p:cNvSpPr>
+          <p:nvPr>
+            <p:ph type="sldNum" sz="quarter" idx="5"/>
+          </p:nvPr>
+        </p:nvSpPr>
+        <p:spPr/>
+        <p:txBody>
+          <a:bodyPr/>
+          <a:lstStyle/>
+          <a:p>
+            <a:fld id="{4C6D392E-C4EF-4AC5-9CF0-E17168E17BBE}" type="slidenum">
+              <a:rPr lang="en-US" smtClean="0"/>
+              <a:t>5</a:t>
+            </a:fld>
+            <a:endParaRPr lang="en-US"/>
+          </a:p>
+        </p:txBody>
+      </p:sp>
+    </p:spTree>
+    <p:extLst>
+      <p:ext uri="{BB962C8B-B14F-4D97-AF65-F5344CB8AC3E}">
+        <p14:creationId xmlns:p14="http://schemas.microsoft.com/office/powerpoint/2010/main" val="3250037531"/>
+      </p:ext>
+    </p:extLst>
+  </p:cSld>
+  <p:clrMapOvr>
+    <a:masterClrMapping/>
+  </p:clrMapOvr>
+</p:notes>
+</file>
+
+<file path=ppt/notesSlides/notesSlide5.xml><?xml version="1.0" encoding="utf-8"?>
+<p:notes xmlns:a="http://schemas.openxmlformats.org/drawingml/2006/main" xmlns:r="http://schemas.openxmlformats.org/officeDocument/2006/relationships" xmlns:p="http://schemas.openxmlformats.org/presentationml/2006/main">
+  <p:cSld>
+    <p:spTree>
+      <p:nvGrpSpPr>
+        <p:cNvPr id="1" name=""/>
+        <p:cNvGrpSpPr/>
+        <p:nvPr/>
+      </p:nvGrpSpPr>
+      <p:grpSpPr>
+        <a:xfrm>
+          <a:off x="0" y="0"/>
+          <a:ext cx="0" cy="0"/>
+          <a:chOff x="0" y="0"/>
+          <a:chExt cx="0" cy="0"/>
+        </a:xfrm>
+      </p:grpSpPr>
+      <p:sp>
+        <p:nvSpPr>
+          <p:cNvPr id="2" name="Slide Image Placeholder 1"/>
+          <p:cNvSpPr>
+            <a:spLocks noGrp="1" noRot="1" noChangeAspect="1"/>
+          </p:cNvSpPr>
+          <p:nvPr>
+            <p:ph type="sldImg"/>
+          </p:nvPr>
+        </p:nvSpPr>
+        <p:spPr/>
+      </p:sp>
+      <p:sp>
+        <p:nvSpPr>
+          <p:cNvPr id="3" name="Notes Placeholder 2"/>
+          <p:cNvSpPr>
+            <a:spLocks noGrp="1"/>
+          </p:cNvSpPr>
+          <p:nvPr>
+            <p:ph type="body" idx="1"/>
+          </p:nvPr>
+        </p:nvSpPr>
+        <p:spPr/>
+        <p:txBody>
+          <a:bodyPr/>
+          <a:lstStyle/>
+          <a:p>
+            <a:endParaRPr lang="en-US" dirty="0"/>
+          </a:p>
+        </p:txBody>
+      </p:sp>
+      <p:sp>
+        <p:nvSpPr>
+          <p:cNvPr id="4" name="Slide Number Placeholder 3"/>
+          <p:cNvSpPr>
+            <a:spLocks noGrp="1"/>
+          </p:cNvSpPr>
+          <p:nvPr>
+            <p:ph type="sldNum" sz="quarter" idx="5"/>
+          </p:nvPr>
+        </p:nvSpPr>
+        <p:spPr/>
+        <p:txBody>
+          <a:bodyPr/>
+          <a:lstStyle/>
+          <a:p>
+            <a:fld id="{4C6D392E-C4EF-4AC5-9CF0-E17168E17BBE}" type="slidenum">
+              <a:rPr lang="en-US" smtClean="0"/>
+              <a:t>6</a:t>
             </a:fld>
             <a:endParaRPr lang="en-US"/>
           </a:p>
@@ -1436,7 +2113,7 @@
           <a:p>
             <a:fld id="{8C792E63-5F21-4F54-A864-D84D9F273FCA}" type="datetimeFigureOut">
               <a:rPr lang="en-US" smtClean="0"/>
-              <a:t>7/12/2024</a:t>
+              <a:t>7/16/2024</a:t>
             </a:fld>
             <a:endParaRPr lang="en-US" dirty="0"/>
           </a:p>
@@ -1654,7 +2331,7 @@
           <a:p>
             <a:fld id="{8C792E63-5F21-4F54-A864-D84D9F273FCA}" type="datetimeFigureOut">
               <a:rPr lang="en-US" smtClean="0"/>
-              <a:t>7/12/2024</a:t>
+              <a:t>7/16/2024</a:t>
             </a:fld>
             <a:endParaRPr lang="en-US"/>
           </a:p>
@@ -1878,7 +2555,7 @@
           <a:p>
             <a:fld id="{8C792E63-5F21-4F54-A864-D84D9F273FCA}" type="datetimeFigureOut">
               <a:rPr lang="en-US" smtClean="0"/>
-              <a:t>7/12/2024</a:t>
+              <a:t>7/16/2024</a:t>
             </a:fld>
             <a:endParaRPr lang="en-US"/>
           </a:p>
@@ -2092,7 +2769,7 @@
           <a:p>
             <a:fld id="{8C792E63-5F21-4F54-A864-D84D9F273FCA}" type="datetimeFigureOut">
               <a:rPr lang="en-US" smtClean="0"/>
-              <a:t>7/12/2024</a:t>
+              <a:t>7/16/2024</a:t>
             </a:fld>
             <a:endParaRPr lang="en-US"/>
           </a:p>
@@ -2383,7 +3060,7 @@
           <a:p>
             <a:fld id="{8C792E63-5F21-4F54-A864-D84D9F273FCA}" type="datetimeFigureOut">
               <a:rPr lang="en-US" smtClean="0"/>
-              <a:t>7/12/2024</a:t>
+              <a:t>7/16/2024</a:t>
             </a:fld>
             <a:endParaRPr lang="en-US"/>
           </a:p>
@@ -2664,7 +3341,7 @@
           <a:p>
             <a:fld id="{8C792E63-5F21-4F54-A864-D84D9F273FCA}" type="datetimeFigureOut">
               <a:rPr lang="en-US" smtClean="0"/>
-              <a:t>7/12/2024</a:t>
+              <a:t>7/16/2024</a:t>
             </a:fld>
             <a:endParaRPr lang="en-US"/>
           </a:p>
@@ -3092,7 +3769,7 @@
           <a:p>
             <a:fld id="{8C792E63-5F21-4F54-A864-D84D9F273FCA}" type="datetimeFigureOut">
               <a:rPr lang="en-US" smtClean="0"/>
-              <a:t>7/12/2024</a:t>
+              <a:t>7/16/2024</a:t>
             </a:fld>
             <a:endParaRPr lang="en-US"/>
           </a:p>
@@ -3249,7 +3926,7 @@
           <a:p>
             <a:fld id="{8C792E63-5F21-4F54-A864-D84D9F273FCA}" type="datetimeFigureOut">
               <a:rPr lang="en-US" smtClean="0"/>
-              <a:t>7/12/2024</a:t>
+              <a:t>7/16/2024</a:t>
             </a:fld>
             <a:endParaRPr lang="en-US"/>
           </a:p>
@@ -3378,7 +4055,7 @@
           <a:p>
             <a:fld id="{8C792E63-5F21-4F54-A864-D84D9F273FCA}" type="datetimeFigureOut">
               <a:rPr lang="en-US" smtClean="0"/>
-              <a:t>7/12/2024</a:t>
+              <a:t>7/16/2024</a:t>
             </a:fld>
             <a:endParaRPr lang="en-US"/>
           </a:p>
@@ -3705,7 +4382,7 @@
           <a:p>
             <a:fld id="{8C792E63-5F21-4F54-A864-D84D9F273FCA}" type="datetimeFigureOut">
               <a:rPr lang="en-US" smtClean="0"/>
-              <a:t>7/12/2024</a:t>
+              <a:t>7/16/2024</a:t>
             </a:fld>
             <a:endParaRPr lang="en-US"/>
           </a:p>
@@ -4009,7 +4686,7 @@
           <a:p>
             <a:fld id="{8C792E63-5F21-4F54-A864-D84D9F273FCA}" type="datetimeFigureOut">
               <a:rPr lang="en-US" smtClean="0"/>
-              <a:t>7/12/2024</a:t>
+              <a:t>7/16/2024</a:t>
             </a:fld>
             <a:endParaRPr lang="en-US"/>
           </a:p>
@@ -4301,7 +4978,7 @@
           <a:p>
             <a:fld id="{8C792E63-5F21-4F54-A864-D84D9F273FCA}" type="datetimeFigureOut">
               <a:rPr lang="en-US" smtClean="0"/>
-              <a:t>7/12/2024</a:t>
+              <a:t>7/16/2024</a:t>
             </a:fld>
             <a:endParaRPr lang="en-US"/>
           </a:p>
@@ -4914,7 +5591,7 @@
               <a:rPr lang="en-US" sz="3600" dirty="0">
                 <a:sym typeface="Wingdings" panose="05000000000000000000" pitchFamily="2" charset="2"/>
               </a:rPr>
-              <a:t> 14</a:t>
+              <a:t> 13</a:t>
             </a:r>
             <a:endParaRPr lang="en-US" sz="3600" dirty="0"/>
           </a:p>
@@ -4963,15 +5640,12 @@
               <a:buChar char="–"/>
             </a:pPr>
             <a:r>
-              <a:rPr lang="en-US" sz="2200" dirty="0"/>
-              <a:t>Interim ANIMA Meeting: Clarification of CDDL usage, when no YANG definition is available (consistent use) </a:t>
-            </a:r>
-            <a:r>
-              <a:rPr lang="en-US" sz="2200" dirty="0">
-                <a:sym typeface="Wingdings" panose="05000000000000000000" pitchFamily="2" charset="2"/>
-              </a:rPr>
-              <a:t> Provided CDDL accordingly</a:t>
-            </a:r>
+              <a:rPr lang="en-US" sz="2400" dirty="0"/>
+              <a:t>Interim ANIMA Meeting: Clarification of CDDL usage, when no YANG definition is available for objects to use the description consistently</a:t>
+            </a:r>
+            <a:endParaRPr lang="en-US" sz="2400" dirty="0">
+              <a:sym typeface="Wingdings" panose="05000000000000000000" pitchFamily="2" charset="2"/>
+            </a:endParaRPr>
           </a:p>
           <a:p>
             <a:pPr>
@@ -4989,12 +5663,11 @@
               <a:buChar char="–"/>
             </a:pPr>
             <a:r>
-              <a:rPr lang="en-US" sz="2200" dirty="0">
+              <a:rPr lang="en-US" sz="2400" dirty="0">
                 <a:sym typeface="Wingdings" panose="05000000000000000000" pitchFamily="2" charset="2"/>
               </a:rPr>
               <a:t>Update of Examples in Annex A (1 (PVR), 2 (RVR), 4 (Voucher)) to match definitions in draft</a:t>
             </a:r>
-            <a:endParaRPr lang="en-US" sz="2200" dirty="0"/>
           </a:p>
           <a:p>
             <a:pPr>
@@ -5012,12 +5685,19 @@
               <a:buChar char="–"/>
             </a:pPr>
             <a:r>
-              <a:rPr lang="en-US" sz="2200" dirty="0"/>
-              <a:t>Part 3 of Shepherd Review by Matthias Kovatsch led to the following main changes</a:t>
-            </a:r>
-          </a:p>
-          <a:p>
-            <a:pPr lvl="1">
+              <a:rPr lang="en-US" sz="2400" dirty="0"/>
+              <a:t>Clarification included when pledge has no synchronized clock in Section 7.2.2 </a:t>
+            </a:r>
+            <a:br>
+              <a:rPr lang="en-US" sz="2400" dirty="0"/>
+            </a:br>
+            <a:r>
+              <a:rPr lang="en-US" sz="2400" dirty="0"/>
+              <a:t>(use of advanced created-on time from the agent-signed-data in  PER)</a:t>
+            </a:r>
+          </a:p>
+          <a:p>
+            <a:pPr>
               <a:lnSpc>
                 <a:spcPct val="100000"/>
               </a:lnSpc>
@@ -5032,347 +5712,17 @@
               <a:buChar char="–"/>
             </a:pPr>
             <a:r>
-              <a:rPr lang="en-US" sz="2200" kern="100" dirty="0">
-                <a:cs typeface="Arial" panose="020B0604020202020204" pitchFamily="34" charset="0"/>
-              </a:rPr>
-              <a:t>Structural improvements of the document, terminology, and simplification</a:t>
-            </a:r>
-          </a:p>
-          <a:p>
-            <a:pPr lvl="1">
-              <a:lnSpc>
-                <a:spcPct val="100000"/>
-              </a:lnSpc>
-              <a:spcBef>
-                <a:spcPts val="0"/>
-              </a:spcBef>
-              <a:spcAft>
-                <a:spcPts val="600"/>
-              </a:spcAft>
-              <a:buSzPct val="80000"/>
-              <a:buFont typeface="Calibri" panose="020F0502020204030204" pitchFamily="34" charset="0"/>
-              <a:buChar char="–"/>
-            </a:pPr>
-            <a:r>
-              <a:rPr lang="en-US" sz="2200" b="0" i="0" u="none" strike="noStrike" dirty="0">
-                <a:solidFill>
-                  <a:srgbClr val="2222EE"/>
-                </a:solidFill>
-                <a:effectLst/>
-                <a:highlight>
-                  <a:srgbClr val="FFFFFF"/>
-                </a:highlight>
-                <a:hlinkClick r:id="rId3" action="ppaction://hlinkfile"/>
-              </a:rPr>
-              <a:t>Section 7</a:t>
-            </a:r>
-            <a:r>
-              <a:rPr lang="en-US" sz="2200" b="0" i="0" dirty="0">
-                <a:solidFill>
-                  <a:srgbClr val="222222"/>
-                </a:solidFill>
-                <a:effectLst/>
-                <a:highlight>
-                  <a:srgbClr val="FFFFFF"/>
-                </a:highlight>
-              </a:rPr>
-              <a:t> restructured to describe protocol steps following a general approach: Overview, Request Artifact, Response Artifact (resulted in shifting existing text)</a:t>
-            </a:r>
-          </a:p>
-          <a:p>
-            <a:pPr lvl="1">
-              <a:lnSpc>
-                <a:spcPct val="100000"/>
-              </a:lnSpc>
-              <a:spcBef>
-                <a:spcPts val="0"/>
-              </a:spcBef>
-              <a:spcAft>
-                <a:spcPts val="600"/>
-              </a:spcAft>
-              <a:buSzPct val="80000"/>
-              <a:buFont typeface="Calibri" panose="020F0502020204030204" pitchFamily="34" charset="0"/>
-              <a:buChar char="–"/>
-            </a:pPr>
-            <a:r>
-              <a:rPr lang="en-US" sz="2200" b="0" i="0" dirty="0">
-                <a:solidFill>
-                  <a:srgbClr val="222222"/>
-                </a:solidFill>
-                <a:effectLst/>
-                <a:highlight>
-                  <a:srgbClr val="FFFFFF"/>
-                </a:highlight>
-              </a:rPr>
-              <a:t>Inclusion of new section on logging hints </a:t>
-            </a:r>
-            <a:r>
-              <a:rPr lang="en-US" sz="2200" b="0" i="0" u="none" strike="noStrike" dirty="0">
-                <a:solidFill>
-                  <a:srgbClr val="2222EE"/>
-                </a:solidFill>
-                <a:effectLst/>
-                <a:highlight>
-                  <a:srgbClr val="FFFFFF"/>
-                </a:highlight>
-                <a:hlinkClick r:id="rId4" action="ppaction://hlinkfile"/>
-              </a:rPr>
-              <a:t>Section 8</a:t>
-            </a:r>
-            <a:r>
-              <a:rPr lang="en-US" sz="2200" b="0" i="0" dirty="0">
-                <a:solidFill>
-                  <a:srgbClr val="222222"/>
-                </a:solidFill>
-                <a:effectLst/>
-                <a:highlight>
-                  <a:srgbClr val="FFFFFF"/>
-                </a:highlight>
-              </a:rPr>
-              <a:t> to give recommendations on which events to be logged for auditing</a:t>
-            </a:r>
-          </a:p>
-          <a:p>
-            <a:pPr lvl="1">
-              <a:lnSpc>
-                <a:spcPct val="100000"/>
-              </a:lnSpc>
-              <a:spcBef>
-                <a:spcPts val="0"/>
-              </a:spcBef>
-              <a:spcAft>
-                <a:spcPts val="600"/>
-              </a:spcAft>
-              <a:buSzPct val="80000"/>
-              <a:buFont typeface="Calibri" panose="020F0502020204030204" pitchFamily="34" charset="0"/>
-              <a:buChar char="–"/>
-            </a:pPr>
-            <a:r>
-              <a:rPr lang="en-US" sz="2200" b="0" i="0" dirty="0">
-                <a:solidFill>
-                  <a:srgbClr val="222222"/>
-                </a:solidFill>
-                <a:effectLst/>
-                <a:highlight>
-                  <a:srgbClr val="FFFFFF"/>
-                </a:highlight>
-              </a:rPr>
-              <a:t>Alignment of pledge status response data across </a:t>
-            </a:r>
-            <a:r>
-              <a:rPr lang="en-US" sz="2200" b="0" i="0" u="none" strike="noStrike" dirty="0">
-                <a:solidFill>
-                  <a:srgbClr val="2222EE"/>
-                </a:solidFill>
-                <a:effectLst/>
-                <a:highlight>
-                  <a:srgbClr val="FFFFFF"/>
-                </a:highlight>
-                <a:hlinkClick r:id="rId5" action="ppaction://hlinkfile"/>
-              </a:rPr>
-              <a:t>Section 7.6.2.1</a:t>
-            </a:r>
-            <a:r>
-              <a:rPr lang="en-US" sz="2200" b="0" i="0" u="none" strike="noStrike" dirty="0">
-                <a:solidFill>
-                  <a:srgbClr val="2222EE"/>
-                </a:solidFill>
-                <a:effectLst/>
-                <a:highlight>
-                  <a:srgbClr val="FFFFFF"/>
-                </a:highlight>
-              </a:rPr>
-              <a:t> </a:t>
-            </a:r>
-            <a:r>
-              <a:rPr lang="en-US" sz="2200" b="0" i="0" u="none" strike="noStrike" dirty="0">
-                <a:effectLst/>
-                <a:highlight>
-                  <a:srgbClr val="FFFFFF"/>
-                </a:highlight>
-              </a:rPr>
-              <a:t>(</a:t>
-            </a:r>
-            <a:r>
-              <a:rPr lang="en-US" sz="2200" b="0" i="0" u="none" strike="noStrike" dirty="0" err="1">
-                <a:effectLst/>
-                <a:highlight>
-                  <a:srgbClr val="FFFFFF"/>
-                </a:highlight>
-              </a:rPr>
-              <a:t>vStatus</a:t>
-            </a:r>
-            <a:r>
-              <a:rPr lang="en-US" sz="2200" b="0" i="0" u="none" strike="noStrike" dirty="0">
-                <a:effectLst/>
-                <a:highlight>
-                  <a:srgbClr val="FFFFFF"/>
-                </a:highlight>
-              </a:rPr>
-              <a:t>)</a:t>
-            </a:r>
-            <a:r>
-              <a:rPr lang="en-US" sz="2200" b="0" i="0" dirty="0">
-                <a:solidFill>
-                  <a:srgbClr val="222222"/>
-                </a:solidFill>
-                <a:effectLst/>
-                <a:highlight>
-                  <a:srgbClr val="FFFFFF"/>
-                </a:highlight>
-              </a:rPr>
-              <a:t>, </a:t>
-            </a:r>
-            <a:r>
-              <a:rPr lang="en-US" sz="2200" b="0" i="0" u="none" strike="noStrike" dirty="0">
-                <a:solidFill>
-                  <a:srgbClr val="2222EE"/>
-                </a:solidFill>
-                <a:effectLst/>
-                <a:highlight>
-                  <a:srgbClr val="FFFFFF"/>
-                </a:highlight>
-                <a:hlinkClick r:id="rId6" action="ppaction://hlinkfile"/>
-              </a:rPr>
-              <a:t>Section 7.8.2.1</a:t>
-            </a:r>
-            <a:r>
-              <a:rPr lang="en-US" sz="2200" b="0" i="0" u="none" strike="noStrike" dirty="0">
-                <a:solidFill>
-                  <a:srgbClr val="2222EE"/>
-                </a:solidFill>
-                <a:effectLst/>
-                <a:highlight>
-                  <a:srgbClr val="FFFFFF"/>
-                </a:highlight>
-              </a:rPr>
-              <a:t> </a:t>
-            </a:r>
-            <a:r>
-              <a:rPr lang="en-US" sz="2200" b="0" i="0" u="none" strike="noStrike" dirty="0">
-                <a:effectLst/>
-                <a:highlight>
-                  <a:srgbClr val="FFFFFF"/>
-                </a:highlight>
-              </a:rPr>
-              <a:t>(</a:t>
-            </a:r>
-            <a:r>
-              <a:rPr lang="en-US" sz="2200" dirty="0" err="1">
-                <a:highlight>
-                  <a:srgbClr val="FFFFFF"/>
-                </a:highlight>
-              </a:rPr>
-              <a:t>e</a:t>
-            </a:r>
-            <a:r>
-              <a:rPr lang="en-US" sz="2200" b="0" i="0" u="none" strike="noStrike" dirty="0" err="1">
-                <a:effectLst/>
-                <a:highlight>
-                  <a:srgbClr val="FFFFFF"/>
-                </a:highlight>
-              </a:rPr>
-              <a:t>Status</a:t>
-            </a:r>
-            <a:r>
-              <a:rPr lang="en-US" sz="2200" b="0" i="0" u="none" strike="noStrike" dirty="0">
-                <a:effectLst/>
-                <a:highlight>
-                  <a:srgbClr val="FFFFFF"/>
-                </a:highlight>
-              </a:rPr>
-              <a:t>)</a:t>
-            </a:r>
-            <a:r>
-              <a:rPr lang="en-US" sz="2200" b="0" i="0" dirty="0">
-                <a:solidFill>
-                  <a:srgbClr val="222222"/>
-                </a:solidFill>
-                <a:effectLst/>
-                <a:highlight>
-                  <a:srgbClr val="FFFFFF"/>
-                </a:highlight>
-              </a:rPr>
-              <a:t>, and </a:t>
-            </a:r>
-            <a:r>
-              <a:rPr lang="en-US" sz="2200" b="0" i="0" u="none" strike="noStrike" dirty="0">
-                <a:solidFill>
-                  <a:srgbClr val="2222EE"/>
-                </a:solidFill>
-                <a:effectLst/>
-                <a:highlight>
-                  <a:srgbClr val="FFFFFF"/>
-                </a:highlight>
-                <a:hlinkClick r:id="rId7" action="ppaction://hlinkfile"/>
-              </a:rPr>
-              <a:t>Section 7.11.2.1</a:t>
-            </a:r>
-            <a:r>
-              <a:rPr lang="en-US" sz="2200" b="0" i="0" u="none" strike="noStrike" dirty="0">
-                <a:solidFill>
-                  <a:srgbClr val="2222EE"/>
-                </a:solidFill>
-                <a:effectLst/>
-                <a:highlight>
-                  <a:srgbClr val="FFFFFF"/>
-                </a:highlight>
-              </a:rPr>
-              <a:t> </a:t>
-            </a:r>
-            <a:r>
-              <a:rPr lang="en-US" sz="2200" b="0" i="0" u="none" strike="noStrike" dirty="0">
-                <a:effectLst/>
-                <a:highlight>
-                  <a:srgbClr val="FFFFFF"/>
-                </a:highlight>
-              </a:rPr>
-              <a:t>(</a:t>
-            </a:r>
-            <a:r>
-              <a:rPr lang="en-US" sz="2200" b="0" i="0" u="none" strike="noStrike" dirty="0" err="1">
-                <a:effectLst/>
-                <a:highlight>
-                  <a:srgbClr val="FFFFFF"/>
-                </a:highlight>
-              </a:rPr>
-              <a:t>pStatus</a:t>
-            </a:r>
-            <a:r>
-              <a:rPr lang="en-US" sz="2200" b="0" i="0" u="none" strike="noStrike" dirty="0">
-                <a:effectLst/>
-                <a:highlight>
-                  <a:srgbClr val="FFFFFF"/>
-                </a:highlight>
-              </a:rPr>
-              <a:t>) to allows similar processing</a:t>
-            </a:r>
-            <a:r>
-              <a:rPr lang="en-US" sz="2200" b="0" i="0" dirty="0">
-                <a:solidFill>
-                  <a:srgbClr val="222222"/>
-                </a:solidFill>
-                <a:effectLst/>
-                <a:highlight>
-                  <a:srgbClr val="FFFFFF"/>
-                </a:highlight>
-              </a:rPr>
-              <a:t>.</a:t>
-            </a:r>
-            <a:endParaRPr lang="en-US" sz="2200" kern="100" dirty="0">
-              <a:cs typeface="Arial" panose="020B0604020202020204" pitchFamily="34" charset="0"/>
-            </a:endParaRPr>
-          </a:p>
-          <a:p>
-            <a:pPr lvl="1">
-              <a:lnSpc>
-                <a:spcPct val="100000"/>
-              </a:lnSpc>
-              <a:buSzPct val="80000"/>
-              <a:buFont typeface="Calibri" panose="020F0502020204030204" pitchFamily="34" charset="0"/>
-              <a:buChar char="–"/>
-            </a:pPr>
-            <a:endParaRPr lang="en-US" sz="2200" dirty="0"/>
+              <a:rPr lang="en-US" sz="2400" dirty="0"/>
+              <a:t>Updated RVR to contain </a:t>
+            </a:r>
+            <a:r>
+              <a:rPr lang="en-US" sz="2400" dirty="0" err="1"/>
+              <a:t>idevid</a:t>
+            </a:r>
+            <a:r>
+              <a:rPr lang="en-US" sz="2400" dirty="0"/>
+              <a:t>-issuer as described in RFC 8995 in Section 7.3.2</a:t>
+            </a:r>
           </a:p>
         </p:txBody>
       </p:sp>
@@ -5502,7 +5852,7 @@
             <a:fld id="{8C792E63-5F21-4F54-A864-D84D9F273FCA}" type="datetimeFigureOut">
               <a:rPr lang="en-US" smtClean="0"/>
               <a:pPr/>
-              <a:t>7/12/2024</a:t>
+              <a:t>7/16/2024</a:t>
             </a:fld>
             <a:endParaRPr lang="en-US" dirty="0"/>
           </a:p>
@@ -5643,7 +5993,7 @@
     </p:spTree>
     <p:extLst>
       <p:ext uri="{BB962C8B-B14F-4D97-AF65-F5344CB8AC3E}">
-        <p14:creationId xmlns:p14="http://schemas.microsoft.com/office/powerpoint/2010/main" val="708985953"/>
+        <p14:creationId xmlns:p14="http://schemas.microsoft.com/office/powerpoint/2010/main" val="255030257"/>
       </p:ext>
     </p:extLst>
   </p:cSld>
@@ -5695,15 +6045,22 @@
           <a:p>
             <a:r>
               <a:rPr lang="en-US" sz="3600" dirty="0"/>
-              <a:t>BRSKI-PRM </a:t>
+              <a:t>BRSKI-PRM</a:t>
             </a:r>
             <a:br>
               <a:rPr lang="en-US" sz="3600" dirty="0"/>
             </a:br>
             <a:r>
               <a:rPr lang="en-US" sz="3600" dirty="0"/>
-              <a:t>Status &amp; Next Steps</a:t>
-            </a:r>
+              <a:t>History of main changes 13</a:t>
+            </a:r>
+            <a:r>
+              <a:rPr lang="en-US" sz="3600" dirty="0">
+                <a:sym typeface="Wingdings" panose="05000000000000000000" pitchFamily="2" charset="2"/>
+              </a:rPr>
+              <a:t> 14</a:t>
+            </a:r>
+            <a:endParaRPr lang="en-US" sz="3600" dirty="0"/>
           </a:p>
         </p:txBody>
       </p:sp>
@@ -5725,8 +6082,8 @@
         </p:nvSpPr>
         <p:spPr>
           <a:xfrm>
-            <a:off x="701640" y="1794397"/>
-            <a:ext cx="10515600" cy="4467973"/>
+            <a:off x="687728" y="1856901"/>
+            <a:ext cx="11130024" cy="4542226"/>
           </a:xfrm>
         </p:spPr>
         <p:txBody>
@@ -5740,374 +6097,185 @@
                 <a:spcPct val="100000"/>
               </a:lnSpc>
               <a:spcBef>
+                <a:spcPts val="0"/>
+              </a:spcBef>
+              <a:spcAft>
                 <a:spcPts val="600"/>
-              </a:spcBef>
+              </a:spcAft>
               <a:buSzPct val="80000"/>
               <a:buFont typeface="Calibri" panose="020F0502020204030204" pitchFamily="34" charset="0"/>
               <a:buChar char="–"/>
             </a:pPr>
             <a:r>
-              <a:rPr lang="en-US" sz="2200" dirty="0">
-                <a:solidFill>
-                  <a:schemeClr val="bg1">
-                    <a:lumMod val="50000"/>
-                  </a:schemeClr>
-                </a:solidFill>
-              </a:rPr>
-              <a:t>WGLC before IETF 116 - DONE</a:t>
-            </a:r>
-          </a:p>
-          <a:p>
-            <a:pPr>
+              <a:rPr lang="en-US" sz="2400" dirty="0"/>
+              <a:t>Part 3 of Shepherd Review by Matthias Kovatsch led to the following main changes</a:t>
+            </a:r>
+          </a:p>
+          <a:p>
+            <a:pPr marL="530225" lvl="1">
               <a:lnSpc>
                 <a:spcPct val="100000"/>
               </a:lnSpc>
               <a:spcBef>
+                <a:spcPts val="0"/>
+              </a:spcBef>
+              <a:spcAft>
                 <a:spcPts val="600"/>
-              </a:spcBef>
+              </a:spcAft>
               <a:buSzPct val="80000"/>
               <a:buFont typeface="Calibri" panose="020F0502020204030204" pitchFamily="34" charset="0"/>
               <a:buChar char="–"/>
             </a:pPr>
             <a:r>
-              <a:rPr lang="en-US" sz="2200" dirty="0">
-                <a:solidFill>
-                  <a:schemeClr val="bg1">
-                    <a:lumMod val="50000"/>
-                  </a:schemeClr>
-                </a:solidFill>
+              <a:rPr lang="en-US" kern="100" dirty="0">
+                <a:cs typeface="Arial" panose="020B0604020202020204" pitchFamily="34" charset="0"/>
               </a:rPr>
-              <a:t>IOT DIR early review - DONE </a:t>
-            </a:r>
-          </a:p>
-          <a:p>
-            <a:pPr>
+              <a:t>Structural improvements of the document, terminology, and simplification</a:t>
+            </a:r>
+          </a:p>
+          <a:p>
+            <a:pPr marL="530225" lvl="1">
               <a:lnSpc>
                 <a:spcPct val="100000"/>
               </a:lnSpc>
               <a:spcBef>
+                <a:spcPts val="0"/>
+              </a:spcBef>
+              <a:spcAft>
                 <a:spcPts val="600"/>
-              </a:spcBef>
+              </a:spcAft>
               <a:buSzPct val="80000"/>
               <a:buFont typeface="Calibri" panose="020F0502020204030204" pitchFamily="34" charset="0"/>
               <a:buChar char="–"/>
             </a:pPr>
             <a:r>
-              <a:rPr lang="en-US" sz="2200" dirty="0">
-                <a:solidFill>
-                  <a:schemeClr val="bg1">
-                    <a:lumMod val="50000"/>
-                  </a:schemeClr>
-                </a:solidFill>
+              <a:rPr lang="en-US" kern="100" dirty="0">
+                <a:cs typeface="Arial" panose="020B0604020202020204" pitchFamily="34" charset="0"/>
               </a:rPr>
-              <a:t>SECDIR early review – DONE</a:t>
-            </a:r>
-          </a:p>
-          <a:p>
-            <a:pPr>
+              <a:t>New section 6.4 in the architecture overview to outline MASA requirements when supporting BRSKI-PRM similar to existing description for registrar and pledge</a:t>
+            </a:r>
+          </a:p>
+          <a:p>
+            <a:pPr marL="530225" lvl="1">
               <a:lnSpc>
                 <a:spcPct val="100000"/>
               </a:lnSpc>
               <a:spcBef>
+                <a:spcPts val="0"/>
+              </a:spcBef>
+              <a:spcAft>
                 <a:spcPts val="600"/>
-              </a:spcBef>
+              </a:spcAft>
               <a:buSzPct val="80000"/>
               <a:buFont typeface="Calibri" panose="020F0502020204030204" pitchFamily="34" charset="0"/>
               <a:buChar char="–"/>
             </a:pPr>
             <a:r>
-              <a:rPr lang="en-GB" sz="2200" dirty="0">
-                <a:solidFill>
-                  <a:schemeClr val="bg1">
-                    <a:lumMod val="50000"/>
-                  </a:schemeClr>
-                </a:solidFill>
+              <a:rPr lang="en-US" kern="100" dirty="0">
+                <a:cs typeface="Arial" panose="020B0604020202020204" pitchFamily="34" charset="0"/>
               </a:rPr>
-              <a:t>YANGDOCTORS  early review </a:t>
-            </a:r>
-            <a:r>
-              <a:rPr lang="en-US" sz="2200" dirty="0">
-                <a:solidFill>
-                  <a:schemeClr val="bg1">
-                    <a:lumMod val="50000"/>
-                  </a:schemeClr>
-                </a:solidFill>
-              </a:rPr>
-              <a:t>– DONE</a:t>
-            </a:r>
-          </a:p>
-          <a:p>
-            <a:pPr>
+              <a:t>Section 7 restructured to describe protocol steps following a general approach: Overview, Request Artifact, Response Artifact (resulted in shifting existing text)</a:t>
+            </a:r>
+          </a:p>
+          <a:p>
+            <a:pPr marL="530225" lvl="1">
               <a:lnSpc>
                 <a:spcPct val="100000"/>
               </a:lnSpc>
               <a:spcBef>
+                <a:spcPts val="0"/>
+              </a:spcBef>
+              <a:spcAft>
                 <a:spcPts val="600"/>
-              </a:spcBef>
+              </a:spcAft>
               <a:buSzPct val="80000"/>
               <a:buFont typeface="Calibri" panose="020F0502020204030204" pitchFamily="34" charset="0"/>
               <a:buChar char="–"/>
             </a:pPr>
             <a:r>
-              <a:rPr lang="en-GB" sz="2200" dirty="0">
-                <a:solidFill>
-                  <a:schemeClr val="bg1">
-                    <a:lumMod val="50000"/>
-                  </a:schemeClr>
-                </a:solidFill>
+              <a:rPr lang="en-US" kern="100" dirty="0">
+                <a:cs typeface="Arial" panose="020B0604020202020204" pitchFamily="34" charset="0"/>
               </a:rPr>
-              <a:t>Shepherd review and writeup </a:t>
-            </a:r>
-            <a:r>
-              <a:rPr lang="en-US" sz="2200" dirty="0">
-                <a:solidFill>
-                  <a:schemeClr val="bg1">
-                    <a:lumMod val="50000"/>
-                  </a:schemeClr>
-                </a:solidFill>
+              <a:t>Alignment of pledge status response data across Section 7.6.2.1 (</a:t>
+            </a:r>
+            <a:r>
+              <a:rPr lang="en-US" kern="100" dirty="0" err="1">
+                <a:cs typeface="Arial" panose="020B0604020202020204" pitchFamily="34" charset="0"/>
               </a:rPr>
-              <a:t>– DONE</a:t>
-            </a:r>
-          </a:p>
-          <a:p>
-            <a:pPr>
+              <a:t>vStatus</a:t>
+            </a:r>
+            <a:r>
+              <a:rPr lang="en-US" kern="100" dirty="0">
+                <a:cs typeface="Arial" panose="020B0604020202020204" pitchFamily="34" charset="0"/>
+              </a:rPr>
+              <a:t>), Section 7.8.2.1 (</a:t>
+            </a:r>
+            <a:r>
+              <a:rPr lang="en-US" kern="100" dirty="0" err="1">
+                <a:cs typeface="Arial" panose="020B0604020202020204" pitchFamily="34" charset="0"/>
+              </a:rPr>
+              <a:t>eStatus</a:t>
+            </a:r>
+            <a:r>
+              <a:rPr lang="en-US" kern="100" dirty="0">
+                <a:cs typeface="Arial" panose="020B0604020202020204" pitchFamily="34" charset="0"/>
+              </a:rPr>
+              <a:t>), and Section 7.11.2.1 (</a:t>
+            </a:r>
+            <a:r>
+              <a:rPr lang="en-US" kern="100" dirty="0" err="1">
+                <a:cs typeface="Arial" panose="020B0604020202020204" pitchFamily="34" charset="0"/>
+              </a:rPr>
+              <a:t>pStatus</a:t>
+            </a:r>
+            <a:r>
+              <a:rPr lang="en-US" kern="100" dirty="0">
+                <a:cs typeface="Arial" panose="020B0604020202020204" pitchFamily="34" charset="0"/>
+              </a:rPr>
+              <a:t>) to allows similar processing.</a:t>
+            </a:r>
+          </a:p>
+          <a:p>
+            <a:pPr marL="530225" lvl="1">
               <a:lnSpc>
                 <a:spcPct val="100000"/>
               </a:lnSpc>
               <a:spcBef>
+                <a:spcPts val="0"/>
+              </a:spcBef>
+              <a:spcAft>
                 <a:spcPts val="600"/>
-              </a:spcBef>
+              </a:spcAft>
               <a:buSzPct val="80000"/>
               <a:buFont typeface="Calibri" panose="020F0502020204030204" pitchFamily="34" charset="0"/>
               <a:buChar char="–"/>
             </a:pPr>
-            <a:endParaRPr lang="en-US" sz="2200" dirty="0">
-              <a:solidFill>
-                <a:schemeClr val="bg1">
-                  <a:lumMod val="50000"/>
-                </a:schemeClr>
-              </a:solidFill>
-            </a:endParaRPr>
-          </a:p>
-          <a:p>
-            <a:pPr>
+            <a:r>
+              <a:rPr lang="en-US" kern="100" dirty="0">
+                <a:cs typeface="Arial" panose="020B0604020202020204" pitchFamily="34" charset="0"/>
+              </a:rPr>
+              <a:t>Inclusion of new section on logging hints Section 8 to give recommendations on which events to be logged for auditing</a:t>
+            </a:r>
+          </a:p>
+          <a:p>
+            <a:pPr lvl="1">
               <a:lnSpc>
                 <a:spcPct val="100000"/>
               </a:lnSpc>
-              <a:spcBef>
-                <a:spcPts val="600"/>
-              </a:spcBef>
               <a:buSzPct val="80000"/>
               <a:buFont typeface="Calibri" panose="020F0502020204030204" pitchFamily="34" charset="0"/>
               <a:buChar char="–"/>
             </a:pPr>
-            <a:r>
-              <a:rPr lang="en-US" sz="2200" dirty="0"/>
-              <a:t>Ready for AD review </a:t>
-            </a:r>
-          </a:p>
-          <a:p>
-            <a:pPr>
-              <a:lnSpc>
-                <a:spcPct val="100000"/>
-              </a:lnSpc>
-              <a:spcBef>
-                <a:spcPts val="600"/>
-              </a:spcBef>
-              <a:buSzPct val="80000"/>
-              <a:buFont typeface="Calibri" panose="020F0502020204030204" pitchFamily="34" charset="0"/>
-              <a:buChar char="–"/>
-            </a:pPr>
-            <a:endParaRPr lang="en-US" sz="2200" dirty="0"/>
-          </a:p>
-          <a:p>
-            <a:pPr>
-              <a:lnSpc>
-                <a:spcPct val="100000"/>
-              </a:lnSpc>
-              <a:spcBef>
-                <a:spcPts val="600"/>
-              </a:spcBef>
-              <a:buSzPct val="80000"/>
-              <a:buFont typeface="Calibri" panose="020F0502020204030204" pitchFamily="34" charset="0"/>
-              <a:buChar char="–"/>
-            </a:pPr>
-            <a:r>
-              <a:rPr lang="en-US" sz="2200" dirty="0"/>
-              <a:t>Further Interop testing with other parties welcome </a:t>
-            </a:r>
-            <a:r>
-              <a:rPr lang="en-US" sz="2200" dirty="0">
-                <a:sym typeface="Wingdings" panose="05000000000000000000" pitchFamily="2" charset="2"/>
-              </a:rPr>
-              <a:t>,</a:t>
-            </a:r>
-            <a:br>
-              <a:rPr lang="en-US" sz="2200" dirty="0">
-                <a:sym typeface="Wingdings" panose="05000000000000000000" pitchFamily="2" charset="2"/>
-              </a:rPr>
-            </a:br>
-            <a:r>
-              <a:rPr lang="en-US" sz="2200" dirty="0">
-                <a:sym typeface="Wingdings" panose="05000000000000000000" pitchFamily="2" charset="2"/>
-              </a:rPr>
-              <a:t>PoC implementations of all components available, please get in touch</a:t>
-            </a:r>
-          </a:p>
-          <a:p>
-            <a:pPr>
-              <a:lnSpc>
-                <a:spcPct val="100000"/>
-              </a:lnSpc>
-              <a:spcBef>
-                <a:spcPts val="600"/>
-              </a:spcBef>
-              <a:buSzPct val="80000"/>
-              <a:buFont typeface="Calibri" panose="020F0502020204030204" pitchFamily="34" charset="0"/>
-              <a:buChar char="–"/>
-            </a:pPr>
-            <a:endParaRPr lang="en-US" sz="2200" dirty="0"/>
+            <a:endParaRPr lang="en-US" dirty="0"/>
           </a:p>
         </p:txBody>
       </p:sp>
       <p:sp>
         <p:nvSpPr>
-          <p:cNvPr id="5" name="Slide Number Placeholder 5">
+          <p:cNvPr id="4" name="Date Placeholder 3">
             <a:extLst>
               <a:ext uri="{FF2B5EF4-FFF2-40B4-BE49-F238E27FC236}">
-                <a16:creationId xmlns:a16="http://schemas.microsoft.com/office/drawing/2014/main" id="{1881EAE9-7681-4485-81EC-EAB026A81A3C}"/>
-              </a:ext>
-            </a:extLst>
-          </p:cNvPr>
-          <p:cNvSpPr txBox="1">
-            <a:spLocks/>
-          </p:cNvSpPr>
-          <p:nvPr/>
-        </p:nvSpPr>
-        <p:spPr>
-          <a:xfrm>
-            <a:off x="8763000" y="6508750"/>
-            <a:ext cx="2743200" cy="365125"/>
-          </a:xfrm>
-          <a:prstGeom prst="rect">
-            <a:avLst/>
-          </a:prstGeom>
-        </p:spPr>
-        <p:txBody>
-          <a:bodyPr vert="horz" lIns="91440" tIns="45720" rIns="91440" bIns="45720" rtlCol="0" anchor="ctr"/>
-          <a:lstStyle>
-            <a:defPPr>
-              <a:defRPr lang="de-DE"/>
-            </a:defPPr>
-            <a:lvl1pPr marL="0" algn="r" defTabSz="914400" rtl="0" eaLnBrk="1" latinLnBrk="0" hangingPunct="1">
-              <a:defRPr sz="1200" kern="1200">
-                <a:solidFill>
-                  <a:schemeClr val="tx1">
-                    <a:tint val="75000"/>
-                  </a:schemeClr>
-                </a:solidFill>
-                <a:latin typeface="+mn-lt"/>
-                <a:ea typeface="+mn-ea"/>
-                <a:cs typeface="+mn-cs"/>
-              </a:defRPr>
-            </a:lvl1pPr>
-            <a:lvl2pPr marL="457200" algn="l" defTabSz="914400" rtl="0" eaLnBrk="1" latinLnBrk="0" hangingPunct="1">
-              <a:defRPr sz="1800" kern="1200">
-                <a:solidFill>
-                  <a:schemeClr val="tx1"/>
-                </a:solidFill>
-                <a:latin typeface="+mn-lt"/>
-                <a:ea typeface="+mn-ea"/>
-                <a:cs typeface="+mn-cs"/>
-              </a:defRPr>
-            </a:lvl2pPr>
-            <a:lvl3pPr marL="914400" algn="l" defTabSz="914400" rtl="0" eaLnBrk="1" latinLnBrk="0" hangingPunct="1">
-              <a:defRPr sz="1800" kern="1200">
-                <a:solidFill>
-                  <a:schemeClr val="tx1"/>
-                </a:solidFill>
-                <a:latin typeface="+mn-lt"/>
-                <a:ea typeface="+mn-ea"/>
-                <a:cs typeface="+mn-cs"/>
-              </a:defRPr>
-            </a:lvl3pPr>
-            <a:lvl4pPr marL="1371600" algn="l" defTabSz="914400" rtl="0" eaLnBrk="1" latinLnBrk="0" hangingPunct="1">
-              <a:defRPr sz="1800" kern="1200">
-                <a:solidFill>
-                  <a:schemeClr val="tx1"/>
-                </a:solidFill>
-                <a:latin typeface="+mn-lt"/>
-                <a:ea typeface="+mn-ea"/>
-                <a:cs typeface="+mn-cs"/>
-              </a:defRPr>
-            </a:lvl4pPr>
-            <a:lvl5pPr marL="1828800" algn="l" defTabSz="914400" rtl="0" eaLnBrk="1" latinLnBrk="0" hangingPunct="1">
-              <a:defRPr sz="1800" kern="1200">
-                <a:solidFill>
-                  <a:schemeClr val="tx1"/>
-                </a:solidFill>
-                <a:latin typeface="+mn-lt"/>
-                <a:ea typeface="+mn-ea"/>
-                <a:cs typeface="+mn-cs"/>
-              </a:defRPr>
-            </a:lvl5pPr>
-            <a:lvl6pPr marL="2286000" algn="l" defTabSz="914400" rtl="0" eaLnBrk="1" latinLnBrk="0" hangingPunct="1">
-              <a:defRPr sz="1800" kern="1200">
-                <a:solidFill>
-                  <a:schemeClr val="tx1"/>
-                </a:solidFill>
-                <a:latin typeface="+mn-lt"/>
-                <a:ea typeface="+mn-ea"/>
-                <a:cs typeface="+mn-cs"/>
-              </a:defRPr>
-            </a:lvl6pPr>
-            <a:lvl7pPr marL="2743200" algn="l" defTabSz="914400" rtl="0" eaLnBrk="1" latinLnBrk="0" hangingPunct="1">
-              <a:defRPr sz="1800" kern="1200">
-                <a:solidFill>
-                  <a:schemeClr val="tx1"/>
-                </a:solidFill>
-                <a:latin typeface="+mn-lt"/>
-                <a:ea typeface="+mn-ea"/>
-                <a:cs typeface="+mn-cs"/>
-              </a:defRPr>
-            </a:lvl7pPr>
-            <a:lvl8pPr marL="3200400" algn="l" defTabSz="914400" rtl="0" eaLnBrk="1" latinLnBrk="0" hangingPunct="1">
-              <a:defRPr sz="1800" kern="1200">
-                <a:solidFill>
-                  <a:schemeClr val="tx1"/>
-                </a:solidFill>
-                <a:latin typeface="+mn-lt"/>
-                <a:ea typeface="+mn-ea"/>
-                <a:cs typeface="+mn-cs"/>
-              </a:defRPr>
-            </a:lvl8pPr>
-            <a:lvl9pPr marL="3657600" algn="l" defTabSz="914400" rtl="0" eaLnBrk="1" latinLnBrk="0" hangingPunct="1">
-              <a:defRPr sz="1800" kern="1200">
-                <a:solidFill>
-                  <a:schemeClr val="tx1"/>
-                </a:solidFill>
-                <a:latin typeface="+mn-lt"/>
-                <a:ea typeface="+mn-ea"/>
-                <a:cs typeface="+mn-cs"/>
-              </a:defRPr>
-            </a:lvl9pPr>
-          </a:lstStyle>
-          <a:p>
-            <a:fld id="{104F53CC-0028-4916-8B93-0EBFFB2C7AAD}" type="slidenum">
-              <a:rPr lang="en-US" smtClean="0"/>
-              <a:pPr/>
-              <a:t>3</a:t>
-            </a:fld>
-            <a:endParaRPr lang="en-US" dirty="0"/>
-          </a:p>
-        </p:txBody>
-      </p:sp>
-      <p:sp>
-        <p:nvSpPr>
-          <p:cNvPr id="6" name="Date Placeholder 3">
-            <a:extLst>
-              <a:ext uri="{FF2B5EF4-FFF2-40B4-BE49-F238E27FC236}">
-                <a16:creationId xmlns:a16="http://schemas.microsoft.com/office/drawing/2014/main" id="{28893308-8041-5B42-F817-60188F19B021}"/>
+                <a16:creationId xmlns:a16="http://schemas.microsoft.com/office/drawing/2014/main" id="{603A4F89-D37F-47CD-A5DD-8B1F7476D4B1}"/>
               </a:ext>
             </a:extLst>
           </p:cNvPr>
@@ -6228,7 +6396,139 @@
             <a:fld id="{8C792E63-5F21-4F54-A864-D84D9F273FCA}" type="datetimeFigureOut">
               <a:rPr lang="en-US" smtClean="0"/>
               <a:pPr/>
-              <a:t>7/12/2024</a:t>
+              <a:t>7/16/2024</a:t>
+            </a:fld>
+            <a:endParaRPr lang="en-US" dirty="0"/>
+          </a:p>
+        </p:txBody>
+      </p:sp>
+      <p:sp>
+        <p:nvSpPr>
+          <p:cNvPr id="5" name="Slide Number Placeholder 5">
+            <a:extLst>
+              <a:ext uri="{FF2B5EF4-FFF2-40B4-BE49-F238E27FC236}">
+                <a16:creationId xmlns:a16="http://schemas.microsoft.com/office/drawing/2014/main" id="{EA009C1A-0CD0-4840-856B-B85603FEF6D0}"/>
+              </a:ext>
+            </a:extLst>
+          </p:cNvPr>
+          <p:cNvSpPr txBox="1">
+            <a:spLocks/>
+          </p:cNvSpPr>
+          <p:nvPr/>
+        </p:nvSpPr>
+        <p:spPr>
+          <a:xfrm>
+            <a:off x="8610600" y="6356350"/>
+            <a:ext cx="2743200" cy="365125"/>
+          </a:xfrm>
+          <a:prstGeom prst="rect">
+            <a:avLst/>
+          </a:prstGeom>
+        </p:spPr>
+        <p:txBody>
+          <a:bodyPr vert="horz" lIns="91440" tIns="45720" rIns="91440" bIns="45720" rtlCol="0" anchor="ctr"/>
+          <a:lstStyle>
+            <a:defPPr>
+              <a:defRPr lang="de-DE"/>
+            </a:defPPr>
+            <a:lvl1pPr marL="0" algn="r" defTabSz="914400" rtl="0" eaLnBrk="1" latinLnBrk="0" hangingPunct="1">
+              <a:defRPr sz="1200" kern="1200">
+                <a:solidFill>
+                  <a:schemeClr val="tx1">
+                    <a:tint val="75000"/>
+                  </a:schemeClr>
+                </a:solidFill>
+                <a:latin typeface="+mn-lt"/>
+                <a:ea typeface="+mn-ea"/>
+                <a:cs typeface="+mn-cs"/>
+              </a:defRPr>
+            </a:lvl1pPr>
+            <a:lvl2pPr marL="457200" algn="l" defTabSz="914400" rtl="0" eaLnBrk="1" latinLnBrk="0" hangingPunct="1">
+              <a:defRPr sz="1800" kern="1200">
+                <a:solidFill>
+                  <a:schemeClr val="tx1"/>
+                </a:solidFill>
+                <a:latin typeface="+mn-lt"/>
+                <a:ea typeface="+mn-ea"/>
+                <a:cs typeface="+mn-cs"/>
+              </a:defRPr>
+            </a:lvl2pPr>
+            <a:lvl3pPr marL="914400" algn="l" defTabSz="914400" rtl="0" eaLnBrk="1" latinLnBrk="0" hangingPunct="1">
+              <a:defRPr sz="1800" kern="1200">
+                <a:solidFill>
+                  <a:schemeClr val="tx1"/>
+                </a:solidFill>
+                <a:latin typeface="+mn-lt"/>
+                <a:ea typeface="+mn-ea"/>
+                <a:cs typeface="+mn-cs"/>
+              </a:defRPr>
+            </a:lvl3pPr>
+            <a:lvl4pPr marL="1371600" algn="l" defTabSz="914400" rtl="0" eaLnBrk="1" latinLnBrk="0" hangingPunct="1">
+              <a:defRPr sz="1800" kern="1200">
+                <a:solidFill>
+                  <a:schemeClr val="tx1"/>
+                </a:solidFill>
+                <a:latin typeface="+mn-lt"/>
+                <a:ea typeface="+mn-ea"/>
+                <a:cs typeface="+mn-cs"/>
+              </a:defRPr>
+            </a:lvl4pPr>
+            <a:lvl5pPr marL="1828800" algn="l" defTabSz="914400" rtl="0" eaLnBrk="1" latinLnBrk="0" hangingPunct="1">
+              <a:defRPr sz="1800" kern="1200">
+                <a:solidFill>
+                  <a:schemeClr val="tx1"/>
+                </a:solidFill>
+                <a:latin typeface="+mn-lt"/>
+                <a:ea typeface="+mn-ea"/>
+                <a:cs typeface="+mn-cs"/>
+              </a:defRPr>
+            </a:lvl5pPr>
+            <a:lvl6pPr marL="2286000" algn="l" defTabSz="914400" rtl="0" eaLnBrk="1" latinLnBrk="0" hangingPunct="1">
+              <a:defRPr sz="1800" kern="1200">
+                <a:solidFill>
+                  <a:schemeClr val="tx1"/>
+                </a:solidFill>
+                <a:latin typeface="+mn-lt"/>
+                <a:ea typeface="+mn-ea"/>
+                <a:cs typeface="+mn-cs"/>
+              </a:defRPr>
+            </a:lvl6pPr>
+            <a:lvl7pPr marL="2743200" algn="l" defTabSz="914400" rtl="0" eaLnBrk="1" latinLnBrk="0" hangingPunct="1">
+              <a:defRPr sz="1800" kern="1200">
+                <a:solidFill>
+                  <a:schemeClr val="tx1"/>
+                </a:solidFill>
+                <a:latin typeface="+mn-lt"/>
+                <a:ea typeface="+mn-ea"/>
+                <a:cs typeface="+mn-cs"/>
+              </a:defRPr>
+            </a:lvl7pPr>
+            <a:lvl8pPr marL="3200400" algn="l" defTabSz="914400" rtl="0" eaLnBrk="1" latinLnBrk="0" hangingPunct="1">
+              <a:defRPr sz="1800" kern="1200">
+                <a:solidFill>
+                  <a:schemeClr val="tx1"/>
+                </a:solidFill>
+                <a:latin typeface="+mn-lt"/>
+                <a:ea typeface="+mn-ea"/>
+                <a:cs typeface="+mn-cs"/>
+              </a:defRPr>
+            </a:lvl8pPr>
+            <a:lvl9pPr marL="3657600" algn="l" defTabSz="914400" rtl="0" eaLnBrk="1" latinLnBrk="0" hangingPunct="1">
+              <a:defRPr sz="1800" kern="1200">
+                <a:solidFill>
+                  <a:schemeClr val="tx1"/>
+                </a:solidFill>
+                <a:latin typeface="+mn-lt"/>
+                <a:ea typeface="+mn-ea"/>
+                <a:cs typeface="+mn-cs"/>
+              </a:defRPr>
+            </a:lvl9pPr>
+          </a:lstStyle>
+          <a:p>
+            <a:fld id="{104F53CC-0028-4916-8B93-0EBFFB2C7AAD}" type="slidenum">
+              <a:rPr lang="en-US" smtClean="0"/>
+              <a:pPr/>
+              <a:t>3</a:t>
             </a:fld>
             <a:endParaRPr lang="en-US" dirty="0"/>
           </a:p>
@@ -6237,7 +6537,7 @@
     </p:spTree>
     <p:extLst>
       <p:ext uri="{BB962C8B-B14F-4D97-AF65-F5344CB8AC3E}">
-        <p14:creationId xmlns:p14="http://schemas.microsoft.com/office/powerpoint/2010/main" val="2975318478"/>
+        <p14:creationId xmlns:p14="http://schemas.microsoft.com/office/powerpoint/2010/main" val="895308280"/>
       </p:ext>
     </p:extLst>
   </p:cSld>
@@ -6289,12 +6589,278 @@
           <a:p>
             <a:r>
               <a:rPr lang="en-US" sz="3600" dirty="0"/>
-              <a:t>Backup: BRSKI-PRM – Abstract Protocol Overview</a:t>
+              <a:t>BRSKI-PRM </a:t>
             </a:r>
             <a:br>
               <a:rPr lang="en-US" sz="3600" dirty="0"/>
             </a:br>
-            <a:endParaRPr lang="en-US" sz="3600" dirty="0"/>
+            <a:r>
+              <a:rPr lang="en-US" sz="3600" dirty="0"/>
+              <a:t>Status &amp; Next Steps</a:t>
+            </a:r>
+          </a:p>
+        </p:txBody>
+      </p:sp>
+      <p:sp>
+        <p:nvSpPr>
+          <p:cNvPr id="3" name="Content Placeholder 2">
+            <a:extLst>
+              <a:ext uri="{FF2B5EF4-FFF2-40B4-BE49-F238E27FC236}">
+                <a16:creationId xmlns:a16="http://schemas.microsoft.com/office/drawing/2014/main" id="{A9776AB7-EF6B-4831-BA5E-A2298E1B08F8}"/>
+              </a:ext>
+            </a:extLst>
+          </p:cNvPr>
+          <p:cNvSpPr>
+            <a:spLocks noGrp="1"/>
+          </p:cNvSpPr>
+          <p:nvPr>
+            <p:ph idx="1"/>
+          </p:nvPr>
+        </p:nvSpPr>
+        <p:spPr>
+          <a:xfrm>
+            <a:off x="701640" y="1794397"/>
+            <a:ext cx="10515600" cy="4467973"/>
+          </a:xfrm>
+        </p:spPr>
+        <p:txBody>
+          <a:bodyPr>
+            <a:noAutofit/>
+          </a:bodyPr>
+          <a:lstStyle/>
+          <a:p>
+            <a:pPr>
+              <a:lnSpc>
+                <a:spcPct val="100000"/>
+              </a:lnSpc>
+              <a:spcBef>
+                <a:spcPts val="600"/>
+              </a:spcBef>
+              <a:buSzPct val="80000"/>
+              <a:buFont typeface="Calibri" panose="020F0502020204030204" pitchFamily="34" charset="0"/>
+              <a:buChar char="–"/>
+            </a:pPr>
+            <a:r>
+              <a:rPr lang="en-US" sz="2400" dirty="0">
+                <a:solidFill>
+                  <a:schemeClr val="bg1">
+                    <a:lumMod val="50000"/>
+                  </a:schemeClr>
+                </a:solidFill>
+              </a:rPr>
+              <a:t>WGLC before IETF 116 - DONE</a:t>
+            </a:r>
+          </a:p>
+          <a:p>
+            <a:pPr>
+              <a:lnSpc>
+                <a:spcPct val="100000"/>
+              </a:lnSpc>
+              <a:spcBef>
+                <a:spcPts val="600"/>
+              </a:spcBef>
+              <a:buSzPct val="80000"/>
+              <a:buFont typeface="Calibri" panose="020F0502020204030204" pitchFamily="34" charset="0"/>
+              <a:buChar char="–"/>
+            </a:pPr>
+            <a:r>
+              <a:rPr lang="en-US" sz="2400" dirty="0">
+                <a:solidFill>
+                  <a:schemeClr val="bg1">
+                    <a:lumMod val="50000"/>
+                  </a:schemeClr>
+                </a:solidFill>
+              </a:rPr>
+              <a:t>IOT DIR early review - DONE </a:t>
+            </a:r>
+          </a:p>
+          <a:p>
+            <a:pPr>
+              <a:lnSpc>
+                <a:spcPct val="100000"/>
+              </a:lnSpc>
+              <a:spcBef>
+                <a:spcPts val="600"/>
+              </a:spcBef>
+              <a:buSzPct val="80000"/>
+              <a:buFont typeface="Calibri" panose="020F0502020204030204" pitchFamily="34" charset="0"/>
+              <a:buChar char="–"/>
+            </a:pPr>
+            <a:r>
+              <a:rPr lang="en-US" sz="2400" dirty="0">
+                <a:solidFill>
+                  <a:schemeClr val="bg1">
+                    <a:lumMod val="50000"/>
+                  </a:schemeClr>
+                </a:solidFill>
+              </a:rPr>
+              <a:t>SECDIR early review – DONE</a:t>
+            </a:r>
+          </a:p>
+          <a:p>
+            <a:pPr>
+              <a:lnSpc>
+                <a:spcPct val="100000"/>
+              </a:lnSpc>
+              <a:spcBef>
+                <a:spcPts val="600"/>
+              </a:spcBef>
+              <a:buSzPct val="80000"/>
+              <a:buFont typeface="Calibri" panose="020F0502020204030204" pitchFamily="34" charset="0"/>
+              <a:buChar char="–"/>
+            </a:pPr>
+            <a:r>
+              <a:rPr lang="en-GB" sz="2400" dirty="0">
+                <a:solidFill>
+                  <a:schemeClr val="bg1">
+                    <a:lumMod val="50000"/>
+                  </a:schemeClr>
+                </a:solidFill>
+              </a:rPr>
+              <a:t>YANGDOCTORS  early review </a:t>
+            </a:r>
+            <a:r>
+              <a:rPr lang="en-US" sz="2400" dirty="0">
+                <a:solidFill>
+                  <a:schemeClr val="bg1">
+                    <a:lumMod val="50000"/>
+                  </a:schemeClr>
+                </a:solidFill>
+              </a:rPr>
+              <a:t>– DONE</a:t>
+            </a:r>
+          </a:p>
+          <a:p>
+            <a:pPr>
+              <a:lnSpc>
+                <a:spcPct val="100000"/>
+              </a:lnSpc>
+              <a:spcBef>
+                <a:spcPts val="600"/>
+              </a:spcBef>
+              <a:buSzPct val="80000"/>
+              <a:buFont typeface="Calibri" panose="020F0502020204030204" pitchFamily="34" charset="0"/>
+              <a:buChar char="–"/>
+            </a:pPr>
+            <a:r>
+              <a:rPr lang="en-GB" sz="2400" dirty="0">
+                <a:solidFill>
+                  <a:schemeClr val="bg1">
+                    <a:lumMod val="50000"/>
+                  </a:schemeClr>
+                </a:solidFill>
+              </a:rPr>
+              <a:t>Shepherd review and writeup </a:t>
+            </a:r>
+            <a:r>
+              <a:rPr lang="en-US" sz="2400" dirty="0">
+                <a:solidFill>
+                  <a:schemeClr val="bg1">
+                    <a:lumMod val="50000"/>
+                  </a:schemeClr>
+                </a:solidFill>
+              </a:rPr>
+              <a:t>– DONE</a:t>
+            </a:r>
+          </a:p>
+          <a:p>
+            <a:pPr>
+              <a:lnSpc>
+                <a:spcPct val="100000"/>
+              </a:lnSpc>
+              <a:spcBef>
+                <a:spcPts val="600"/>
+              </a:spcBef>
+              <a:buSzPct val="80000"/>
+              <a:buFont typeface="Calibri" panose="020F0502020204030204" pitchFamily="34" charset="0"/>
+              <a:buChar char="–"/>
+            </a:pPr>
+            <a:endParaRPr lang="en-US" sz="2400" dirty="0">
+              <a:solidFill>
+                <a:schemeClr val="bg1">
+                  <a:lumMod val="50000"/>
+                </a:schemeClr>
+              </a:solidFill>
+            </a:endParaRPr>
+          </a:p>
+          <a:p>
+            <a:pPr>
+              <a:lnSpc>
+                <a:spcPct val="100000"/>
+              </a:lnSpc>
+              <a:spcBef>
+                <a:spcPts val="600"/>
+              </a:spcBef>
+              <a:buSzPct val="80000"/>
+              <a:buFont typeface="Calibri" panose="020F0502020204030204" pitchFamily="34" charset="0"/>
+              <a:buChar char="–"/>
+            </a:pPr>
+            <a:r>
+              <a:rPr lang="en-US" sz="2400" dirty="0"/>
+              <a:t>Ready for AD review </a:t>
+            </a:r>
+          </a:p>
+          <a:p>
+            <a:pPr>
+              <a:lnSpc>
+                <a:spcPct val="100000"/>
+              </a:lnSpc>
+              <a:spcBef>
+                <a:spcPts val="600"/>
+              </a:spcBef>
+              <a:buSzPct val="80000"/>
+              <a:buFont typeface="Calibri" panose="020F0502020204030204" pitchFamily="34" charset="0"/>
+              <a:buChar char="–"/>
+            </a:pPr>
+            <a:endParaRPr lang="en-US" sz="2400" dirty="0"/>
+          </a:p>
+          <a:p>
+            <a:pPr>
+              <a:lnSpc>
+                <a:spcPct val="100000"/>
+              </a:lnSpc>
+              <a:spcBef>
+                <a:spcPts val="600"/>
+              </a:spcBef>
+              <a:buSzPct val="80000"/>
+              <a:buFont typeface="Calibri" panose="020F0502020204030204" pitchFamily="34" charset="0"/>
+              <a:buChar char="–"/>
+            </a:pPr>
+            <a:r>
+              <a:rPr lang="en-US" sz="2400" dirty="0"/>
+              <a:t>Further Interop testing with other parties welcome </a:t>
+            </a:r>
+            <a:r>
+              <a:rPr lang="en-US" sz="2400" dirty="0">
+                <a:sym typeface="Wingdings" panose="05000000000000000000" pitchFamily="2" charset="2"/>
+              </a:rPr>
+              <a:t>,</a:t>
+            </a:r>
+            <a:br>
+              <a:rPr lang="en-US" sz="2400" dirty="0">
+                <a:sym typeface="Wingdings" panose="05000000000000000000" pitchFamily="2" charset="2"/>
+              </a:rPr>
+            </a:br>
+            <a:r>
+              <a:rPr lang="en-US" sz="2400" dirty="0">
+                <a:sym typeface="Wingdings" panose="05000000000000000000" pitchFamily="2" charset="2"/>
+              </a:rPr>
+              <a:t>PoC implementations of all components available, please get in touch</a:t>
+            </a:r>
+          </a:p>
+          <a:p>
+            <a:pPr>
+              <a:lnSpc>
+                <a:spcPct val="100000"/>
+              </a:lnSpc>
+              <a:spcBef>
+                <a:spcPts val="600"/>
+              </a:spcBef>
+              <a:buSzPct val="80000"/>
+              <a:buFont typeface="Calibri" panose="020F0502020204030204" pitchFamily="34" charset="0"/>
+              <a:buChar char="–"/>
+            </a:pPr>
+            <a:endParaRPr lang="en-US" sz="2400" dirty="0"/>
           </a:p>
         </p:txBody>
       </p:sp>
@@ -6425,6 +6991,832 @@
               <a:rPr lang="en-US" smtClean="0"/>
               <a:pPr/>
               <a:t>4</a:t>
+            </a:fld>
+            <a:endParaRPr lang="en-US" dirty="0"/>
+          </a:p>
+        </p:txBody>
+      </p:sp>
+      <p:sp>
+        <p:nvSpPr>
+          <p:cNvPr id="6" name="Date Placeholder 3">
+            <a:extLst>
+              <a:ext uri="{FF2B5EF4-FFF2-40B4-BE49-F238E27FC236}">
+                <a16:creationId xmlns:a16="http://schemas.microsoft.com/office/drawing/2014/main" id="{28893308-8041-5B42-F817-60188F19B021}"/>
+              </a:ext>
+            </a:extLst>
+          </p:cNvPr>
+          <p:cNvSpPr txBox="1">
+            <a:spLocks/>
+          </p:cNvSpPr>
+          <p:nvPr/>
+        </p:nvSpPr>
+        <p:spPr>
+          <a:xfrm>
+            <a:off x="838200" y="6356350"/>
+            <a:ext cx="2743200" cy="365125"/>
+          </a:xfrm>
+          <a:prstGeom prst="rect">
+            <a:avLst/>
+          </a:prstGeom>
+        </p:spPr>
+        <p:txBody>
+          <a:bodyPr vert="horz" lIns="91440" tIns="45720" rIns="91440" bIns="45720" rtlCol="0" anchor="ctr"/>
+          <a:lstStyle>
+            <a:defPPr>
+              <a:defRPr lang="de-DE"/>
+            </a:defPPr>
+            <a:lvl1pPr marL="0" algn="l" defTabSz="914400" rtl="0" eaLnBrk="1" latinLnBrk="0" hangingPunct="1">
+              <a:defRPr sz="1200" kern="1200">
+                <a:solidFill>
+                  <a:schemeClr val="tx1">
+                    <a:tint val="75000"/>
+                  </a:schemeClr>
+                </a:solidFill>
+                <a:latin typeface="+mn-lt"/>
+                <a:ea typeface="+mn-ea"/>
+                <a:cs typeface="+mn-cs"/>
+              </a:defRPr>
+            </a:lvl1pPr>
+            <a:lvl2pPr marL="457200" algn="l" defTabSz="914400" rtl="0" eaLnBrk="1" latinLnBrk="0" hangingPunct="1">
+              <a:defRPr sz="1800" kern="1200">
+                <a:solidFill>
+                  <a:schemeClr val="tx1"/>
+                </a:solidFill>
+                <a:latin typeface="+mn-lt"/>
+                <a:ea typeface="+mn-ea"/>
+                <a:cs typeface="+mn-cs"/>
+              </a:defRPr>
+            </a:lvl2pPr>
+            <a:lvl3pPr marL="914400" algn="l" defTabSz="914400" rtl="0" eaLnBrk="1" latinLnBrk="0" hangingPunct="1">
+              <a:defRPr sz="1800" kern="1200">
+                <a:solidFill>
+                  <a:schemeClr val="tx1"/>
+                </a:solidFill>
+                <a:latin typeface="+mn-lt"/>
+                <a:ea typeface="+mn-ea"/>
+                <a:cs typeface="+mn-cs"/>
+              </a:defRPr>
+            </a:lvl3pPr>
+            <a:lvl4pPr marL="1371600" algn="l" defTabSz="914400" rtl="0" eaLnBrk="1" latinLnBrk="0" hangingPunct="1">
+              <a:defRPr sz="1800" kern="1200">
+                <a:solidFill>
+                  <a:schemeClr val="tx1"/>
+                </a:solidFill>
+                <a:latin typeface="+mn-lt"/>
+                <a:ea typeface="+mn-ea"/>
+                <a:cs typeface="+mn-cs"/>
+              </a:defRPr>
+            </a:lvl4pPr>
+            <a:lvl5pPr marL="1828800" algn="l" defTabSz="914400" rtl="0" eaLnBrk="1" latinLnBrk="0" hangingPunct="1">
+              <a:defRPr sz="1800" kern="1200">
+                <a:solidFill>
+                  <a:schemeClr val="tx1"/>
+                </a:solidFill>
+                <a:latin typeface="+mn-lt"/>
+                <a:ea typeface="+mn-ea"/>
+                <a:cs typeface="+mn-cs"/>
+              </a:defRPr>
+            </a:lvl5pPr>
+            <a:lvl6pPr marL="2286000" algn="l" defTabSz="914400" rtl="0" eaLnBrk="1" latinLnBrk="0" hangingPunct="1">
+              <a:defRPr sz="1800" kern="1200">
+                <a:solidFill>
+                  <a:schemeClr val="tx1"/>
+                </a:solidFill>
+                <a:latin typeface="+mn-lt"/>
+                <a:ea typeface="+mn-ea"/>
+                <a:cs typeface="+mn-cs"/>
+              </a:defRPr>
+            </a:lvl6pPr>
+            <a:lvl7pPr marL="2743200" algn="l" defTabSz="914400" rtl="0" eaLnBrk="1" latinLnBrk="0" hangingPunct="1">
+              <a:defRPr sz="1800" kern="1200">
+                <a:solidFill>
+                  <a:schemeClr val="tx1"/>
+                </a:solidFill>
+                <a:latin typeface="+mn-lt"/>
+                <a:ea typeface="+mn-ea"/>
+                <a:cs typeface="+mn-cs"/>
+              </a:defRPr>
+            </a:lvl7pPr>
+            <a:lvl8pPr marL="3200400" algn="l" defTabSz="914400" rtl="0" eaLnBrk="1" latinLnBrk="0" hangingPunct="1">
+              <a:defRPr sz="1800" kern="1200">
+                <a:solidFill>
+                  <a:schemeClr val="tx1"/>
+                </a:solidFill>
+                <a:latin typeface="+mn-lt"/>
+                <a:ea typeface="+mn-ea"/>
+                <a:cs typeface="+mn-cs"/>
+              </a:defRPr>
+            </a:lvl8pPr>
+            <a:lvl9pPr marL="3657600" algn="l" defTabSz="914400" rtl="0" eaLnBrk="1" latinLnBrk="0" hangingPunct="1">
+              <a:defRPr sz="1800" kern="1200">
+                <a:solidFill>
+                  <a:schemeClr val="tx1"/>
+                </a:solidFill>
+                <a:latin typeface="+mn-lt"/>
+                <a:ea typeface="+mn-ea"/>
+                <a:cs typeface="+mn-cs"/>
+              </a:defRPr>
+            </a:lvl9pPr>
+          </a:lstStyle>
+          <a:p>
+            <a:fld id="{8C792E63-5F21-4F54-A864-D84D9F273FCA}" type="datetimeFigureOut">
+              <a:rPr lang="en-US" smtClean="0"/>
+              <a:pPr/>
+              <a:t>7/16/2024</a:t>
+            </a:fld>
+            <a:endParaRPr lang="en-US" dirty="0"/>
+          </a:p>
+        </p:txBody>
+      </p:sp>
+    </p:spTree>
+    <p:extLst>
+      <p:ext uri="{BB962C8B-B14F-4D97-AF65-F5344CB8AC3E}">
+        <p14:creationId xmlns:p14="http://schemas.microsoft.com/office/powerpoint/2010/main" val="2975318478"/>
+      </p:ext>
+    </p:extLst>
+  </p:cSld>
+  <p:clrMapOvr>
+    <a:masterClrMapping/>
+  </p:clrMapOvr>
+</p:sld>
+</file>
+
+<file path=ppt/slides/slide5.xml><?xml version="1.0" encoding="utf-8"?>
+<p:sld xmlns:a="http://schemas.openxmlformats.org/drawingml/2006/main" xmlns:r="http://schemas.openxmlformats.org/officeDocument/2006/relationships" xmlns:p="http://schemas.openxmlformats.org/presentationml/2006/main">
+  <p:cSld>
+    <p:spTree>
+      <p:nvGrpSpPr>
+        <p:cNvPr id="1" name=""/>
+        <p:cNvGrpSpPr/>
+        <p:nvPr/>
+      </p:nvGrpSpPr>
+      <p:grpSpPr>
+        <a:xfrm>
+          <a:off x="0" y="0"/>
+          <a:ext cx="0" cy="0"/>
+          <a:chOff x="0" y="0"/>
+          <a:chExt cx="0" cy="0"/>
+        </a:xfrm>
+      </p:grpSpPr>
+      <p:sp>
+        <p:nvSpPr>
+          <p:cNvPr id="2" name="Title 1">
+            <a:extLst>
+              <a:ext uri="{FF2B5EF4-FFF2-40B4-BE49-F238E27FC236}">
+                <a16:creationId xmlns:a16="http://schemas.microsoft.com/office/drawing/2014/main" id="{67612D3D-95B0-4F74-BDB2-BCE058A01C12}"/>
+              </a:ext>
+            </a:extLst>
+          </p:cNvPr>
+          <p:cNvSpPr>
+            <a:spLocks noGrp="1"/>
+          </p:cNvSpPr>
+          <p:nvPr>
+            <p:ph type="title"/>
+          </p:nvPr>
+        </p:nvSpPr>
+        <p:spPr/>
+        <p:txBody>
+          <a:bodyPr>
+            <a:normAutofit/>
+          </a:bodyPr>
+          <a:lstStyle/>
+          <a:p>
+            <a:r>
+              <a:rPr lang="en-US" sz="3600" dirty="0"/>
+              <a:t>Food for thoughts: To be discussed in Design Team </a:t>
+            </a:r>
+            <a:br>
+              <a:rPr lang="en-US" sz="3600" dirty="0"/>
+            </a:br>
+            <a:r>
+              <a:rPr lang="en-US" sz="3600" dirty="0"/>
+              <a:t>(not BRSKI-PRM specific) </a:t>
+            </a:r>
+          </a:p>
+        </p:txBody>
+      </p:sp>
+      <p:sp>
+        <p:nvSpPr>
+          <p:cNvPr id="3" name="Content Placeholder 2">
+            <a:extLst>
+              <a:ext uri="{FF2B5EF4-FFF2-40B4-BE49-F238E27FC236}">
+                <a16:creationId xmlns:a16="http://schemas.microsoft.com/office/drawing/2014/main" id="{A9776AB7-EF6B-4831-BA5E-A2298E1B08F8}"/>
+              </a:ext>
+            </a:extLst>
+          </p:cNvPr>
+          <p:cNvSpPr>
+            <a:spLocks noGrp="1"/>
+          </p:cNvSpPr>
+          <p:nvPr>
+            <p:ph idx="1"/>
+          </p:nvPr>
+        </p:nvSpPr>
+        <p:spPr>
+          <a:xfrm>
+            <a:off x="701640" y="1794397"/>
+            <a:ext cx="10515600" cy="4467973"/>
+          </a:xfrm>
+        </p:spPr>
+        <p:txBody>
+          <a:bodyPr>
+            <a:noAutofit/>
+          </a:bodyPr>
+          <a:lstStyle/>
+          <a:p>
+            <a:pPr>
+              <a:lnSpc>
+                <a:spcPct val="100000"/>
+              </a:lnSpc>
+              <a:spcBef>
+                <a:spcPts val="600"/>
+              </a:spcBef>
+              <a:buSzPct val="80000"/>
+              <a:buFont typeface="Calibri" panose="020F0502020204030204" pitchFamily="34" charset="0"/>
+              <a:buChar char="–"/>
+            </a:pPr>
+            <a:r>
+              <a:rPr lang="en-US" sz="2400" dirty="0"/>
+              <a:t>BRSKI and variants care concerned with the provisioning of a generic </a:t>
+            </a:r>
+            <a:r>
+              <a:rPr lang="en-US" sz="2400" dirty="0" err="1"/>
+              <a:t>LDevID</a:t>
+            </a:r>
+            <a:r>
+              <a:rPr lang="en-US" sz="2400" dirty="0"/>
+              <a:t>, which can be used to manage further </a:t>
+            </a:r>
+            <a:r>
+              <a:rPr lang="en-US" sz="2400" dirty="0" err="1"/>
+              <a:t>LDevIDs</a:t>
+            </a:r>
+            <a:r>
+              <a:rPr lang="en-US" sz="2400" dirty="0"/>
+              <a:t> in the </a:t>
+            </a:r>
+            <a:r>
+              <a:rPr lang="en-US" sz="2400"/>
+              <a:t>operational phase. </a:t>
+            </a:r>
+            <a:endParaRPr lang="en-US" sz="2400" dirty="0"/>
+          </a:p>
+          <a:p>
+            <a:pPr>
+              <a:lnSpc>
+                <a:spcPct val="100000"/>
+              </a:lnSpc>
+              <a:spcBef>
+                <a:spcPts val="600"/>
+              </a:spcBef>
+              <a:buSzPct val="80000"/>
+              <a:buFont typeface="Calibri" panose="020F0502020204030204" pitchFamily="34" charset="0"/>
+              <a:buChar char="–"/>
+            </a:pPr>
+            <a:r>
+              <a:rPr lang="en-US" sz="2400" dirty="0"/>
+              <a:t>Considerations for providing multiple </a:t>
+            </a:r>
+            <a:r>
+              <a:rPr lang="en-US" sz="2400" dirty="0" err="1"/>
+              <a:t>LDevIDs</a:t>
+            </a:r>
+            <a:r>
+              <a:rPr lang="en-US" sz="2400" dirty="0"/>
+              <a:t> to a pledge during onboarding. Connected use cases may relate to </a:t>
+            </a:r>
+          </a:p>
+          <a:p>
+            <a:pPr lvl="1">
+              <a:lnSpc>
+                <a:spcPct val="100000"/>
+              </a:lnSpc>
+              <a:spcBef>
+                <a:spcPts val="600"/>
+              </a:spcBef>
+              <a:buSzPct val="80000"/>
+              <a:buFont typeface="Calibri" panose="020F0502020204030204" pitchFamily="34" charset="0"/>
+              <a:buChar char="–"/>
+            </a:pPr>
+            <a:r>
+              <a:rPr lang="en-US" dirty="0"/>
+              <a:t>application specific certificates </a:t>
+            </a:r>
+          </a:p>
+          <a:p>
+            <a:pPr lvl="1">
+              <a:lnSpc>
+                <a:spcPct val="100000"/>
+              </a:lnSpc>
+              <a:spcBef>
+                <a:spcPts val="600"/>
+              </a:spcBef>
+              <a:buSzPct val="80000"/>
+              <a:buFont typeface="Calibri" panose="020F0502020204030204" pitchFamily="34" charset="0"/>
+              <a:buChar char="–"/>
+            </a:pPr>
+            <a:r>
+              <a:rPr lang="en-US" dirty="0"/>
+              <a:t>handovers from domain 1 to domain 2 during installation and commissioning </a:t>
+            </a:r>
+          </a:p>
+          <a:p>
+            <a:pPr>
+              <a:lnSpc>
+                <a:spcPct val="100000"/>
+              </a:lnSpc>
+              <a:spcBef>
+                <a:spcPts val="600"/>
+              </a:spcBef>
+              <a:buSzPct val="80000"/>
+              <a:buFont typeface="Calibri" panose="020F0502020204030204" pitchFamily="34" charset="0"/>
+              <a:buChar char="–"/>
+            </a:pPr>
+            <a:r>
+              <a:rPr lang="en-US" sz="2400" dirty="0"/>
+              <a:t>Technically, this may be achieved using CSR attribute request messages of the enrollment protocol (as defined in BRSKI) and trigger messages for the pledge (as defined in BRSKI-PRM), but operational workflow discussions may be necessary and could be used to enhance ID </a:t>
+            </a:r>
+            <a:r>
+              <a:rPr lang="en-US" sz="2400" dirty="0">
+                <a:hlinkClick r:id="rId3"/>
+              </a:rPr>
+              <a:t>Operational Considerations for BRSKI Registrar</a:t>
+            </a:r>
+            <a:r>
+              <a:rPr lang="en-US" sz="2400" dirty="0"/>
+              <a:t>. </a:t>
+            </a:r>
+          </a:p>
+          <a:p>
+            <a:pPr>
+              <a:lnSpc>
+                <a:spcPct val="100000"/>
+              </a:lnSpc>
+              <a:spcBef>
+                <a:spcPts val="600"/>
+              </a:spcBef>
+              <a:buSzPct val="80000"/>
+              <a:buFont typeface="Calibri" panose="020F0502020204030204" pitchFamily="34" charset="0"/>
+              <a:buChar char="–"/>
+            </a:pPr>
+            <a:endParaRPr lang="en-US" sz="2400" dirty="0"/>
+          </a:p>
+        </p:txBody>
+      </p:sp>
+      <p:sp>
+        <p:nvSpPr>
+          <p:cNvPr id="5" name="Slide Number Placeholder 5">
+            <a:extLst>
+              <a:ext uri="{FF2B5EF4-FFF2-40B4-BE49-F238E27FC236}">
+                <a16:creationId xmlns:a16="http://schemas.microsoft.com/office/drawing/2014/main" id="{1881EAE9-7681-4485-81EC-EAB026A81A3C}"/>
+              </a:ext>
+            </a:extLst>
+          </p:cNvPr>
+          <p:cNvSpPr txBox="1">
+            <a:spLocks/>
+          </p:cNvSpPr>
+          <p:nvPr/>
+        </p:nvSpPr>
+        <p:spPr>
+          <a:xfrm>
+            <a:off x="8763000" y="6508750"/>
+            <a:ext cx="2743200" cy="365125"/>
+          </a:xfrm>
+          <a:prstGeom prst="rect">
+            <a:avLst/>
+          </a:prstGeom>
+        </p:spPr>
+        <p:txBody>
+          <a:bodyPr vert="horz" lIns="91440" tIns="45720" rIns="91440" bIns="45720" rtlCol="0" anchor="ctr"/>
+          <a:lstStyle>
+            <a:defPPr>
+              <a:defRPr lang="de-DE"/>
+            </a:defPPr>
+            <a:lvl1pPr marL="0" algn="r" defTabSz="914400" rtl="0" eaLnBrk="1" latinLnBrk="0" hangingPunct="1">
+              <a:defRPr sz="1200" kern="1200">
+                <a:solidFill>
+                  <a:schemeClr val="tx1">
+                    <a:tint val="75000"/>
+                  </a:schemeClr>
+                </a:solidFill>
+                <a:latin typeface="+mn-lt"/>
+                <a:ea typeface="+mn-ea"/>
+                <a:cs typeface="+mn-cs"/>
+              </a:defRPr>
+            </a:lvl1pPr>
+            <a:lvl2pPr marL="457200" algn="l" defTabSz="914400" rtl="0" eaLnBrk="1" latinLnBrk="0" hangingPunct="1">
+              <a:defRPr sz="1800" kern="1200">
+                <a:solidFill>
+                  <a:schemeClr val="tx1"/>
+                </a:solidFill>
+                <a:latin typeface="+mn-lt"/>
+                <a:ea typeface="+mn-ea"/>
+                <a:cs typeface="+mn-cs"/>
+              </a:defRPr>
+            </a:lvl2pPr>
+            <a:lvl3pPr marL="914400" algn="l" defTabSz="914400" rtl="0" eaLnBrk="1" latinLnBrk="0" hangingPunct="1">
+              <a:defRPr sz="1800" kern="1200">
+                <a:solidFill>
+                  <a:schemeClr val="tx1"/>
+                </a:solidFill>
+                <a:latin typeface="+mn-lt"/>
+                <a:ea typeface="+mn-ea"/>
+                <a:cs typeface="+mn-cs"/>
+              </a:defRPr>
+            </a:lvl3pPr>
+            <a:lvl4pPr marL="1371600" algn="l" defTabSz="914400" rtl="0" eaLnBrk="1" latinLnBrk="0" hangingPunct="1">
+              <a:defRPr sz="1800" kern="1200">
+                <a:solidFill>
+                  <a:schemeClr val="tx1"/>
+                </a:solidFill>
+                <a:latin typeface="+mn-lt"/>
+                <a:ea typeface="+mn-ea"/>
+                <a:cs typeface="+mn-cs"/>
+              </a:defRPr>
+            </a:lvl4pPr>
+            <a:lvl5pPr marL="1828800" algn="l" defTabSz="914400" rtl="0" eaLnBrk="1" latinLnBrk="0" hangingPunct="1">
+              <a:defRPr sz="1800" kern="1200">
+                <a:solidFill>
+                  <a:schemeClr val="tx1"/>
+                </a:solidFill>
+                <a:latin typeface="+mn-lt"/>
+                <a:ea typeface="+mn-ea"/>
+                <a:cs typeface="+mn-cs"/>
+              </a:defRPr>
+            </a:lvl5pPr>
+            <a:lvl6pPr marL="2286000" algn="l" defTabSz="914400" rtl="0" eaLnBrk="1" latinLnBrk="0" hangingPunct="1">
+              <a:defRPr sz="1800" kern="1200">
+                <a:solidFill>
+                  <a:schemeClr val="tx1"/>
+                </a:solidFill>
+                <a:latin typeface="+mn-lt"/>
+                <a:ea typeface="+mn-ea"/>
+                <a:cs typeface="+mn-cs"/>
+              </a:defRPr>
+            </a:lvl6pPr>
+            <a:lvl7pPr marL="2743200" algn="l" defTabSz="914400" rtl="0" eaLnBrk="1" latinLnBrk="0" hangingPunct="1">
+              <a:defRPr sz="1800" kern="1200">
+                <a:solidFill>
+                  <a:schemeClr val="tx1"/>
+                </a:solidFill>
+                <a:latin typeface="+mn-lt"/>
+                <a:ea typeface="+mn-ea"/>
+                <a:cs typeface="+mn-cs"/>
+              </a:defRPr>
+            </a:lvl7pPr>
+            <a:lvl8pPr marL="3200400" algn="l" defTabSz="914400" rtl="0" eaLnBrk="1" latinLnBrk="0" hangingPunct="1">
+              <a:defRPr sz="1800" kern="1200">
+                <a:solidFill>
+                  <a:schemeClr val="tx1"/>
+                </a:solidFill>
+                <a:latin typeface="+mn-lt"/>
+                <a:ea typeface="+mn-ea"/>
+                <a:cs typeface="+mn-cs"/>
+              </a:defRPr>
+            </a:lvl8pPr>
+            <a:lvl9pPr marL="3657600" algn="l" defTabSz="914400" rtl="0" eaLnBrk="1" latinLnBrk="0" hangingPunct="1">
+              <a:defRPr sz="1800" kern="1200">
+                <a:solidFill>
+                  <a:schemeClr val="tx1"/>
+                </a:solidFill>
+                <a:latin typeface="+mn-lt"/>
+                <a:ea typeface="+mn-ea"/>
+                <a:cs typeface="+mn-cs"/>
+              </a:defRPr>
+            </a:lvl9pPr>
+          </a:lstStyle>
+          <a:p>
+            <a:fld id="{104F53CC-0028-4916-8B93-0EBFFB2C7AAD}" type="slidenum">
+              <a:rPr lang="en-US" smtClean="0"/>
+              <a:pPr/>
+              <a:t>5</a:t>
+            </a:fld>
+            <a:endParaRPr lang="en-US" dirty="0"/>
+          </a:p>
+        </p:txBody>
+      </p:sp>
+      <p:sp>
+        <p:nvSpPr>
+          <p:cNvPr id="6" name="Date Placeholder 3">
+            <a:extLst>
+              <a:ext uri="{FF2B5EF4-FFF2-40B4-BE49-F238E27FC236}">
+                <a16:creationId xmlns:a16="http://schemas.microsoft.com/office/drawing/2014/main" id="{28893308-8041-5B42-F817-60188F19B021}"/>
+              </a:ext>
+            </a:extLst>
+          </p:cNvPr>
+          <p:cNvSpPr txBox="1">
+            <a:spLocks/>
+          </p:cNvSpPr>
+          <p:nvPr/>
+        </p:nvSpPr>
+        <p:spPr>
+          <a:xfrm>
+            <a:off x="838200" y="6356350"/>
+            <a:ext cx="2743200" cy="365125"/>
+          </a:xfrm>
+          <a:prstGeom prst="rect">
+            <a:avLst/>
+          </a:prstGeom>
+        </p:spPr>
+        <p:txBody>
+          <a:bodyPr vert="horz" lIns="91440" tIns="45720" rIns="91440" bIns="45720" rtlCol="0" anchor="ctr"/>
+          <a:lstStyle>
+            <a:defPPr>
+              <a:defRPr lang="de-DE"/>
+            </a:defPPr>
+            <a:lvl1pPr marL="0" algn="l" defTabSz="914400" rtl="0" eaLnBrk="1" latinLnBrk="0" hangingPunct="1">
+              <a:defRPr sz="1200" kern="1200">
+                <a:solidFill>
+                  <a:schemeClr val="tx1">
+                    <a:tint val="75000"/>
+                  </a:schemeClr>
+                </a:solidFill>
+                <a:latin typeface="+mn-lt"/>
+                <a:ea typeface="+mn-ea"/>
+                <a:cs typeface="+mn-cs"/>
+              </a:defRPr>
+            </a:lvl1pPr>
+            <a:lvl2pPr marL="457200" algn="l" defTabSz="914400" rtl="0" eaLnBrk="1" latinLnBrk="0" hangingPunct="1">
+              <a:defRPr sz="1800" kern="1200">
+                <a:solidFill>
+                  <a:schemeClr val="tx1"/>
+                </a:solidFill>
+                <a:latin typeface="+mn-lt"/>
+                <a:ea typeface="+mn-ea"/>
+                <a:cs typeface="+mn-cs"/>
+              </a:defRPr>
+            </a:lvl2pPr>
+            <a:lvl3pPr marL="914400" algn="l" defTabSz="914400" rtl="0" eaLnBrk="1" latinLnBrk="0" hangingPunct="1">
+              <a:defRPr sz="1800" kern="1200">
+                <a:solidFill>
+                  <a:schemeClr val="tx1"/>
+                </a:solidFill>
+                <a:latin typeface="+mn-lt"/>
+                <a:ea typeface="+mn-ea"/>
+                <a:cs typeface="+mn-cs"/>
+              </a:defRPr>
+            </a:lvl3pPr>
+            <a:lvl4pPr marL="1371600" algn="l" defTabSz="914400" rtl="0" eaLnBrk="1" latinLnBrk="0" hangingPunct="1">
+              <a:defRPr sz="1800" kern="1200">
+                <a:solidFill>
+                  <a:schemeClr val="tx1"/>
+                </a:solidFill>
+                <a:latin typeface="+mn-lt"/>
+                <a:ea typeface="+mn-ea"/>
+                <a:cs typeface="+mn-cs"/>
+              </a:defRPr>
+            </a:lvl4pPr>
+            <a:lvl5pPr marL="1828800" algn="l" defTabSz="914400" rtl="0" eaLnBrk="1" latinLnBrk="0" hangingPunct="1">
+              <a:defRPr sz="1800" kern="1200">
+                <a:solidFill>
+                  <a:schemeClr val="tx1"/>
+                </a:solidFill>
+                <a:latin typeface="+mn-lt"/>
+                <a:ea typeface="+mn-ea"/>
+                <a:cs typeface="+mn-cs"/>
+              </a:defRPr>
+            </a:lvl5pPr>
+            <a:lvl6pPr marL="2286000" algn="l" defTabSz="914400" rtl="0" eaLnBrk="1" latinLnBrk="0" hangingPunct="1">
+              <a:defRPr sz="1800" kern="1200">
+                <a:solidFill>
+                  <a:schemeClr val="tx1"/>
+                </a:solidFill>
+                <a:latin typeface="+mn-lt"/>
+                <a:ea typeface="+mn-ea"/>
+                <a:cs typeface="+mn-cs"/>
+              </a:defRPr>
+            </a:lvl6pPr>
+            <a:lvl7pPr marL="2743200" algn="l" defTabSz="914400" rtl="0" eaLnBrk="1" latinLnBrk="0" hangingPunct="1">
+              <a:defRPr sz="1800" kern="1200">
+                <a:solidFill>
+                  <a:schemeClr val="tx1"/>
+                </a:solidFill>
+                <a:latin typeface="+mn-lt"/>
+                <a:ea typeface="+mn-ea"/>
+                <a:cs typeface="+mn-cs"/>
+              </a:defRPr>
+            </a:lvl7pPr>
+            <a:lvl8pPr marL="3200400" algn="l" defTabSz="914400" rtl="0" eaLnBrk="1" latinLnBrk="0" hangingPunct="1">
+              <a:defRPr sz="1800" kern="1200">
+                <a:solidFill>
+                  <a:schemeClr val="tx1"/>
+                </a:solidFill>
+                <a:latin typeface="+mn-lt"/>
+                <a:ea typeface="+mn-ea"/>
+                <a:cs typeface="+mn-cs"/>
+              </a:defRPr>
+            </a:lvl8pPr>
+            <a:lvl9pPr marL="3657600" algn="l" defTabSz="914400" rtl="0" eaLnBrk="1" latinLnBrk="0" hangingPunct="1">
+              <a:defRPr sz="1800" kern="1200">
+                <a:solidFill>
+                  <a:schemeClr val="tx1"/>
+                </a:solidFill>
+                <a:latin typeface="+mn-lt"/>
+                <a:ea typeface="+mn-ea"/>
+                <a:cs typeface="+mn-cs"/>
+              </a:defRPr>
+            </a:lvl9pPr>
+          </a:lstStyle>
+          <a:p>
+            <a:fld id="{8C792E63-5F21-4F54-A864-D84D9F273FCA}" type="datetimeFigureOut">
+              <a:rPr lang="en-US" smtClean="0"/>
+              <a:pPr/>
+              <a:t>7/16/2024</a:t>
+            </a:fld>
+            <a:endParaRPr lang="en-US" dirty="0"/>
+          </a:p>
+        </p:txBody>
+      </p:sp>
+    </p:spTree>
+    <p:extLst>
+      <p:ext uri="{BB962C8B-B14F-4D97-AF65-F5344CB8AC3E}">
+        <p14:creationId xmlns:p14="http://schemas.microsoft.com/office/powerpoint/2010/main" val="4252847642"/>
+      </p:ext>
+    </p:extLst>
+  </p:cSld>
+  <p:clrMapOvr>
+    <a:masterClrMapping/>
+  </p:clrMapOvr>
+</p:sld>
+</file>
+
+<file path=ppt/slides/slide6.xml><?xml version="1.0" encoding="utf-8"?>
+<p:sld xmlns:a="http://schemas.openxmlformats.org/drawingml/2006/main" xmlns:r="http://schemas.openxmlformats.org/officeDocument/2006/relationships" xmlns:p="http://schemas.openxmlformats.org/presentationml/2006/main">
+  <p:cSld>
+    <p:spTree>
+      <p:nvGrpSpPr>
+        <p:cNvPr id="1" name=""/>
+        <p:cNvGrpSpPr/>
+        <p:nvPr/>
+      </p:nvGrpSpPr>
+      <p:grpSpPr>
+        <a:xfrm>
+          <a:off x="0" y="0"/>
+          <a:ext cx="0" cy="0"/>
+          <a:chOff x="0" y="0"/>
+          <a:chExt cx="0" cy="0"/>
+        </a:xfrm>
+      </p:grpSpPr>
+      <p:sp>
+        <p:nvSpPr>
+          <p:cNvPr id="2" name="Title 1">
+            <a:extLst>
+              <a:ext uri="{FF2B5EF4-FFF2-40B4-BE49-F238E27FC236}">
+                <a16:creationId xmlns:a16="http://schemas.microsoft.com/office/drawing/2014/main" id="{67612D3D-95B0-4F74-BDB2-BCE058A01C12}"/>
+              </a:ext>
+            </a:extLst>
+          </p:cNvPr>
+          <p:cNvSpPr>
+            <a:spLocks noGrp="1"/>
+          </p:cNvSpPr>
+          <p:nvPr>
+            <p:ph type="title"/>
+          </p:nvPr>
+        </p:nvSpPr>
+        <p:spPr/>
+        <p:txBody>
+          <a:bodyPr>
+            <a:normAutofit/>
+          </a:bodyPr>
+          <a:lstStyle/>
+          <a:p>
+            <a:r>
+              <a:rPr lang="en-US" sz="3600" dirty="0"/>
+              <a:t>Backup: BRSKI-PRM – Abstract Protocol Overview</a:t>
+            </a:r>
+            <a:br>
+              <a:rPr lang="en-US" sz="3600" dirty="0"/>
+            </a:br>
+            <a:endParaRPr lang="en-US" sz="3600" dirty="0"/>
+          </a:p>
+        </p:txBody>
+      </p:sp>
+      <p:sp>
+        <p:nvSpPr>
+          <p:cNvPr id="5" name="Slide Number Placeholder 5">
+            <a:extLst>
+              <a:ext uri="{FF2B5EF4-FFF2-40B4-BE49-F238E27FC236}">
+                <a16:creationId xmlns:a16="http://schemas.microsoft.com/office/drawing/2014/main" id="{1881EAE9-7681-4485-81EC-EAB026A81A3C}"/>
+              </a:ext>
+            </a:extLst>
+          </p:cNvPr>
+          <p:cNvSpPr txBox="1">
+            <a:spLocks/>
+          </p:cNvSpPr>
+          <p:nvPr/>
+        </p:nvSpPr>
+        <p:spPr>
+          <a:xfrm>
+            <a:off x="8763000" y="6508750"/>
+            <a:ext cx="2743200" cy="365125"/>
+          </a:xfrm>
+          <a:prstGeom prst="rect">
+            <a:avLst/>
+          </a:prstGeom>
+        </p:spPr>
+        <p:txBody>
+          <a:bodyPr vert="horz" lIns="91440" tIns="45720" rIns="91440" bIns="45720" rtlCol="0" anchor="ctr"/>
+          <a:lstStyle>
+            <a:defPPr>
+              <a:defRPr lang="de-DE"/>
+            </a:defPPr>
+            <a:lvl1pPr marL="0" algn="r" defTabSz="914400" rtl="0" eaLnBrk="1" latinLnBrk="0" hangingPunct="1">
+              <a:defRPr sz="1200" kern="1200">
+                <a:solidFill>
+                  <a:schemeClr val="tx1">
+                    <a:tint val="75000"/>
+                  </a:schemeClr>
+                </a:solidFill>
+                <a:latin typeface="+mn-lt"/>
+                <a:ea typeface="+mn-ea"/>
+                <a:cs typeface="+mn-cs"/>
+              </a:defRPr>
+            </a:lvl1pPr>
+            <a:lvl2pPr marL="457200" algn="l" defTabSz="914400" rtl="0" eaLnBrk="1" latinLnBrk="0" hangingPunct="1">
+              <a:defRPr sz="1800" kern="1200">
+                <a:solidFill>
+                  <a:schemeClr val="tx1"/>
+                </a:solidFill>
+                <a:latin typeface="+mn-lt"/>
+                <a:ea typeface="+mn-ea"/>
+                <a:cs typeface="+mn-cs"/>
+              </a:defRPr>
+            </a:lvl2pPr>
+            <a:lvl3pPr marL="914400" algn="l" defTabSz="914400" rtl="0" eaLnBrk="1" latinLnBrk="0" hangingPunct="1">
+              <a:defRPr sz="1800" kern="1200">
+                <a:solidFill>
+                  <a:schemeClr val="tx1"/>
+                </a:solidFill>
+                <a:latin typeface="+mn-lt"/>
+                <a:ea typeface="+mn-ea"/>
+                <a:cs typeface="+mn-cs"/>
+              </a:defRPr>
+            </a:lvl3pPr>
+            <a:lvl4pPr marL="1371600" algn="l" defTabSz="914400" rtl="0" eaLnBrk="1" latinLnBrk="0" hangingPunct="1">
+              <a:defRPr sz="1800" kern="1200">
+                <a:solidFill>
+                  <a:schemeClr val="tx1"/>
+                </a:solidFill>
+                <a:latin typeface="+mn-lt"/>
+                <a:ea typeface="+mn-ea"/>
+                <a:cs typeface="+mn-cs"/>
+              </a:defRPr>
+            </a:lvl4pPr>
+            <a:lvl5pPr marL="1828800" algn="l" defTabSz="914400" rtl="0" eaLnBrk="1" latinLnBrk="0" hangingPunct="1">
+              <a:defRPr sz="1800" kern="1200">
+                <a:solidFill>
+                  <a:schemeClr val="tx1"/>
+                </a:solidFill>
+                <a:latin typeface="+mn-lt"/>
+                <a:ea typeface="+mn-ea"/>
+                <a:cs typeface="+mn-cs"/>
+              </a:defRPr>
+            </a:lvl5pPr>
+            <a:lvl6pPr marL="2286000" algn="l" defTabSz="914400" rtl="0" eaLnBrk="1" latinLnBrk="0" hangingPunct="1">
+              <a:defRPr sz="1800" kern="1200">
+                <a:solidFill>
+                  <a:schemeClr val="tx1"/>
+                </a:solidFill>
+                <a:latin typeface="+mn-lt"/>
+                <a:ea typeface="+mn-ea"/>
+                <a:cs typeface="+mn-cs"/>
+              </a:defRPr>
+            </a:lvl6pPr>
+            <a:lvl7pPr marL="2743200" algn="l" defTabSz="914400" rtl="0" eaLnBrk="1" latinLnBrk="0" hangingPunct="1">
+              <a:defRPr sz="1800" kern="1200">
+                <a:solidFill>
+                  <a:schemeClr val="tx1"/>
+                </a:solidFill>
+                <a:latin typeface="+mn-lt"/>
+                <a:ea typeface="+mn-ea"/>
+                <a:cs typeface="+mn-cs"/>
+              </a:defRPr>
+            </a:lvl7pPr>
+            <a:lvl8pPr marL="3200400" algn="l" defTabSz="914400" rtl="0" eaLnBrk="1" latinLnBrk="0" hangingPunct="1">
+              <a:defRPr sz="1800" kern="1200">
+                <a:solidFill>
+                  <a:schemeClr val="tx1"/>
+                </a:solidFill>
+                <a:latin typeface="+mn-lt"/>
+                <a:ea typeface="+mn-ea"/>
+                <a:cs typeface="+mn-cs"/>
+              </a:defRPr>
+            </a:lvl8pPr>
+            <a:lvl9pPr marL="3657600" algn="l" defTabSz="914400" rtl="0" eaLnBrk="1" latinLnBrk="0" hangingPunct="1">
+              <a:defRPr sz="1800" kern="1200">
+                <a:solidFill>
+                  <a:schemeClr val="tx1"/>
+                </a:solidFill>
+                <a:latin typeface="+mn-lt"/>
+                <a:ea typeface="+mn-ea"/>
+                <a:cs typeface="+mn-cs"/>
+              </a:defRPr>
+            </a:lvl9pPr>
+          </a:lstStyle>
+          <a:p>
+            <a:fld id="{104F53CC-0028-4916-8B93-0EBFFB2C7AAD}" type="slidenum">
+              <a:rPr lang="en-US" smtClean="0"/>
+              <a:pPr/>
+              <a:t>6</a:t>
             </a:fld>
             <a:endParaRPr lang="en-US" dirty="0"/>
           </a:p>

</xml_diff>

<commit_message>
update of open issue regarding multiple LDevID enrollment
</commit_message>
<xml_diff>
--- a/presentations/slides-120-anima-update-brski-with-pledge-in-responder-mode-brski-prm.pptx
+++ b/presentations/slides-120-anima-update-brski-with-pledge-in-responder-mode-brski-prm.pptx
@@ -257,7 +257,7 @@
           <a:p>
             <a:fld id="{33B5B5E8-CA78-4A82-83A0-867EF5A818AE}" type="datetimeFigureOut">
               <a:rPr lang="en-US" smtClean="0"/>
-              <a:t>7/16/2024</a:t>
+              <a:t>7/22/2024</a:t>
             </a:fld>
             <a:endParaRPr lang="en-US"/>
           </a:p>
@@ -2113,7 +2113,7 @@
           <a:p>
             <a:fld id="{8C792E63-5F21-4F54-A864-D84D9F273FCA}" type="datetimeFigureOut">
               <a:rPr lang="en-US" smtClean="0"/>
-              <a:t>7/16/2024</a:t>
+              <a:t>7/22/2024</a:t>
             </a:fld>
             <a:endParaRPr lang="en-US" dirty="0"/>
           </a:p>
@@ -2331,7 +2331,7 @@
           <a:p>
             <a:fld id="{8C792E63-5F21-4F54-A864-D84D9F273FCA}" type="datetimeFigureOut">
               <a:rPr lang="en-US" smtClean="0"/>
-              <a:t>7/16/2024</a:t>
+              <a:t>7/22/2024</a:t>
             </a:fld>
             <a:endParaRPr lang="en-US"/>
           </a:p>
@@ -2555,7 +2555,7 @@
           <a:p>
             <a:fld id="{8C792E63-5F21-4F54-A864-D84D9F273FCA}" type="datetimeFigureOut">
               <a:rPr lang="en-US" smtClean="0"/>
-              <a:t>7/16/2024</a:t>
+              <a:t>7/22/2024</a:t>
             </a:fld>
             <a:endParaRPr lang="en-US"/>
           </a:p>
@@ -2769,7 +2769,7 @@
           <a:p>
             <a:fld id="{8C792E63-5F21-4F54-A864-D84D9F273FCA}" type="datetimeFigureOut">
               <a:rPr lang="en-US" smtClean="0"/>
-              <a:t>7/16/2024</a:t>
+              <a:t>7/22/2024</a:t>
             </a:fld>
             <a:endParaRPr lang="en-US"/>
           </a:p>
@@ -3060,7 +3060,7 @@
           <a:p>
             <a:fld id="{8C792E63-5F21-4F54-A864-D84D9F273FCA}" type="datetimeFigureOut">
               <a:rPr lang="en-US" smtClean="0"/>
-              <a:t>7/16/2024</a:t>
+              <a:t>7/22/2024</a:t>
             </a:fld>
             <a:endParaRPr lang="en-US"/>
           </a:p>
@@ -3341,7 +3341,7 @@
           <a:p>
             <a:fld id="{8C792E63-5F21-4F54-A864-D84D9F273FCA}" type="datetimeFigureOut">
               <a:rPr lang="en-US" smtClean="0"/>
-              <a:t>7/16/2024</a:t>
+              <a:t>7/22/2024</a:t>
             </a:fld>
             <a:endParaRPr lang="en-US"/>
           </a:p>
@@ -3769,7 +3769,7 @@
           <a:p>
             <a:fld id="{8C792E63-5F21-4F54-A864-D84D9F273FCA}" type="datetimeFigureOut">
               <a:rPr lang="en-US" smtClean="0"/>
-              <a:t>7/16/2024</a:t>
+              <a:t>7/22/2024</a:t>
             </a:fld>
             <a:endParaRPr lang="en-US"/>
           </a:p>
@@ -3926,7 +3926,7 @@
           <a:p>
             <a:fld id="{8C792E63-5F21-4F54-A864-D84D9F273FCA}" type="datetimeFigureOut">
               <a:rPr lang="en-US" smtClean="0"/>
-              <a:t>7/16/2024</a:t>
+              <a:t>7/22/2024</a:t>
             </a:fld>
             <a:endParaRPr lang="en-US"/>
           </a:p>
@@ -4055,7 +4055,7 @@
           <a:p>
             <a:fld id="{8C792E63-5F21-4F54-A864-D84D9F273FCA}" type="datetimeFigureOut">
               <a:rPr lang="en-US" smtClean="0"/>
-              <a:t>7/16/2024</a:t>
+              <a:t>7/22/2024</a:t>
             </a:fld>
             <a:endParaRPr lang="en-US"/>
           </a:p>
@@ -4382,7 +4382,7 @@
           <a:p>
             <a:fld id="{8C792E63-5F21-4F54-A864-D84D9F273FCA}" type="datetimeFigureOut">
               <a:rPr lang="en-US" smtClean="0"/>
-              <a:t>7/16/2024</a:t>
+              <a:t>7/22/2024</a:t>
             </a:fld>
             <a:endParaRPr lang="en-US"/>
           </a:p>
@@ -4686,7 +4686,7 @@
           <a:p>
             <a:fld id="{8C792E63-5F21-4F54-A864-D84D9F273FCA}" type="datetimeFigureOut">
               <a:rPr lang="en-US" smtClean="0"/>
-              <a:t>7/16/2024</a:t>
+              <a:t>7/22/2024</a:t>
             </a:fld>
             <a:endParaRPr lang="en-US"/>
           </a:p>
@@ -4978,7 +4978,7 @@
           <a:p>
             <a:fld id="{8C792E63-5F21-4F54-A864-D84D9F273FCA}" type="datetimeFigureOut">
               <a:rPr lang="en-US" smtClean="0"/>
-              <a:t>7/16/2024</a:t>
+              <a:t>7/22/2024</a:t>
             </a:fld>
             <a:endParaRPr lang="en-US"/>
           </a:p>
@@ -5852,7 +5852,7 @@
             <a:fld id="{8C792E63-5F21-4F54-A864-D84D9F273FCA}" type="datetimeFigureOut">
               <a:rPr lang="en-US" smtClean="0"/>
               <a:pPr/>
-              <a:t>7/16/2024</a:t>
+              <a:t>7/22/2024</a:t>
             </a:fld>
             <a:endParaRPr lang="en-US" dirty="0"/>
           </a:p>
@@ -6396,7 +6396,7 @@
             <a:fld id="{8C792E63-5F21-4F54-A864-D84D9F273FCA}" type="datetimeFigureOut">
               <a:rPr lang="en-US" smtClean="0"/>
               <a:pPr/>
-              <a:t>7/16/2024</a:t>
+              <a:t>7/22/2024</a:t>
             </a:fld>
             <a:endParaRPr lang="en-US" dirty="0"/>
           </a:p>
@@ -7122,7 +7122,7 @@
             <a:fld id="{8C792E63-5F21-4F54-A864-D84D9F273FCA}" type="datetimeFigureOut">
               <a:rPr lang="en-US" smtClean="0"/>
               <a:pPr/>
-              <a:t>7/16/2024</a:t>
+              <a:t>7/22/2024</a:t>
             </a:fld>
             <a:endParaRPr lang="en-US" dirty="0"/>
           </a:p>
@@ -7236,7 +7236,7 @@
             </a:pPr>
             <a:r>
               <a:rPr lang="en-US" sz="2400" dirty="0"/>
-              <a:t>BRSKI and variants care concerned with the provisioning of a generic </a:t>
+              <a:t>BRSKI and variants handle the provisioning of a generic </a:t>
             </a:r>
             <a:r>
               <a:rPr lang="en-US" sz="2400" dirty="0" err="1"/>
@@ -7252,13 +7252,8 @@
             </a:r>
             <a:r>
               <a:rPr lang="en-US" sz="2400" dirty="0"/>
-              <a:t> in the </a:t>
-            </a:r>
-            <a:r>
-              <a:rPr lang="en-US" sz="2400"/>
-              <a:t>operational phase. </a:t>
-            </a:r>
-            <a:endParaRPr lang="en-US" sz="2400" dirty="0"/>
+              <a:t> in the operational phase. </a:t>
+            </a:r>
           </a:p>
           <a:p>
             <a:pPr>
@@ -7274,7 +7269,7 @@
             </a:pPr>
             <a:r>
               <a:rPr lang="en-US" sz="2400" dirty="0"/>
-              <a:t>Considerations for providing multiple </a:t>
+              <a:t>There may be cases for providing multiple </a:t>
             </a:r>
             <a:r>
               <a:rPr lang="en-US" sz="2400" dirty="0" err="1"/>
@@ -7282,7 +7277,7 @@
             </a:r>
             <a:r>
               <a:rPr lang="en-US" sz="2400" dirty="0"/>
-              <a:t> to a pledge during onboarding. Connected use cases may relate to </a:t>
+              <a:t> during onboarding like: </a:t>
             </a:r>
           </a:p>
           <a:p>
@@ -7316,7 +7311,7 @@
             </a:pPr>
             <a:r>
               <a:rPr lang="en-US" dirty="0"/>
-              <a:t>handovers from domain 1 to domain 2 during installation and commissioning </a:t>
+              <a:t>Handle handovers from domain 1 to domain 2 during installation and commissioning </a:t>
             </a:r>
           </a:p>
           <a:p>
@@ -7333,7 +7328,36 @@
             </a:pPr>
             <a:r>
               <a:rPr lang="en-US" sz="2400" dirty="0"/>
-              <a:t>Technically, this may be achieved using CSR attribute request messages of the enrollment protocol (as defined in BRSKI) and trigger messages for the pledge (as defined in BRSKI-PRM), but operational workflow discussions may be necessary and could be used to enhance ID </a:t>
+              <a:t>Technically, this may be achieved once the generic </a:t>
+            </a:r>
+            <a:r>
+              <a:rPr lang="en-US" sz="2400" dirty="0" err="1"/>
+              <a:t>LDevID</a:t>
+            </a:r>
+            <a:r>
+              <a:rPr lang="en-US" sz="2400" dirty="0"/>
+              <a:t> is enrolled using CSR attribute request messages of the enrollment protocol (as defined in BRSKI) or trigger messages for the pledge (as defined in BRSKI-PRM)</a:t>
+            </a:r>
+          </a:p>
+          <a:p>
+            <a:pPr>
+              <a:lnSpc>
+                <a:spcPct val="100000"/>
+              </a:lnSpc>
+              <a:spcBef>
+                <a:spcPts val="600"/>
+              </a:spcBef>
+              <a:buSzPct val="80000"/>
+              <a:buFont typeface="Calibri" panose="020F0502020204030204" pitchFamily="34" charset="0"/>
+              <a:buChar char="–"/>
+            </a:pPr>
+            <a:r>
+              <a:rPr lang="en-US" sz="2400"/>
+              <a:t>Operational </a:t>
+            </a:r>
+            <a:r>
+              <a:rPr lang="en-US" sz="2400" dirty="0"/>
+              <a:t>workflow discussions may be necessary and could be used to enhance ID </a:t>
             </a:r>
             <a:r>
               <a:rPr lang="en-US" sz="2400" dirty="0">
@@ -7620,7 +7644,7 @@
             <a:fld id="{8C792E63-5F21-4F54-A864-D84D9F273FCA}" type="datetimeFigureOut">
               <a:rPr lang="en-US" smtClean="0"/>
               <a:pPr/>
-              <a:t>7/16/2024</a:t>
+              <a:t>7/22/2024</a:t>
             </a:fld>
             <a:endParaRPr lang="en-US" dirty="0"/>
           </a:p>
@@ -12426,28 +12450,6 @@
 </file>
 
 <file path=customXml/item1.xml><?xml version="1.0" encoding="utf-8"?>
-<p:properties xmlns:p="http://schemas.microsoft.com/office/2006/metadata/properties" xmlns:xsi="http://www.w3.org/2001/XMLSchema-instance" xmlns:pc="http://schemas.microsoft.com/office/infopath/2007/PartnerControls">
-  <documentManagement>
-    <_ip_UnifiedCompliancePolicyUIAction xmlns="http://schemas.microsoft.com/sharepoint/v3" xsi:nil="true"/>
-    <TaxCatchAll xmlns="56810815-8df0-4f10-8da7-34164765fbe3" xsi:nil="true"/>
-    <_ip_UnifiedCompliancePolicyProperties xmlns="http://schemas.microsoft.com/sharepoint/v3" xsi:nil="true"/>
-    <lcf76f155ced4ddcb4097134ff3c332f xmlns="a9de424c-86b2-47ed-8d4e-0a9b7010e669">
-      <Terms xmlns="http://schemas.microsoft.com/office/infopath/2007/PartnerControls"/>
-    </lcf76f155ced4ddcb4097134ff3c332f>
-  </documentManagement>
-</p:properties>
-</file>
-
-<file path=customXml/item2.xml><?xml version="1.0" encoding="utf-8"?>
-<?mso-contentType ?>
-<FormTemplates xmlns="http://schemas.microsoft.com/sharepoint/v3/contenttype/forms">
-  <Display>DocumentLibraryForm</Display>
-  <Edit>DocumentLibraryForm</Edit>
-  <New>DocumentLibraryForm</New>
-</FormTemplates>
-</file>
-
-<file path=customXml/item3.xml><?xml version="1.0" encoding="utf-8"?>
 <ct:contentTypeSchema xmlns:ct="http://schemas.microsoft.com/office/2006/metadata/contentType" xmlns:ma="http://schemas.microsoft.com/office/2006/metadata/properties/metaAttributes" ct:_="" ma:_="" ma:contentTypeName="Dokument" ma:contentTypeID="0x01010035CD6C532085F8449DFAA9E5E2A73509" ma:contentTypeVersion="22" ma:contentTypeDescription="Ein neues Dokument erstellen." ma:contentTypeScope="" ma:versionID="79025ec143ee1b8f4e002a25dcc445cd">
   <xsd:schema xmlns:xsd="http://www.w3.org/2001/XMLSchema" xmlns:xs="http://www.w3.org/2001/XMLSchema" xmlns:p="http://schemas.microsoft.com/office/2006/metadata/properties" xmlns:ns1="http://schemas.microsoft.com/sharepoint/v3" xmlns:ns2="ce079751-a51b-4a27-9376-edf93eae18d5" xmlns:ns3="a9de424c-86b2-47ed-8d4e-0a9b7010e669" xmlns:ns4="56810815-8df0-4f10-8da7-34164765fbe3" targetNamespace="http://schemas.microsoft.com/office/2006/metadata/properties" ma:root="true" ma:fieldsID="a349604d5808155358041a2fa3bfdc5c" ns1:_="" ns2:_="" ns3:_="" ns4:_="">
     <xsd:import namespace="http://schemas.microsoft.com/sharepoint/v3"/>
@@ -12724,34 +12726,29 @@
 </ct:contentTypeSchema>
 </file>
 
-<file path=customXml/itemProps1.xml><?xml version="1.0" encoding="utf-8"?>
-<ds:datastoreItem xmlns:ds="http://schemas.openxmlformats.org/officeDocument/2006/customXml" ds:itemID="{B4A0114C-CA0B-42DA-9E9D-9562C5DE829E}">
-  <ds:schemaRefs>
-    <ds:schemaRef ds:uri="ce079751-a51b-4a27-9376-edf93eae18d5"/>
-    <ds:schemaRef ds:uri="http://purl.org/dc/dcmitype/"/>
-    <ds:schemaRef ds:uri="a9de424c-86b2-47ed-8d4e-0a9b7010e669"/>
-    <ds:schemaRef ds:uri="http://schemas.microsoft.com/office/infopath/2007/PartnerControls"/>
-    <ds:schemaRef ds:uri="http://www.w3.org/XML/1998/namespace"/>
-    <ds:schemaRef ds:uri="http://purl.org/dc/terms/"/>
-    <ds:schemaRef ds:uri="http://schemas.microsoft.com/sharepoint/v3"/>
-    <ds:schemaRef ds:uri="http://schemas.openxmlformats.org/package/2006/metadata/core-properties"/>
-    <ds:schemaRef ds:uri="http://purl.org/dc/elements/1.1/"/>
-    <ds:schemaRef ds:uri="http://schemas.microsoft.com/office/2006/documentManagement/types"/>
-    <ds:schemaRef ds:uri="56810815-8df0-4f10-8da7-34164765fbe3"/>
-    <ds:schemaRef ds:uri="http://schemas.microsoft.com/office/2006/metadata/properties"/>
-  </ds:schemaRefs>
-</ds:datastoreItem>
+<file path=customXml/item2.xml><?xml version="1.0" encoding="utf-8"?>
+<?mso-contentType ?>
+<FormTemplates xmlns="http://schemas.microsoft.com/sharepoint/v3/contenttype/forms">
+  <Display>DocumentLibraryForm</Display>
+  <Edit>DocumentLibraryForm</Edit>
+  <New>DocumentLibraryForm</New>
+</FormTemplates>
 </file>
 
-<file path=customXml/itemProps2.xml><?xml version="1.0" encoding="utf-8"?>
-<ds:datastoreItem xmlns:ds="http://schemas.openxmlformats.org/officeDocument/2006/customXml" ds:itemID="{D24FD0D5-2F45-43E0-BE44-54B1E275E4BC}">
-  <ds:schemaRefs>
-    <ds:schemaRef ds:uri="http://schemas.microsoft.com/sharepoint/v3/contenttype/forms"/>
-  </ds:schemaRefs>
-</ds:datastoreItem>
+<file path=customXml/item3.xml><?xml version="1.0" encoding="utf-8"?>
+<p:properties xmlns:p="http://schemas.microsoft.com/office/2006/metadata/properties" xmlns:xsi="http://www.w3.org/2001/XMLSchema-instance" xmlns:pc="http://schemas.microsoft.com/office/infopath/2007/PartnerControls">
+  <documentManagement>
+    <_ip_UnifiedCompliancePolicyUIAction xmlns="http://schemas.microsoft.com/sharepoint/v3" xsi:nil="true"/>
+    <TaxCatchAll xmlns="56810815-8df0-4f10-8da7-34164765fbe3" xsi:nil="true"/>
+    <_ip_UnifiedCompliancePolicyProperties xmlns="http://schemas.microsoft.com/sharepoint/v3" xsi:nil="true"/>
+    <lcf76f155ced4ddcb4097134ff3c332f xmlns="a9de424c-86b2-47ed-8d4e-0a9b7010e669">
+      <Terms xmlns="http://schemas.microsoft.com/office/infopath/2007/PartnerControls"/>
+    </lcf76f155ced4ddcb4097134ff3c332f>
+  </documentManagement>
+</p:properties>
 </file>
 
-<file path=customXml/itemProps3.xml><?xml version="1.0" encoding="utf-8"?>
+<file path=customXml/itemProps1.xml><?xml version="1.0" encoding="utf-8"?>
 <ds:datastoreItem xmlns:ds="http://schemas.openxmlformats.org/officeDocument/2006/customXml" ds:itemID="{ED4F657C-2D71-40B5-9B4F-EEE28F4C1523}">
   <ds:schemaRefs>
     <ds:schemaRef ds:uri="http://schemas.microsoft.com/office/2006/metadata/contentType"/>
@@ -12772,6 +12769,33 @@
 </ds:datastoreItem>
 </file>
 
+<file path=customXml/itemProps2.xml><?xml version="1.0" encoding="utf-8"?>
+<ds:datastoreItem xmlns:ds="http://schemas.openxmlformats.org/officeDocument/2006/customXml" ds:itemID="{D24FD0D5-2F45-43E0-BE44-54B1E275E4BC}">
+  <ds:schemaRefs>
+    <ds:schemaRef ds:uri="http://schemas.microsoft.com/sharepoint/v3/contenttype/forms"/>
+  </ds:schemaRefs>
+</ds:datastoreItem>
+</file>
+
+<file path=customXml/itemProps3.xml><?xml version="1.0" encoding="utf-8"?>
+<ds:datastoreItem xmlns:ds="http://schemas.openxmlformats.org/officeDocument/2006/customXml" ds:itemID="{B4A0114C-CA0B-42DA-9E9D-9562C5DE829E}">
+  <ds:schemaRefs>
+    <ds:schemaRef ds:uri="ce079751-a51b-4a27-9376-edf93eae18d5"/>
+    <ds:schemaRef ds:uri="http://purl.org/dc/dcmitype/"/>
+    <ds:schemaRef ds:uri="a9de424c-86b2-47ed-8d4e-0a9b7010e669"/>
+    <ds:schemaRef ds:uri="http://schemas.microsoft.com/office/infopath/2007/PartnerControls"/>
+    <ds:schemaRef ds:uri="http://www.w3.org/XML/1998/namespace"/>
+    <ds:schemaRef ds:uri="http://purl.org/dc/terms/"/>
+    <ds:schemaRef ds:uri="http://schemas.microsoft.com/sharepoint/v3"/>
+    <ds:schemaRef ds:uri="http://schemas.openxmlformats.org/package/2006/metadata/core-properties"/>
+    <ds:schemaRef ds:uri="http://purl.org/dc/elements/1.1/"/>
+    <ds:schemaRef ds:uri="http://schemas.microsoft.com/office/2006/documentManagement/types"/>
+    <ds:schemaRef ds:uri="56810815-8df0-4f10-8da7-34164765fbe3"/>
+    <ds:schemaRef ds:uri="http://schemas.microsoft.com/office/2006/metadata/properties"/>
+  </ds:schemaRefs>
+</ds:datastoreItem>
+</file>
+
 <file path=docMetadata/LabelInfo.xml><?xml version="1.0" encoding="utf-8"?>
 <clbl:labelList xmlns:clbl="http://schemas.microsoft.com/office/2020/mipLabelMetadata">
   <clbl:label id="{6f75f480-7803-4ee9-bb54-84d0635fdbe7}" enabled="1" method="Standard" siteId="{38ae3bcd-9579-4fd4-adda-b42e1495d55a}" contentBits="0" removed="0"/>

</xml_diff>

<commit_message>
included IDevID in SAN question
</commit_message>
<xml_diff>
--- a/presentations/slides-120-anima-update-brski-with-pledge-in-responder-mode-brski-prm.pptx
+++ b/presentations/slides-120-anima-update-brski-with-pledge-in-responder-mode-brski-prm.pptx
@@ -5,15 +5,16 @@
     <p:sldMasterId id="2147483663" r:id="rId4"/>
   </p:sldMasterIdLst>
   <p:notesMasterIdLst>
-    <p:notesMasterId r:id="rId11"/>
+    <p:notesMasterId r:id="rId12"/>
   </p:notesMasterIdLst>
   <p:sldIdLst>
     <p:sldId id="310" r:id="rId5"/>
     <p:sldId id="324" r:id="rId6"/>
     <p:sldId id="325" r:id="rId7"/>
-    <p:sldId id="311" r:id="rId8"/>
+    <p:sldId id="327" r:id="rId8"/>
     <p:sldId id="326" r:id="rId9"/>
-    <p:sldId id="285" r:id="rId10"/>
+    <p:sldId id="311" r:id="rId10"/>
+    <p:sldId id="285" r:id="rId11"/>
   </p:sldIdLst>
   <p:sldSz cx="12192000" cy="6858000"/>
   <p:notesSz cx="6858000" cy="9144000"/>
@@ -146,35 +147,6 @@
 </p:cmAuthorLst>
 </file>
 
-<file path=ppt/changesInfos/changesInfo1.xml><?xml version="1.0" encoding="utf-8"?>
-<pc:chgInfo xmlns:a="http://schemas.openxmlformats.org/drawingml/2006/main" xmlns:r="http://schemas.openxmlformats.org/officeDocument/2006/relationships" xmlns:ac="http://schemas.microsoft.com/office/drawing/2013/main/command" xmlns:pc="http://schemas.microsoft.com/office/powerpoint/2013/main/command">
-  <pc:docChgLst>
-    <pc:chgData name="Werner, Thomas (T CST SEA-DE)" userId="ed58e375-8b61-4f81-b7fb-5ecac9cc7b9e" providerId="ADAL" clId="{5EF59296-C751-684C-B041-7DFD88D38AC7}"/>
-    <pc:docChg chg="undo custSel modSld">
-      <pc:chgData name="Werner, Thomas (T CST SEA-DE)" userId="ed58e375-8b61-4f81-b7fb-5ecac9cc7b9e" providerId="ADAL" clId="{5EF59296-C751-684C-B041-7DFD88D38AC7}" dt="2024-03-15T07:14:15.949" v="86" actId="20577"/>
-      <pc:docMkLst>
-        <pc:docMk/>
-      </pc:docMkLst>
-      <pc:sldChg chg="modSp mod">
-        <pc:chgData name="Werner, Thomas (T CST SEA-DE)" userId="ed58e375-8b61-4f81-b7fb-5ecac9cc7b9e" providerId="ADAL" clId="{5EF59296-C751-684C-B041-7DFD88D38AC7}" dt="2024-03-15T07:14:15.949" v="86" actId="20577"/>
-        <pc:sldMkLst>
-          <pc:docMk/>
-          <pc:sldMk cId="2975318478" sldId="311"/>
-        </pc:sldMkLst>
-        <pc:spChg chg="mod">
-          <ac:chgData name="Werner, Thomas (T CST SEA-DE)" userId="ed58e375-8b61-4f81-b7fb-5ecac9cc7b9e" providerId="ADAL" clId="{5EF59296-C751-684C-B041-7DFD88D38AC7}" dt="2024-03-15T07:14:15.949" v="86" actId="20577"/>
-          <ac:spMkLst>
-            <pc:docMk/>
-            <pc:sldMk cId="2975318478" sldId="311"/>
-            <ac:spMk id="3" creationId="{A9776AB7-EF6B-4831-BA5E-A2298E1B08F8}"/>
-          </ac:spMkLst>
-        </pc:spChg>
-      </pc:sldChg>
-    </pc:docChg>
-  </pc:docChgLst>
-</pc:chgInfo>
-</file>
-
 <file path=ppt/notesMasters/notesMaster1.xml><?xml version="1.0" encoding="utf-8"?>
 <p:notesMaster xmlns:a="http://schemas.openxmlformats.org/drawingml/2006/main" xmlns:r="http://schemas.openxmlformats.org/officeDocument/2006/relationships" xmlns:p="http://schemas.openxmlformats.org/presentationml/2006/main">
   <p:cSld>
@@ -257,7 +229,7 @@
           <a:p>
             <a:fld id="{33B5B5E8-CA78-4A82-83A0-867EF5A818AE}" type="datetimeFigureOut">
               <a:rPr lang="en-US" smtClean="0"/>
-              <a:t>7/22/2024</a:t>
+              <a:t>7/23/2024</a:t>
             </a:fld>
             <a:endParaRPr lang="en-US"/>
           </a:p>
@@ -1780,7 +1752,7 @@
     </p:spTree>
     <p:extLst>
       <p:ext uri="{BB962C8B-B14F-4D97-AF65-F5344CB8AC3E}">
-        <p14:creationId xmlns:p14="http://schemas.microsoft.com/office/powerpoint/2010/main" val="490717640"/>
+        <p14:creationId xmlns:p14="http://schemas.microsoft.com/office/powerpoint/2010/main" val="4103609221"/>
       </p:ext>
     </p:extLst>
   </p:cSld>
@@ -1940,6 +1912,90 @@
             <a:fld id="{4C6D392E-C4EF-4AC5-9CF0-E17168E17BBE}" type="slidenum">
               <a:rPr lang="en-US" smtClean="0"/>
               <a:t>6</a:t>
+            </a:fld>
+            <a:endParaRPr lang="en-US"/>
+          </a:p>
+        </p:txBody>
+      </p:sp>
+    </p:spTree>
+    <p:extLst>
+      <p:ext uri="{BB962C8B-B14F-4D97-AF65-F5344CB8AC3E}">
+        <p14:creationId xmlns:p14="http://schemas.microsoft.com/office/powerpoint/2010/main" val="490717640"/>
+      </p:ext>
+    </p:extLst>
+  </p:cSld>
+  <p:clrMapOvr>
+    <a:masterClrMapping/>
+  </p:clrMapOvr>
+</p:notes>
+</file>
+
+<file path=ppt/notesSlides/notesSlide6.xml><?xml version="1.0" encoding="utf-8"?>
+<p:notes xmlns:a="http://schemas.openxmlformats.org/drawingml/2006/main" xmlns:r="http://schemas.openxmlformats.org/officeDocument/2006/relationships" xmlns:p="http://schemas.openxmlformats.org/presentationml/2006/main">
+  <p:cSld>
+    <p:spTree>
+      <p:nvGrpSpPr>
+        <p:cNvPr id="1" name=""/>
+        <p:cNvGrpSpPr/>
+        <p:nvPr/>
+      </p:nvGrpSpPr>
+      <p:grpSpPr>
+        <a:xfrm>
+          <a:off x="0" y="0"/>
+          <a:ext cx="0" cy="0"/>
+          <a:chOff x="0" y="0"/>
+          <a:chExt cx="0" cy="0"/>
+        </a:xfrm>
+      </p:grpSpPr>
+      <p:sp>
+        <p:nvSpPr>
+          <p:cNvPr id="2" name="Slide Image Placeholder 1"/>
+          <p:cNvSpPr>
+            <a:spLocks noGrp="1" noRot="1" noChangeAspect="1"/>
+          </p:cNvSpPr>
+          <p:nvPr>
+            <p:ph type="sldImg"/>
+          </p:nvPr>
+        </p:nvSpPr>
+        <p:spPr/>
+      </p:sp>
+      <p:sp>
+        <p:nvSpPr>
+          <p:cNvPr id="3" name="Notes Placeholder 2"/>
+          <p:cNvSpPr>
+            <a:spLocks noGrp="1"/>
+          </p:cNvSpPr>
+          <p:nvPr>
+            <p:ph type="body" idx="1"/>
+          </p:nvPr>
+        </p:nvSpPr>
+        <p:spPr/>
+        <p:txBody>
+          <a:bodyPr/>
+          <a:lstStyle/>
+          <a:p>
+            <a:endParaRPr lang="en-US" dirty="0"/>
+          </a:p>
+        </p:txBody>
+      </p:sp>
+      <p:sp>
+        <p:nvSpPr>
+          <p:cNvPr id="4" name="Slide Number Placeholder 3"/>
+          <p:cNvSpPr>
+            <a:spLocks noGrp="1"/>
+          </p:cNvSpPr>
+          <p:nvPr>
+            <p:ph type="sldNum" sz="quarter" idx="5"/>
+          </p:nvPr>
+        </p:nvSpPr>
+        <p:spPr/>
+        <p:txBody>
+          <a:bodyPr/>
+          <a:lstStyle/>
+          <a:p>
+            <a:fld id="{4C6D392E-C4EF-4AC5-9CF0-E17168E17BBE}" type="slidenum">
+              <a:rPr lang="en-US" smtClean="0"/>
+              <a:t>7</a:t>
             </a:fld>
             <a:endParaRPr lang="en-US"/>
           </a:p>
@@ -2113,7 +2169,7 @@
           <a:p>
             <a:fld id="{8C792E63-5F21-4F54-A864-D84D9F273FCA}" type="datetimeFigureOut">
               <a:rPr lang="en-US" smtClean="0"/>
-              <a:t>7/22/2024</a:t>
+              <a:t>7/23/2024</a:t>
             </a:fld>
             <a:endParaRPr lang="en-US" dirty="0"/>
           </a:p>
@@ -2331,7 +2387,7 @@
           <a:p>
             <a:fld id="{8C792E63-5F21-4F54-A864-D84D9F273FCA}" type="datetimeFigureOut">
               <a:rPr lang="en-US" smtClean="0"/>
-              <a:t>7/22/2024</a:t>
+              <a:t>7/23/2024</a:t>
             </a:fld>
             <a:endParaRPr lang="en-US"/>
           </a:p>
@@ -2555,7 +2611,7 @@
           <a:p>
             <a:fld id="{8C792E63-5F21-4F54-A864-D84D9F273FCA}" type="datetimeFigureOut">
               <a:rPr lang="en-US" smtClean="0"/>
-              <a:t>7/22/2024</a:t>
+              <a:t>7/23/2024</a:t>
             </a:fld>
             <a:endParaRPr lang="en-US"/>
           </a:p>
@@ -2769,7 +2825,7 @@
           <a:p>
             <a:fld id="{8C792E63-5F21-4F54-A864-D84D9F273FCA}" type="datetimeFigureOut">
               <a:rPr lang="en-US" smtClean="0"/>
-              <a:t>7/22/2024</a:t>
+              <a:t>7/23/2024</a:t>
             </a:fld>
             <a:endParaRPr lang="en-US"/>
           </a:p>
@@ -3060,7 +3116,7 @@
           <a:p>
             <a:fld id="{8C792E63-5F21-4F54-A864-D84D9F273FCA}" type="datetimeFigureOut">
               <a:rPr lang="en-US" smtClean="0"/>
-              <a:t>7/22/2024</a:t>
+              <a:t>7/23/2024</a:t>
             </a:fld>
             <a:endParaRPr lang="en-US"/>
           </a:p>
@@ -3341,7 +3397,7 @@
           <a:p>
             <a:fld id="{8C792E63-5F21-4F54-A864-D84D9F273FCA}" type="datetimeFigureOut">
               <a:rPr lang="en-US" smtClean="0"/>
-              <a:t>7/22/2024</a:t>
+              <a:t>7/23/2024</a:t>
             </a:fld>
             <a:endParaRPr lang="en-US"/>
           </a:p>
@@ -3769,7 +3825,7 @@
           <a:p>
             <a:fld id="{8C792E63-5F21-4F54-A864-D84D9F273FCA}" type="datetimeFigureOut">
               <a:rPr lang="en-US" smtClean="0"/>
-              <a:t>7/22/2024</a:t>
+              <a:t>7/23/2024</a:t>
             </a:fld>
             <a:endParaRPr lang="en-US"/>
           </a:p>
@@ -3926,7 +3982,7 @@
           <a:p>
             <a:fld id="{8C792E63-5F21-4F54-A864-D84D9F273FCA}" type="datetimeFigureOut">
               <a:rPr lang="en-US" smtClean="0"/>
-              <a:t>7/22/2024</a:t>
+              <a:t>7/23/2024</a:t>
             </a:fld>
             <a:endParaRPr lang="en-US"/>
           </a:p>
@@ -4055,7 +4111,7 @@
           <a:p>
             <a:fld id="{8C792E63-5F21-4F54-A864-D84D9F273FCA}" type="datetimeFigureOut">
               <a:rPr lang="en-US" smtClean="0"/>
-              <a:t>7/22/2024</a:t>
+              <a:t>7/23/2024</a:t>
             </a:fld>
             <a:endParaRPr lang="en-US"/>
           </a:p>
@@ -4382,7 +4438,7 @@
           <a:p>
             <a:fld id="{8C792E63-5F21-4F54-A864-D84D9F273FCA}" type="datetimeFigureOut">
               <a:rPr lang="en-US" smtClean="0"/>
-              <a:t>7/22/2024</a:t>
+              <a:t>7/23/2024</a:t>
             </a:fld>
             <a:endParaRPr lang="en-US"/>
           </a:p>
@@ -4686,7 +4742,7 @@
           <a:p>
             <a:fld id="{8C792E63-5F21-4F54-A864-D84D9F273FCA}" type="datetimeFigureOut">
               <a:rPr lang="en-US" smtClean="0"/>
-              <a:t>7/22/2024</a:t>
+              <a:t>7/23/2024</a:t>
             </a:fld>
             <a:endParaRPr lang="en-US"/>
           </a:p>
@@ -4978,7 +5034,7 @@
           <a:p>
             <a:fld id="{8C792E63-5F21-4F54-A864-D84D9F273FCA}" type="datetimeFigureOut">
               <a:rPr lang="en-US" smtClean="0"/>
-              <a:t>7/22/2024</a:t>
+              <a:t>7/23/2024</a:t>
             </a:fld>
             <a:endParaRPr lang="en-US"/>
           </a:p>
@@ -5852,7 +5908,7 @@
             <a:fld id="{8C792E63-5F21-4F54-A864-D84D9F273FCA}" type="datetimeFigureOut">
               <a:rPr lang="en-US" smtClean="0"/>
               <a:pPr/>
-              <a:t>7/22/2024</a:t>
+              <a:t>7/23/2024</a:t>
             </a:fld>
             <a:endParaRPr lang="en-US" dirty="0"/>
           </a:p>
@@ -6396,7 +6452,7 @@
             <a:fld id="{8C792E63-5F21-4F54-A864-D84D9F273FCA}" type="datetimeFigureOut">
               <a:rPr lang="en-US" smtClean="0"/>
               <a:pPr/>
-              <a:t>7/22/2024</a:t>
+              <a:t>7/23/2024</a:t>
             </a:fld>
             <a:endParaRPr lang="en-US" dirty="0"/>
           </a:p>
@@ -6589,15 +6645,13 @@
           <a:p>
             <a:r>
               <a:rPr lang="en-US" sz="3600" dirty="0"/>
-              <a:t>BRSKI-PRM </a:t>
-            </a:r>
-            <a:br>
-              <a:rPr lang="en-US" sz="3600" dirty="0"/>
-            </a:br>
-            <a:r>
-              <a:rPr lang="en-US" sz="3600" dirty="0"/>
-              <a:t>Status &amp; Next Steps</a:t>
-            </a:r>
+              <a:t>Food for thoughts: Supporting .local name in </a:t>
+            </a:r>
+            <a:r>
+              <a:rPr lang="en-US" sz="3600" dirty="0" err="1"/>
+              <a:t>IDevID</a:t>
+            </a:r>
+            <a:endParaRPr lang="en-US" sz="3600" dirty="0"/>
           </a:p>
         </p:txBody>
       </p:sp>
@@ -6619,8 +6673,8 @@
         </p:nvSpPr>
         <p:spPr>
           <a:xfrm>
-            <a:off x="701640" y="1794397"/>
-            <a:ext cx="10515600" cy="4467973"/>
+            <a:off x="701639" y="1690688"/>
+            <a:ext cx="11000365" cy="4467973"/>
           </a:xfrm>
         </p:spPr>
         <p:txBody>
@@ -6641,14 +6695,8 @@
               <a:buChar char="–"/>
             </a:pPr>
             <a:r>
-              <a:rPr lang="en-US" sz="2400" dirty="0">
-                <a:solidFill>
-                  <a:schemeClr val="bg1">
-                    <a:lumMod val="50000"/>
-                  </a:schemeClr>
-                </a:solidFill>
-              </a:rPr>
-              <a:t>WGLC before IETF 116 - DONE</a:t>
+              <a:rPr lang="en-US" sz="2400" dirty="0"/>
+              <a:t>BRSKI-PRM uses http and relies on self-contained authenticated objects for the communication between the registrar-agent and the pledge</a:t>
             </a:r>
           </a:p>
           <a:p>
@@ -6664,14 +6712,8 @@
               <a:buChar char="–"/>
             </a:pPr>
             <a:r>
-              <a:rPr lang="en-US" sz="2400" dirty="0">
-                <a:solidFill>
-                  <a:schemeClr val="bg1">
-                    <a:lumMod val="50000"/>
-                  </a:schemeClr>
-                </a:solidFill>
-              </a:rPr>
-              <a:t>IOT DIR early review - DONE </a:t>
+              <a:rPr lang="en-US" sz="2400" dirty="0"/>
+              <a:t>For privacy reasons TLS may be used for this link, making the pledge the TLS server. </a:t>
             </a:r>
           </a:p>
           <a:p>
@@ -6687,14 +6729,24 @@
               <a:buChar char="–"/>
             </a:pPr>
             <a:r>
-              <a:rPr lang="en-US" sz="2400" dirty="0">
-                <a:solidFill>
-                  <a:schemeClr val="bg1">
-                    <a:lumMod val="50000"/>
-                  </a:schemeClr>
-                </a:solidFill>
-              </a:rPr>
-              <a:t>SECDIR early review – DONE</a:t>
+              <a:rPr lang="en-US" sz="2400" dirty="0"/>
+              <a:t>BRSKI-PRM states (Annex B): Pledge can use its </a:t>
+            </a:r>
+            <a:r>
+              <a:rPr lang="en-US" sz="2400" dirty="0" err="1"/>
+              <a:t>IDevID</a:t>
+            </a:r>
+            <a:r>
+              <a:rPr lang="en-US" sz="2400" dirty="0"/>
+              <a:t> certificate to authenticate itself, but pledge does not have a FQDN, and hence cannot be identified by DNS name. Instead, a new mechanism is required, which authenticates the X520SerialNumber DN attribute that must be present in every </a:t>
+            </a:r>
+            <a:r>
+              <a:rPr lang="en-US" sz="2400" dirty="0" err="1"/>
+              <a:t>IDevID</a:t>
+            </a:r>
+            <a:r>
+              <a:rPr lang="en-US" sz="2400" dirty="0"/>
+              <a:t>.</a:t>
             </a:r>
           </a:p>
           <a:p>
@@ -6710,24 +6762,24 @@
               <a:buChar char="–"/>
             </a:pPr>
             <a:r>
-              <a:rPr lang="en-GB" sz="2400" dirty="0">
-                <a:solidFill>
-                  <a:schemeClr val="bg1">
-                    <a:lumMod val="50000"/>
-                  </a:schemeClr>
-                </a:solidFill>
-              </a:rPr>
-              <a:t>YANGDOCTORS  early review </a:t>
-            </a:r>
-            <a:r>
-              <a:rPr lang="en-US" sz="2400" dirty="0">
-                <a:solidFill>
-                  <a:schemeClr val="bg1">
-                    <a:lumMod val="50000"/>
-                  </a:schemeClr>
-                </a:solidFill>
-              </a:rPr>
-              <a:t>– DONE</a:t>
+              <a:rPr lang="en-US" sz="2400" dirty="0"/>
+              <a:t>As BRSKI-PRM uses </a:t>
+            </a:r>
+            <a:r>
+              <a:rPr lang="en-US" sz="2400" dirty="0" err="1"/>
+              <a:t>mDNS</a:t>
+            </a:r>
+            <a:r>
+              <a:rPr lang="en-US" sz="2400" dirty="0"/>
+              <a:t> to discover the pledge it may provide its local name to the registrar-agent. If </a:t>
+            </a:r>
+            <a:r>
+              <a:rPr lang="en-US" sz="2400" dirty="0" err="1"/>
+              <a:t>IDevID</a:t>
+            </a:r>
+            <a:r>
+              <a:rPr lang="en-US" sz="2400" dirty="0"/>
+              <a:t> contains the local name the registrar-agent can use this information during the authentication in the handshake without a new mechanism.</a:t>
             </a:r>
           </a:p>
           <a:p>
@@ -6743,123 +6795,23 @@
               <a:buChar char="–"/>
             </a:pPr>
             <a:r>
-              <a:rPr lang="en-GB" sz="2400" dirty="0">
-                <a:solidFill>
-                  <a:schemeClr val="bg1">
-                    <a:lumMod val="50000"/>
-                  </a:schemeClr>
-                </a:solidFill>
+              <a:rPr lang="en-US" sz="2400" dirty="0"/>
+              <a:t>Note: .local is not an FQDN; </a:t>
+            </a:r>
+            <a:r>
+              <a:rPr lang="en-US" sz="2400" dirty="0">
+                <a:hlinkClick r:id="rId3"/>
               </a:rPr>
-              <a:t>Shepherd review and writeup </a:t>
-            </a:r>
-            <a:r>
-              <a:rPr lang="en-US" sz="2400" dirty="0">
-                <a:solidFill>
-                  <a:schemeClr val="bg1">
-                    <a:lumMod val="50000"/>
-                  </a:schemeClr>
-                </a:solidFill>
-              </a:rPr>
-              <a:t>– DONE</a:t>
-            </a:r>
-          </a:p>
-          <a:p>
-            <a:pPr>
-              <a:lnSpc>
-                <a:spcPct val="100000"/>
-              </a:lnSpc>
-              <a:spcBef>
-                <a:spcPts val="600"/>
-              </a:spcBef>
-              <a:buSzPct val="80000"/>
-              <a:buFont typeface="Calibri" panose="020F0502020204030204" pitchFamily="34" charset="0"/>
-              <a:buChar char="–"/>
-            </a:pPr>
-            <a:endParaRPr lang="en-US" sz="2400" dirty="0">
-              <a:solidFill>
-                <a:schemeClr val="bg1">
-                  <a:lumMod val="50000"/>
-                </a:schemeClr>
-              </a:solidFill>
-            </a:endParaRPr>
-          </a:p>
-          <a:p>
-            <a:pPr>
-              <a:lnSpc>
-                <a:spcPct val="100000"/>
-              </a:lnSpc>
-              <a:spcBef>
-                <a:spcPts val="600"/>
-              </a:spcBef>
-              <a:buSzPct val="80000"/>
-              <a:buFont typeface="Calibri" panose="020F0502020204030204" pitchFamily="34" charset="0"/>
-              <a:buChar char="–"/>
-            </a:pPr>
+              <a:t>CABF</a:t>
+            </a:r>
             <a:r>
               <a:rPr lang="en-US" sz="2400" dirty="0"/>
-              <a:t>Ready for AD review </a:t>
-            </a:r>
-          </a:p>
-          <a:p>
-            <a:pPr>
-              <a:lnSpc>
-                <a:spcPct val="100000"/>
-              </a:lnSpc>
-              <a:spcBef>
-                <a:spcPts val="600"/>
-              </a:spcBef>
-              <a:buSzPct val="80000"/>
-              <a:buFont typeface="Calibri" panose="020F0502020204030204" pitchFamily="34" charset="0"/>
-              <a:buChar char="–"/>
-            </a:pPr>
-            <a:endParaRPr lang="en-US" sz="2400" dirty="0"/>
-          </a:p>
-          <a:p>
-            <a:pPr>
-              <a:lnSpc>
-                <a:spcPct val="100000"/>
-              </a:lnSpc>
-              <a:spcBef>
-                <a:spcPts val="600"/>
-              </a:spcBef>
-              <a:buSzPct val="80000"/>
-              <a:buFont typeface="Calibri" panose="020F0502020204030204" pitchFamily="34" charset="0"/>
-              <a:buChar char="–"/>
-            </a:pPr>
-            <a:r>
-              <a:rPr lang="en-US" sz="2400" dirty="0"/>
-              <a:t>Further Interop testing with other parties welcome </a:t>
-            </a:r>
-            <a:r>
-              <a:rPr lang="en-US" sz="2400" dirty="0">
-                <a:sym typeface="Wingdings" panose="05000000000000000000" pitchFamily="2" charset="2"/>
-              </a:rPr>
-              <a:t>,</a:t>
-            </a:r>
-            <a:br>
-              <a:rPr lang="en-US" sz="2400" dirty="0">
-                <a:sym typeface="Wingdings" panose="05000000000000000000" pitchFamily="2" charset="2"/>
-              </a:rPr>
-            </a:br>
-            <a:r>
-              <a:rPr lang="en-US" sz="2400" dirty="0">
-                <a:sym typeface="Wingdings" panose="05000000000000000000" pitchFamily="2" charset="2"/>
-              </a:rPr>
-              <a:t>PoC implementations of all components available, please get in touch</a:t>
-            </a:r>
-          </a:p>
-          <a:p>
-            <a:pPr>
-              <a:lnSpc>
-                <a:spcPct val="100000"/>
-              </a:lnSpc>
-              <a:spcBef>
-                <a:spcPts val="600"/>
-              </a:spcBef>
-              <a:buSzPct val="80000"/>
-              <a:buFont typeface="Calibri" panose="020F0502020204030204" pitchFamily="34" charset="0"/>
-              <a:buChar char="–"/>
-            </a:pPr>
+              <a:t> does not allow internal names in the </a:t>
+            </a:r>
+            <a:r>
+              <a:rPr lang="en-US" sz="2400" dirty="0" err="1"/>
+              <a:t>dNSName</a:t>
+            </a:r>
             <a:endParaRPr lang="en-US" sz="2400" dirty="0"/>
           </a:p>
         </p:txBody>
@@ -7122,7 +7074,7 @@
             <a:fld id="{8C792E63-5F21-4F54-A864-D84D9F273FCA}" type="datetimeFigureOut">
               <a:rPr lang="en-US" smtClean="0"/>
               <a:pPr/>
-              <a:t>7/22/2024</a:t>
+              <a:t>7/23/2024</a:t>
             </a:fld>
             <a:endParaRPr lang="en-US" dirty="0"/>
           </a:p>
@@ -7131,7 +7083,7 @@
     </p:spTree>
     <p:extLst>
       <p:ext uri="{BB962C8B-B14F-4D97-AF65-F5344CB8AC3E}">
-        <p14:creationId xmlns:p14="http://schemas.microsoft.com/office/powerpoint/2010/main" val="2975318478"/>
+        <p14:creationId xmlns:p14="http://schemas.microsoft.com/office/powerpoint/2010/main" val="2666849367"/>
       </p:ext>
     </p:extLst>
   </p:cSld>
@@ -7183,7 +7135,15 @@
           <a:p>
             <a:r>
               <a:rPr lang="en-US" sz="3600" dirty="0"/>
-              <a:t>Food for thoughts: To be discussed in Design Team </a:t>
+              <a:t>Food for thoughts: Multiple </a:t>
+            </a:r>
+            <a:r>
+              <a:rPr lang="en-US" sz="3600" dirty="0" err="1"/>
+              <a:t>LDevID</a:t>
+            </a:r>
+            <a:r>
+              <a:rPr lang="en-US" sz="3600" dirty="0"/>
+              <a:t> Provisioning </a:t>
             </a:r>
             <a:br>
               <a:rPr lang="en-US" sz="3600" dirty="0"/>
@@ -7352,12 +7312,8 @@
               <a:buChar char="–"/>
             </a:pPr>
             <a:r>
-              <a:rPr lang="en-US" sz="2400"/>
-              <a:t>Operational </a:t>
-            </a:r>
-            <a:r>
               <a:rPr lang="en-US" sz="2400" dirty="0"/>
-              <a:t>workflow discussions may be necessary and could be used to enhance ID </a:t>
+              <a:t>Operational workflow discussions may be necessary: Should be used to enhance ID </a:t>
             </a:r>
             <a:r>
               <a:rPr lang="en-US" sz="2400" dirty="0">
@@ -7644,7 +7600,7 @@
             <a:fld id="{8C792E63-5F21-4F54-A864-D84D9F273FCA}" type="datetimeFigureOut">
               <a:rPr lang="en-US" smtClean="0"/>
               <a:pPr/>
-              <a:t>7/22/2024</a:t>
+              <a:t>7/23/2024</a:t>
             </a:fld>
             <a:endParaRPr lang="en-US" dirty="0"/>
           </a:p>
@@ -7705,12 +7661,278 @@
           <a:p>
             <a:r>
               <a:rPr lang="en-US" sz="3600" dirty="0"/>
-              <a:t>Backup: BRSKI-PRM – Abstract Protocol Overview</a:t>
+              <a:t>BRSKI-PRM </a:t>
             </a:r>
             <a:br>
               <a:rPr lang="en-US" sz="3600" dirty="0"/>
             </a:br>
-            <a:endParaRPr lang="en-US" sz="3600" dirty="0"/>
+            <a:r>
+              <a:rPr lang="en-US" sz="3600" dirty="0"/>
+              <a:t>Status &amp; Next Steps</a:t>
+            </a:r>
+          </a:p>
+        </p:txBody>
+      </p:sp>
+      <p:sp>
+        <p:nvSpPr>
+          <p:cNvPr id="3" name="Content Placeholder 2">
+            <a:extLst>
+              <a:ext uri="{FF2B5EF4-FFF2-40B4-BE49-F238E27FC236}">
+                <a16:creationId xmlns:a16="http://schemas.microsoft.com/office/drawing/2014/main" id="{A9776AB7-EF6B-4831-BA5E-A2298E1B08F8}"/>
+              </a:ext>
+            </a:extLst>
+          </p:cNvPr>
+          <p:cNvSpPr>
+            <a:spLocks noGrp="1"/>
+          </p:cNvSpPr>
+          <p:nvPr>
+            <p:ph idx="1"/>
+          </p:nvPr>
+        </p:nvSpPr>
+        <p:spPr>
+          <a:xfrm>
+            <a:off x="701640" y="1794397"/>
+            <a:ext cx="10515600" cy="4467973"/>
+          </a:xfrm>
+        </p:spPr>
+        <p:txBody>
+          <a:bodyPr>
+            <a:noAutofit/>
+          </a:bodyPr>
+          <a:lstStyle/>
+          <a:p>
+            <a:pPr>
+              <a:lnSpc>
+                <a:spcPct val="100000"/>
+              </a:lnSpc>
+              <a:spcBef>
+                <a:spcPts val="600"/>
+              </a:spcBef>
+              <a:buSzPct val="80000"/>
+              <a:buFont typeface="Calibri" panose="020F0502020204030204" pitchFamily="34" charset="0"/>
+              <a:buChar char="–"/>
+            </a:pPr>
+            <a:r>
+              <a:rPr lang="en-US" sz="2400" dirty="0">
+                <a:solidFill>
+                  <a:schemeClr val="bg1">
+                    <a:lumMod val="50000"/>
+                  </a:schemeClr>
+                </a:solidFill>
+              </a:rPr>
+              <a:t>WGLC before IETF 116 - DONE</a:t>
+            </a:r>
+          </a:p>
+          <a:p>
+            <a:pPr>
+              <a:lnSpc>
+                <a:spcPct val="100000"/>
+              </a:lnSpc>
+              <a:spcBef>
+                <a:spcPts val="600"/>
+              </a:spcBef>
+              <a:buSzPct val="80000"/>
+              <a:buFont typeface="Calibri" panose="020F0502020204030204" pitchFamily="34" charset="0"/>
+              <a:buChar char="–"/>
+            </a:pPr>
+            <a:r>
+              <a:rPr lang="en-US" sz="2400" dirty="0">
+                <a:solidFill>
+                  <a:schemeClr val="bg1">
+                    <a:lumMod val="50000"/>
+                  </a:schemeClr>
+                </a:solidFill>
+              </a:rPr>
+              <a:t>IOT DIR early review - DONE </a:t>
+            </a:r>
+          </a:p>
+          <a:p>
+            <a:pPr>
+              <a:lnSpc>
+                <a:spcPct val="100000"/>
+              </a:lnSpc>
+              <a:spcBef>
+                <a:spcPts val="600"/>
+              </a:spcBef>
+              <a:buSzPct val="80000"/>
+              <a:buFont typeface="Calibri" panose="020F0502020204030204" pitchFamily="34" charset="0"/>
+              <a:buChar char="–"/>
+            </a:pPr>
+            <a:r>
+              <a:rPr lang="en-US" sz="2400" dirty="0">
+                <a:solidFill>
+                  <a:schemeClr val="bg1">
+                    <a:lumMod val="50000"/>
+                  </a:schemeClr>
+                </a:solidFill>
+              </a:rPr>
+              <a:t>SECDIR early review – DONE</a:t>
+            </a:r>
+          </a:p>
+          <a:p>
+            <a:pPr>
+              <a:lnSpc>
+                <a:spcPct val="100000"/>
+              </a:lnSpc>
+              <a:spcBef>
+                <a:spcPts val="600"/>
+              </a:spcBef>
+              <a:buSzPct val="80000"/>
+              <a:buFont typeface="Calibri" panose="020F0502020204030204" pitchFamily="34" charset="0"/>
+              <a:buChar char="–"/>
+            </a:pPr>
+            <a:r>
+              <a:rPr lang="en-GB" sz="2400" dirty="0">
+                <a:solidFill>
+                  <a:schemeClr val="bg1">
+                    <a:lumMod val="50000"/>
+                  </a:schemeClr>
+                </a:solidFill>
+              </a:rPr>
+              <a:t>YANGDOCTORS  early review </a:t>
+            </a:r>
+            <a:r>
+              <a:rPr lang="en-US" sz="2400" dirty="0">
+                <a:solidFill>
+                  <a:schemeClr val="bg1">
+                    <a:lumMod val="50000"/>
+                  </a:schemeClr>
+                </a:solidFill>
+              </a:rPr>
+              <a:t>– DONE</a:t>
+            </a:r>
+          </a:p>
+          <a:p>
+            <a:pPr>
+              <a:lnSpc>
+                <a:spcPct val="100000"/>
+              </a:lnSpc>
+              <a:spcBef>
+                <a:spcPts val="600"/>
+              </a:spcBef>
+              <a:buSzPct val="80000"/>
+              <a:buFont typeface="Calibri" panose="020F0502020204030204" pitchFamily="34" charset="0"/>
+              <a:buChar char="–"/>
+            </a:pPr>
+            <a:r>
+              <a:rPr lang="en-GB" sz="2400" dirty="0">
+                <a:solidFill>
+                  <a:schemeClr val="bg1">
+                    <a:lumMod val="50000"/>
+                  </a:schemeClr>
+                </a:solidFill>
+              </a:rPr>
+              <a:t>Shepherd review and writeup </a:t>
+            </a:r>
+            <a:r>
+              <a:rPr lang="en-US" sz="2400" dirty="0">
+                <a:solidFill>
+                  <a:schemeClr val="bg1">
+                    <a:lumMod val="50000"/>
+                  </a:schemeClr>
+                </a:solidFill>
+              </a:rPr>
+              <a:t>– DONE</a:t>
+            </a:r>
+          </a:p>
+          <a:p>
+            <a:pPr>
+              <a:lnSpc>
+                <a:spcPct val="100000"/>
+              </a:lnSpc>
+              <a:spcBef>
+                <a:spcPts val="600"/>
+              </a:spcBef>
+              <a:buSzPct val="80000"/>
+              <a:buFont typeface="Calibri" panose="020F0502020204030204" pitchFamily="34" charset="0"/>
+              <a:buChar char="–"/>
+            </a:pPr>
+            <a:endParaRPr lang="en-US" sz="2400" dirty="0">
+              <a:solidFill>
+                <a:schemeClr val="bg1">
+                  <a:lumMod val="50000"/>
+                </a:schemeClr>
+              </a:solidFill>
+            </a:endParaRPr>
+          </a:p>
+          <a:p>
+            <a:pPr>
+              <a:lnSpc>
+                <a:spcPct val="100000"/>
+              </a:lnSpc>
+              <a:spcBef>
+                <a:spcPts val="600"/>
+              </a:spcBef>
+              <a:buSzPct val="80000"/>
+              <a:buFont typeface="Calibri" panose="020F0502020204030204" pitchFamily="34" charset="0"/>
+              <a:buChar char="–"/>
+            </a:pPr>
+            <a:r>
+              <a:rPr lang="en-US" sz="2400" dirty="0"/>
+              <a:t>Ready for AD review </a:t>
+            </a:r>
+          </a:p>
+          <a:p>
+            <a:pPr>
+              <a:lnSpc>
+                <a:spcPct val="100000"/>
+              </a:lnSpc>
+              <a:spcBef>
+                <a:spcPts val="600"/>
+              </a:spcBef>
+              <a:buSzPct val="80000"/>
+              <a:buFont typeface="Calibri" panose="020F0502020204030204" pitchFamily="34" charset="0"/>
+              <a:buChar char="–"/>
+            </a:pPr>
+            <a:endParaRPr lang="en-US" sz="2400" dirty="0"/>
+          </a:p>
+          <a:p>
+            <a:pPr>
+              <a:lnSpc>
+                <a:spcPct val="100000"/>
+              </a:lnSpc>
+              <a:spcBef>
+                <a:spcPts val="600"/>
+              </a:spcBef>
+              <a:buSzPct val="80000"/>
+              <a:buFont typeface="Calibri" panose="020F0502020204030204" pitchFamily="34" charset="0"/>
+              <a:buChar char="–"/>
+            </a:pPr>
+            <a:r>
+              <a:rPr lang="en-US" sz="2400" dirty="0"/>
+              <a:t>Further Interop testing with other parties welcome </a:t>
+            </a:r>
+            <a:r>
+              <a:rPr lang="en-US" sz="2400" dirty="0">
+                <a:sym typeface="Wingdings" panose="05000000000000000000" pitchFamily="2" charset="2"/>
+              </a:rPr>
+              <a:t>,</a:t>
+            </a:r>
+            <a:br>
+              <a:rPr lang="en-US" sz="2400" dirty="0">
+                <a:sym typeface="Wingdings" panose="05000000000000000000" pitchFamily="2" charset="2"/>
+              </a:rPr>
+            </a:br>
+            <a:r>
+              <a:rPr lang="en-US" sz="2400" dirty="0">
+                <a:sym typeface="Wingdings" panose="05000000000000000000" pitchFamily="2" charset="2"/>
+              </a:rPr>
+              <a:t>PoC implementations of all components available, please get in touch</a:t>
+            </a:r>
+          </a:p>
+          <a:p>
+            <a:pPr>
+              <a:lnSpc>
+                <a:spcPct val="100000"/>
+              </a:lnSpc>
+              <a:spcBef>
+                <a:spcPts val="600"/>
+              </a:spcBef>
+              <a:buSzPct val="80000"/>
+              <a:buFont typeface="Calibri" panose="020F0502020204030204" pitchFamily="34" charset="0"/>
+              <a:buChar char="–"/>
+            </a:pPr>
+            <a:endParaRPr lang="en-US" sz="2400" dirty="0"/>
           </a:p>
         </p:txBody>
       </p:sp>
@@ -7841,6 +8063,334 @@
               <a:rPr lang="en-US" smtClean="0"/>
               <a:pPr/>
               <a:t>6</a:t>
+            </a:fld>
+            <a:endParaRPr lang="en-US" dirty="0"/>
+          </a:p>
+        </p:txBody>
+      </p:sp>
+      <p:sp>
+        <p:nvSpPr>
+          <p:cNvPr id="6" name="Date Placeholder 3">
+            <a:extLst>
+              <a:ext uri="{FF2B5EF4-FFF2-40B4-BE49-F238E27FC236}">
+                <a16:creationId xmlns:a16="http://schemas.microsoft.com/office/drawing/2014/main" id="{28893308-8041-5B42-F817-60188F19B021}"/>
+              </a:ext>
+            </a:extLst>
+          </p:cNvPr>
+          <p:cNvSpPr txBox="1">
+            <a:spLocks/>
+          </p:cNvSpPr>
+          <p:nvPr/>
+        </p:nvSpPr>
+        <p:spPr>
+          <a:xfrm>
+            <a:off x="838200" y="6356350"/>
+            <a:ext cx="2743200" cy="365125"/>
+          </a:xfrm>
+          <a:prstGeom prst="rect">
+            <a:avLst/>
+          </a:prstGeom>
+        </p:spPr>
+        <p:txBody>
+          <a:bodyPr vert="horz" lIns="91440" tIns="45720" rIns="91440" bIns="45720" rtlCol="0" anchor="ctr"/>
+          <a:lstStyle>
+            <a:defPPr>
+              <a:defRPr lang="de-DE"/>
+            </a:defPPr>
+            <a:lvl1pPr marL="0" algn="l" defTabSz="914400" rtl="0" eaLnBrk="1" latinLnBrk="0" hangingPunct="1">
+              <a:defRPr sz="1200" kern="1200">
+                <a:solidFill>
+                  <a:schemeClr val="tx1">
+                    <a:tint val="75000"/>
+                  </a:schemeClr>
+                </a:solidFill>
+                <a:latin typeface="+mn-lt"/>
+                <a:ea typeface="+mn-ea"/>
+                <a:cs typeface="+mn-cs"/>
+              </a:defRPr>
+            </a:lvl1pPr>
+            <a:lvl2pPr marL="457200" algn="l" defTabSz="914400" rtl="0" eaLnBrk="1" latinLnBrk="0" hangingPunct="1">
+              <a:defRPr sz="1800" kern="1200">
+                <a:solidFill>
+                  <a:schemeClr val="tx1"/>
+                </a:solidFill>
+                <a:latin typeface="+mn-lt"/>
+                <a:ea typeface="+mn-ea"/>
+                <a:cs typeface="+mn-cs"/>
+              </a:defRPr>
+            </a:lvl2pPr>
+            <a:lvl3pPr marL="914400" algn="l" defTabSz="914400" rtl="0" eaLnBrk="1" latinLnBrk="0" hangingPunct="1">
+              <a:defRPr sz="1800" kern="1200">
+                <a:solidFill>
+                  <a:schemeClr val="tx1"/>
+                </a:solidFill>
+                <a:latin typeface="+mn-lt"/>
+                <a:ea typeface="+mn-ea"/>
+                <a:cs typeface="+mn-cs"/>
+              </a:defRPr>
+            </a:lvl3pPr>
+            <a:lvl4pPr marL="1371600" algn="l" defTabSz="914400" rtl="0" eaLnBrk="1" latinLnBrk="0" hangingPunct="1">
+              <a:defRPr sz="1800" kern="1200">
+                <a:solidFill>
+                  <a:schemeClr val="tx1"/>
+                </a:solidFill>
+                <a:latin typeface="+mn-lt"/>
+                <a:ea typeface="+mn-ea"/>
+                <a:cs typeface="+mn-cs"/>
+              </a:defRPr>
+            </a:lvl4pPr>
+            <a:lvl5pPr marL="1828800" algn="l" defTabSz="914400" rtl="0" eaLnBrk="1" latinLnBrk="0" hangingPunct="1">
+              <a:defRPr sz="1800" kern="1200">
+                <a:solidFill>
+                  <a:schemeClr val="tx1"/>
+                </a:solidFill>
+                <a:latin typeface="+mn-lt"/>
+                <a:ea typeface="+mn-ea"/>
+                <a:cs typeface="+mn-cs"/>
+              </a:defRPr>
+            </a:lvl5pPr>
+            <a:lvl6pPr marL="2286000" algn="l" defTabSz="914400" rtl="0" eaLnBrk="1" latinLnBrk="0" hangingPunct="1">
+              <a:defRPr sz="1800" kern="1200">
+                <a:solidFill>
+                  <a:schemeClr val="tx1"/>
+                </a:solidFill>
+                <a:latin typeface="+mn-lt"/>
+                <a:ea typeface="+mn-ea"/>
+                <a:cs typeface="+mn-cs"/>
+              </a:defRPr>
+            </a:lvl6pPr>
+            <a:lvl7pPr marL="2743200" algn="l" defTabSz="914400" rtl="0" eaLnBrk="1" latinLnBrk="0" hangingPunct="1">
+              <a:defRPr sz="1800" kern="1200">
+                <a:solidFill>
+                  <a:schemeClr val="tx1"/>
+                </a:solidFill>
+                <a:latin typeface="+mn-lt"/>
+                <a:ea typeface="+mn-ea"/>
+                <a:cs typeface="+mn-cs"/>
+              </a:defRPr>
+            </a:lvl7pPr>
+            <a:lvl8pPr marL="3200400" algn="l" defTabSz="914400" rtl="0" eaLnBrk="1" latinLnBrk="0" hangingPunct="1">
+              <a:defRPr sz="1800" kern="1200">
+                <a:solidFill>
+                  <a:schemeClr val="tx1"/>
+                </a:solidFill>
+                <a:latin typeface="+mn-lt"/>
+                <a:ea typeface="+mn-ea"/>
+                <a:cs typeface="+mn-cs"/>
+              </a:defRPr>
+            </a:lvl8pPr>
+            <a:lvl9pPr marL="3657600" algn="l" defTabSz="914400" rtl="0" eaLnBrk="1" latinLnBrk="0" hangingPunct="1">
+              <a:defRPr sz="1800" kern="1200">
+                <a:solidFill>
+                  <a:schemeClr val="tx1"/>
+                </a:solidFill>
+                <a:latin typeface="+mn-lt"/>
+                <a:ea typeface="+mn-ea"/>
+                <a:cs typeface="+mn-cs"/>
+              </a:defRPr>
+            </a:lvl9pPr>
+          </a:lstStyle>
+          <a:p>
+            <a:fld id="{8C792E63-5F21-4F54-A864-D84D9F273FCA}" type="datetimeFigureOut">
+              <a:rPr lang="en-US" smtClean="0"/>
+              <a:pPr/>
+              <a:t>7/23/2024</a:t>
+            </a:fld>
+            <a:endParaRPr lang="en-US" dirty="0"/>
+          </a:p>
+        </p:txBody>
+      </p:sp>
+    </p:spTree>
+    <p:extLst>
+      <p:ext uri="{BB962C8B-B14F-4D97-AF65-F5344CB8AC3E}">
+        <p14:creationId xmlns:p14="http://schemas.microsoft.com/office/powerpoint/2010/main" val="2975318478"/>
+      </p:ext>
+    </p:extLst>
+  </p:cSld>
+  <p:clrMapOvr>
+    <a:masterClrMapping/>
+  </p:clrMapOvr>
+</p:sld>
+</file>
+
+<file path=ppt/slides/slide7.xml><?xml version="1.0" encoding="utf-8"?>
+<p:sld xmlns:a="http://schemas.openxmlformats.org/drawingml/2006/main" xmlns:r="http://schemas.openxmlformats.org/officeDocument/2006/relationships" xmlns:p="http://schemas.openxmlformats.org/presentationml/2006/main">
+  <p:cSld>
+    <p:spTree>
+      <p:nvGrpSpPr>
+        <p:cNvPr id="1" name=""/>
+        <p:cNvGrpSpPr/>
+        <p:nvPr/>
+      </p:nvGrpSpPr>
+      <p:grpSpPr>
+        <a:xfrm>
+          <a:off x="0" y="0"/>
+          <a:ext cx="0" cy="0"/>
+          <a:chOff x="0" y="0"/>
+          <a:chExt cx="0" cy="0"/>
+        </a:xfrm>
+      </p:grpSpPr>
+      <p:sp>
+        <p:nvSpPr>
+          <p:cNvPr id="2" name="Title 1">
+            <a:extLst>
+              <a:ext uri="{FF2B5EF4-FFF2-40B4-BE49-F238E27FC236}">
+                <a16:creationId xmlns:a16="http://schemas.microsoft.com/office/drawing/2014/main" id="{67612D3D-95B0-4F74-BDB2-BCE058A01C12}"/>
+              </a:ext>
+            </a:extLst>
+          </p:cNvPr>
+          <p:cNvSpPr>
+            <a:spLocks noGrp="1"/>
+          </p:cNvSpPr>
+          <p:nvPr>
+            <p:ph type="title"/>
+          </p:nvPr>
+        </p:nvSpPr>
+        <p:spPr/>
+        <p:txBody>
+          <a:bodyPr>
+            <a:normAutofit/>
+          </a:bodyPr>
+          <a:lstStyle/>
+          <a:p>
+            <a:r>
+              <a:rPr lang="en-US" sz="3600" dirty="0"/>
+              <a:t>Backup: BRSKI-PRM – Abstract Protocol Overview</a:t>
+            </a:r>
+            <a:br>
+              <a:rPr lang="en-US" sz="3600" dirty="0"/>
+            </a:br>
+            <a:endParaRPr lang="en-US" sz="3600" dirty="0"/>
+          </a:p>
+        </p:txBody>
+      </p:sp>
+      <p:sp>
+        <p:nvSpPr>
+          <p:cNvPr id="5" name="Slide Number Placeholder 5">
+            <a:extLst>
+              <a:ext uri="{FF2B5EF4-FFF2-40B4-BE49-F238E27FC236}">
+                <a16:creationId xmlns:a16="http://schemas.microsoft.com/office/drawing/2014/main" id="{1881EAE9-7681-4485-81EC-EAB026A81A3C}"/>
+              </a:ext>
+            </a:extLst>
+          </p:cNvPr>
+          <p:cNvSpPr txBox="1">
+            <a:spLocks/>
+          </p:cNvSpPr>
+          <p:nvPr/>
+        </p:nvSpPr>
+        <p:spPr>
+          <a:xfrm>
+            <a:off x="8763000" y="6508750"/>
+            <a:ext cx="2743200" cy="365125"/>
+          </a:xfrm>
+          <a:prstGeom prst="rect">
+            <a:avLst/>
+          </a:prstGeom>
+        </p:spPr>
+        <p:txBody>
+          <a:bodyPr vert="horz" lIns="91440" tIns="45720" rIns="91440" bIns="45720" rtlCol="0" anchor="ctr"/>
+          <a:lstStyle>
+            <a:defPPr>
+              <a:defRPr lang="de-DE"/>
+            </a:defPPr>
+            <a:lvl1pPr marL="0" algn="r" defTabSz="914400" rtl="0" eaLnBrk="1" latinLnBrk="0" hangingPunct="1">
+              <a:defRPr sz="1200" kern="1200">
+                <a:solidFill>
+                  <a:schemeClr val="tx1">
+                    <a:tint val="75000"/>
+                  </a:schemeClr>
+                </a:solidFill>
+                <a:latin typeface="+mn-lt"/>
+                <a:ea typeface="+mn-ea"/>
+                <a:cs typeface="+mn-cs"/>
+              </a:defRPr>
+            </a:lvl1pPr>
+            <a:lvl2pPr marL="457200" algn="l" defTabSz="914400" rtl="0" eaLnBrk="1" latinLnBrk="0" hangingPunct="1">
+              <a:defRPr sz="1800" kern="1200">
+                <a:solidFill>
+                  <a:schemeClr val="tx1"/>
+                </a:solidFill>
+                <a:latin typeface="+mn-lt"/>
+                <a:ea typeface="+mn-ea"/>
+                <a:cs typeface="+mn-cs"/>
+              </a:defRPr>
+            </a:lvl2pPr>
+            <a:lvl3pPr marL="914400" algn="l" defTabSz="914400" rtl="0" eaLnBrk="1" latinLnBrk="0" hangingPunct="1">
+              <a:defRPr sz="1800" kern="1200">
+                <a:solidFill>
+                  <a:schemeClr val="tx1"/>
+                </a:solidFill>
+                <a:latin typeface="+mn-lt"/>
+                <a:ea typeface="+mn-ea"/>
+                <a:cs typeface="+mn-cs"/>
+              </a:defRPr>
+            </a:lvl3pPr>
+            <a:lvl4pPr marL="1371600" algn="l" defTabSz="914400" rtl="0" eaLnBrk="1" latinLnBrk="0" hangingPunct="1">
+              <a:defRPr sz="1800" kern="1200">
+                <a:solidFill>
+                  <a:schemeClr val="tx1"/>
+                </a:solidFill>
+                <a:latin typeface="+mn-lt"/>
+                <a:ea typeface="+mn-ea"/>
+                <a:cs typeface="+mn-cs"/>
+              </a:defRPr>
+            </a:lvl4pPr>
+            <a:lvl5pPr marL="1828800" algn="l" defTabSz="914400" rtl="0" eaLnBrk="1" latinLnBrk="0" hangingPunct="1">
+              <a:defRPr sz="1800" kern="1200">
+                <a:solidFill>
+                  <a:schemeClr val="tx1"/>
+                </a:solidFill>
+                <a:latin typeface="+mn-lt"/>
+                <a:ea typeface="+mn-ea"/>
+                <a:cs typeface="+mn-cs"/>
+              </a:defRPr>
+            </a:lvl5pPr>
+            <a:lvl6pPr marL="2286000" algn="l" defTabSz="914400" rtl="0" eaLnBrk="1" latinLnBrk="0" hangingPunct="1">
+              <a:defRPr sz="1800" kern="1200">
+                <a:solidFill>
+                  <a:schemeClr val="tx1"/>
+                </a:solidFill>
+                <a:latin typeface="+mn-lt"/>
+                <a:ea typeface="+mn-ea"/>
+                <a:cs typeface="+mn-cs"/>
+              </a:defRPr>
+            </a:lvl6pPr>
+            <a:lvl7pPr marL="2743200" algn="l" defTabSz="914400" rtl="0" eaLnBrk="1" latinLnBrk="0" hangingPunct="1">
+              <a:defRPr sz="1800" kern="1200">
+                <a:solidFill>
+                  <a:schemeClr val="tx1"/>
+                </a:solidFill>
+                <a:latin typeface="+mn-lt"/>
+                <a:ea typeface="+mn-ea"/>
+                <a:cs typeface="+mn-cs"/>
+              </a:defRPr>
+            </a:lvl7pPr>
+            <a:lvl8pPr marL="3200400" algn="l" defTabSz="914400" rtl="0" eaLnBrk="1" latinLnBrk="0" hangingPunct="1">
+              <a:defRPr sz="1800" kern="1200">
+                <a:solidFill>
+                  <a:schemeClr val="tx1"/>
+                </a:solidFill>
+                <a:latin typeface="+mn-lt"/>
+                <a:ea typeface="+mn-ea"/>
+                <a:cs typeface="+mn-cs"/>
+              </a:defRPr>
+            </a:lvl8pPr>
+            <a:lvl9pPr marL="3657600" algn="l" defTabSz="914400" rtl="0" eaLnBrk="1" latinLnBrk="0" hangingPunct="1">
+              <a:defRPr sz="1800" kern="1200">
+                <a:solidFill>
+                  <a:schemeClr val="tx1"/>
+                </a:solidFill>
+                <a:latin typeface="+mn-lt"/>
+                <a:ea typeface="+mn-ea"/>
+                <a:cs typeface="+mn-cs"/>
+              </a:defRPr>
+            </a:lvl9pPr>
+          </a:lstStyle>
+          <a:p>
+            <a:fld id="{104F53CC-0028-4916-8B93-0EBFFB2C7AAD}" type="slidenum">
+              <a:rPr lang="en-US" smtClean="0"/>
+              <a:pPr/>
+              <a:t>7</a:t>
             </a:fld>
             <a:endParaRPr lang="en-US" dirty="0"/>
           </a:p>
@@ -12450,6 +13000,28 @@
 </file>
 
 <file path=customXml/item1.xml><?xml version="1.0" encoding="utf-8"?>
+<p:properties xmlns:p="http://schemas.microsoft.com/office/2006/metadata/properties" xmlns:xsi="http://www.w3.org/2001/XMLSchema-instance" xmlns:pc="http://schemas.microsoft.com/office/infopath/2007/PartnerControls">
+  <documentManagement>
+    <_ip_UnifiedCompliancePolicyUIAction xmlns="http://schemas.microsoft.com/sharepoint/v3" xsi:nil="true"/>
+    <TaxCatchAll xmlns="56810815-8df0-4f10-8da7-34164765fbe3" xsi:nil="true"/>
+    <_ip_UnifiedCompliancePolicyProperties xmlns="http://schemas.microsoft.com/sharepoint/v3" xsi:nil="true"/>
+    <lcf76f155ced4ddcb4097134ff3c332f xmlns="a9de424c-86b2-47ed-8d4e-0a9b7010e669">
+      <Terms xmlns="http://schemas.microsoft.com/office/infopath/2007/PartnerControls"/>
+    </lcf76f155ced4ddcb4097134ff3c332f>
+  </documentManagement>
+</p:properties>
+</file>
+
+<file path=customXml/item2.xml><?xml version="1.0" encoding="utf-8"?>
+<?mso-contentType ?>
+<FormTemplates xmlns="http://schemas.microsoft.com/sharepoint/v3/contenttype/forms">
+  <Display>DocumentLibraryForm</Display>
+  <Edit>DocumentLibraryForm</Edit>
+  <New>DocumentLibraryForm</New>
+</FormTemplates>
+</file>
+
+<file path=customXml/item3.xml><?xml version="1.0" encoding="utf-8"?>
 <ct:contentTypeSchema xmlns:ct="http://schemas.microsoft.com/office/2006/metadata/contentType" xmlns:ma="http://schemas.microsoft.com/office/2006/metadata/properties/metaAttributes" ct:_="" ma:_="" ma:contentTypeName="Dokument" ma:contentTypeID="0x01010035CD6C532085F8449DFAA9E5E2A73509" ma:contentTypeVersion="22" ma:contentTypeDescription="Ein neues Dokument erstellen." ma:contentTypeScope="" ma:versionID="79025ec143ee1b8f4e002a25dcc445cd">
   <xsd:schema xmlns:xsd="http://www.w3.org/2001/XMLSchema" xmlns:xs="http://www.w3.org/2001/XMLSchema" xmlns:p="http://schemas.microsoft.com/office/2006/metadata/properties" xmlns:ns1="http://schemas.microsoft.com/sharepoint/v3" xmlns:ns2="ce079751-a51b-4a27-9376-edf93eae18d5" xmlns:ns3="a9de424c-86b2-47ed-8d4e-0a9b7010e669" xmlns:ns4="56810815-8df0-4f10-8da7-34164765fbe3" targetNamespace="http://schemas.microsoft.com/office/2006/metadata/properties" ma:root="true" ma:fieldsID="a349604d5808155358041a2fa3bfdc5c" ns1:_="" ns2:_="" ns3:_="" ns4:_="">
     <xsd:import namespace="http://schemas.microsoft.com/sharepoint/v3"/>
@@ -12726,29 +13298,34 @@
 </ct:contentTypeSchema>
 </file>
 
-<file path=customXml/item2.xml><?xml version="1.0" encoding="utf-8"?>
-<?mso-contentType ?>
-<FormTemplates xmlns="http://schemas.microsoft.com/sharepoint/v3/contenttype/forms">
-  <Display>DocumentLibraryForm</Display>
-  <Edit>DocumentLibraryForm</Edit>
-  <New>DocumentLibraryForm</New>
-</FormTemplates>
+<file path=customXml/itemProps1.xml><?xml version="1.0" encoding="utf-8"?>
+<ds:datastoreItem xmlns:ds="http://schemas.openxmlformats.org/officeDocument/2006/customXml" ds:itemID="{B4A0114C-CA0B-42DA-9E9D-9562C5DE829E}">
+  <ds:schemaRefs>
+    <ds:schemaRef ds:uri="http://schemas.openxmlformats.org/package/2006/metadata/core-properties"/>
+    <ds:schemaRef ds:uri="http://schemas.microsoft.com/office/2006/documentManagement/types"/>
+    <ds:schemaRef ds:uri="a9de424c-86b2-47ed-8d4e-0a9b7010e669"/>
+    <ds:schemaRef ds:uri="56810815-8df0-4f10-8da7-34164765fbe3"/>
+    <ds:schemaRef ds:uri="http://purl.org/dc/elements/1.1/"/>
+    <ds:schemaRef ds:uri="http://schemas.microsoft.com/office/2006/metadata/properties"/>
+    <ds:schemaRef ds:uri="http://schemas.microsoft.com/sharepoint/v3"/>
+    <ds:schemaRef ds:uri="ce079751-a51b-4a27-9376-edf93eae18d5"/>
+    <ds:schemaRef ds:uri="http://purl.org/dc/terms/"/>
+    <ds:schemaRef ds:uri="http://schemas.microsoft.com/office/infopath/2007/PartnerControls"/>
+    <ds:schemaRef ds:uri="http://www.w3.org/XML/1998/namespace"/>
+    <ds:schemaRef ds:uri="http://purl.org/dc/dcmitype/"/>
+  </ds:schemaRefs>
+</ds:datastoreItem>
 </file>
 
-<file path=customXml/item3.xml><?xml version="1.0" encoding="utf-8"?>
-<p:properties xmlns:p="http://schemas.microsoft.com/office/2006/metadata/properties" xmlns:xsi="http://www.w3.org/2001/XMLSchema-instance" xmlns:pc="http://schemas.microsoft.com/office/infopath/2007/PartnerControls">
-  <documentManagement>
-    <_ip_UnifiedCompliancePolicyUIAction xmlns="http://schemas.microsoft.com/sharepoint/v3" xsi:nil="true"/>
-    <TaxCatchAll xmlns="56810815-8df0-4f10-8da7-34164765fbe3" xsi:nil="true"/>
-    <_ip_UnifiedCompliancePolicyProperties xmlns="http://schemas.microsoft.com/sharepoint/v3" xsi:nil="true"/>
-    <lcf76f155ced4ddcb4097134ff3c332f xmlns="a9de424c-86b2-47ed-8d4e-0a9b7010e669">
-      <Terms xmlns="http://schemas.microsoft.com/office/infopath/2007/PartnerControls"/>
-    </lcf76f155ced4ddcb4097134ff3c332f>
-  </documentManagement>
-</p:properties>
+<file path=customXml/itemProps2.xml><?xml version="1.0" encoding="utf-8"?>
+<ds:datastoreItem xmlns:ds="http://schemas.openxmlformats.org/officeDocument/2006/customXml" ds:itemID="{D24FD0D5-2F45-43E0-BE44-54B1E275E4BC}">
+  <ds:schemaRefs>
+    <ds:schemaRef ds:uri="http://schemas.microsoft.com/sharepoint/v3/contenttype/forms"/>
+  </ds:schemaRefs>
+</ds:datastoreItem>
 </file>
 
-<file path=customXml/itemProps1.xml><?xml version="1.0" encoding="utf-8"?>
+<file path=customXml/itemProps3.xml><?xml version="1.0" encoding="utf-8"?>
 <ds:datastoreItem xmlns:ds="http://schemas.openxmlformats.org/officeDocument/2006/customXml" ds:itemID="{ED4F657C-2D71-40B5-9B4F-EEE28F4C1523}">
   <ds:schemaRefs>
     <ds:schemaRef ds:uri="http://schemas.microsoft.com/office/2006/metadata/contentType"/>
@@ -12769,33 +13346,6 @@
 </ds:datastoreItem>
 </file>
 
-<file path=customXml/itemProps2.xml><?xml version="1.0" encoding="utf-8"?>
-<ds:datastoreItem xmlns:ds="http://schemas.openxmlformats.org/officeDocument/2006/customXml" ds:itemID="{D24FD0D5-2F45-43E0-BE44-54B1E275E4BC}">
-  <ds:schemaRefs>
-    <ds:schemaRef ds:uri="http://schemas.microsoft.com/sharepoint/v3/contenttype/forms"/>
-  </ds:schemaRefs>
-</ds:datastoreItem>
-</file>
-
-<file path=customXml/itemProps3.xml><?xml version="1.0" encoding="utf-8"?>
-<ds:datastoreItem xmlns:ds="http://schemas.openxmlformats.org/officeDocument/2006/customXml" ds:itemID="{B4A0114C-CA0B-42DA-9E9D-9562C5DE829E}">
-  <ds:schemaRefs>
-    <ds:schemaRef ds:uri="ce079751-a51b-4a27-9376-edf93eae18d5"/>
-    <ds:schemaRef ds:uri="http://purl.org/dc/dcmitype/"/>
-    <ds:schemaRef ds:uri="a9de424c-86b2-47ed-8d4e-0a9b7010e669"/>
-    <ds:schemaRef ds:uri="http://schemas.microsoft.com/office/infopath/2007/PartnerControls"/>
-    <ds:schemaRef ds:uri="http://www.w3.org/XML/1998/namespace"/>
-    <ds:schemaRef ds:uri="http://purl.org/dc/terms/"/>
-    <ds:schemaRef ds:uri="http://schemas.microsoft.com/sharepoint/v3"/>
-    <ds:schemaRef ds:uri="http://schemas.openxmlformats.org/package/2006/metadata/core-properties"/>
-    <ds:schemaRef ds:uri="http://purl.org/dc/elements/1.1/"/>
-    <ds:schemaRef ds:uri="http://schemas.microsoft.com/office/2006/documentManagement/types"/>
-    <ds:schemaRef ds:uri="56810815-8df0-4f10-8da7-34164765fbe3"/>
-    <ds:schemaRef ds:uri="http://schemas.microsoft.com/office/2006/metadata/properties"/>
-  </ds:schemaRefs>
-</ds:datastoreItem>
-</file>
-
 <file path=docMetadata/LabelInfo.xml><?xml version="1.0" encoding="utf-8"?>
 <clbl:labelList xmlns:clbl="http://schemas.microsoft.com/office/2020/mipLabelMetadata">
   <clbl:label id="{6f75f480-7803-4ee9-bb54-84d0635fdbe7}" enabled="1" method="Standard" siteId="{38ae3bcd-9579-4fd4-adda-b42e1495d55a}" contentBits="0" removed="0"/>

</xml_diff>